<commit_message>
updated findings in powerpoint for question 3
</commit_message>
<xml_diff>
--- a/Project1.pptx
+++ b/Project1.pptx
@@ -6625,7 +6625,7 @@
         </p:spPr>
         <p:txBody>
           <a:bodyPr>
-            <a:normAutofit/>
+            <a:normAutofit fontScale="92500"/>
           </a:bodyPr>
           <a:lstStyle/>
           <a:p>
@@ -6653,15 +6653,48 @@
                   <a:schemeClr val="bg1"/>
                 </a:solidFill>
               </a:rPr>
-              <a:t>Need to add analysis here</a:t>
-            </a:r>
-          </a:p>
-          <a:p>
-            <a:endParaRPr lang="en-US" dirty="0">
-              <a:solidFill>
-                <a:schemeClr val="bg1"/>
-              </a:solidFill>
-            </a:endParaRPr>
+              <a:t>Initially, I was expecting a greater correlation between the number of covid deaths and the stock market.  I was expecting that the greater the number of deaths, the lower the stock market would be.</a:t>
+            </a:r>
+          </a:p>
+          <a:p>
+            <a:r>
+              <a:rPr lang="en-US" dirty="0">
+                <a:solidFill>
+                  <a:schemeClr val="bg1"/>
+                </a:solidFill>
+              </a:rPr>
+              <a:t>Using US only covid data at first, I noticed that at the very beginning of the pandemic, the stock market did start to drop right away, however it dropped the most before US deaths really started.  This drop in the stock market in the first month not as closely tied to actual death numbers as I assumed it would be.</a:t>
+            </a:r>
+          </a:p>
+          <a:p>
+            <a:r>
+              <a:rPr lang="en-US" dirty="0">
+                <a:solidFill>
+                  <a:schemeClr val="bg1"/>
+                </a:solidFill>
+              </a:rPr>
+              <a:t>Since the US was not the first country to have covid exposure, I decided to go back and run the numbers again using global covid death data.  This did show a closer correlation for about the first month than using just US data did.</a:t>
+            </a:r>
+          </a:p>
+          <a:p>
+            <a:r>
+              <a:rPr lang="en-US" dirty="0">
+                <a:solidFill>
+                  <a:schemeClr val="bg1"/>
+                </a:solidFill>
+              </a:rPr>
+              <a:t>However, in late March 2020 as the deaths continued to climb, the stock market started to go back up.  The stock market continued to basically go up from that time forward regardless of the covid death counts.  During the big global covid death spike that started around November 2020 and continued into January 2021, the stock market actually went up consistently (which is the opposite of what happened at the beginning of the pandemic).</a:t>
+            </a:r>
+          </a:p>
+          <a:p>
+            <a:r>
+              <a:rPr lang="en-US" dirty="0">
+                <a:solidFill>
+                  <a:schemeClr val="bg1"/>
+                </a:solidFill>
+              </a:rPr>
+              <a:t>My final conclusion is that other than the initial onset of the global pandemic, the number of covid deaths did not affect the stock market in a major way.</a:t>
+            </a:r>
           </a:p>
         </p:txBody>
       </p:sp>

</xml_diff>

<commit_message>
add config ignore, add more to wordcloud, add Q4 for PPT
</commit_message>
<xml_diff>
--- a/Project1.pptx
+++ b/Project1.pptx
@@ -13,8 +13,10 @@
     <p:sldId id="265" r:id="rId7"/>
     <p:sldId id="266" r:id="rId8"/>
     <p:sldId id="264" r:id="rId9"/>
-    <p:sldId id="258" r:id="rId10"/>
-    <p:sldId id="261" r:id="rId11"/>
+    <p:sldId id="269" r:id="rId10"/>
+    <p:sldId id="268" r:id="rId11"/>
+    <p:sldId id="258" r:id="rId12"/>
+    <p:sldId id="261" r:id="rId13"/>
   </p:sldIdLst>
   <p:sldSz cx="12192000" cy="6858000"/>
   <p:notesSz cx="6858000" cy="9144000"/>
@@ -5453,6 +5455,300 @@
       </p:grpSpPr>
       <p:sp>
         <p:nvSpPr>
+          <p:cNvPr id="4" name="TextBox 3"/>
+          <p:cNvSpPr txBox="1"/>
+          <p:nvPr/>
+        </p:nvSpPr>
+        <p:spPr>
+          <a:xfrm>
+            <a:off x="957530" y="448573"/>
+            <a:ext cx="10722635" cy="400110"/>
+          </a:xfrm>
+          <a:prstGeom prst="rect">
+            <a:avLst/>
+          </a:prstGeom>
+          <a:noFill/>
+        </p:spPr>
+        <p:txBody>
+          <a:bodyPr wrap="square" rtlCol="0">
+            <a:spAutoFit/>
+          </a:bodyPr>
+          <a:lstStyle/>
+          <a:p>
+            <a:r>
+              <a:rPr lang="en-US" sz="2000" b="1" dirty="0" smtClean="0"/>
+              <a:t>SO WHAT WAS THE SENTIMENT DURING SIGNIFICNAT DROP BEFORE AND AFTER MAY? </a:t>
+            </a:r>
+            <a:endParaRPr lang="en-US" sz="2000" b="1" dirty="0"/>
+          </a:p>
+        </p:txBody>
+      </p:sp>
+      <p:pic>
+        <p:nvPicPr>
+          <p:cNvPr id="5" name="Picture 4"/>
+          <p:cNvPicPr>
+            <a:picLocks noChangeAspect="1"/>
+          </p:cNvPicPr>
+          <p:nvPr/>
+        </p:nvPicPr>
+        <p:blipFill>
+          <a:blip r:embed="rId2">
+            <a:extLst>
+              <a:ext uri="{28A0092B-C50C-407E-A947-70E740481C1C}">
+                <a14:useLocalDpi xmlns:a14="http://schemas.microsoft.com/office/drawing/2010/main" val="0"/>
+              </a:ext>
+            </a:extLst>
+          </a:blip>
+          <a:stretch>
+            <a:fillRect/>
+          </a:stretch>
+        </p:blipFill>
+        <p:spPr>
+          <a:xfrm>
+            <a:off x="318304" y="1091466"/>
+            <a:ext cx="4745770" cy="5519662"/>
+          </a:xfrm>
+          <a:prstGeom prst="rect">
+            <a:avLst/>
+          </a:prstGeom>
+        </p:spPr>
+      </p:pic>
+      <p:pic>
+        <p:nvPicPr>
+          <p:cNvPr id="6" name="Picture 5"/>
+          <p:cNvPicPr>
+            <a:picLocks noChangeAspect="1"/>
+          </p:cNvPicPr>
+          <p:nvPr/>
+        </p:nvPicPr>
+        <p:blipFill>
+          <a:blip r:embed="rId3">
+            <a:extLst>
+              <a:ext uri="{28A0092B-C50C-407E-A947-70E740481C1C}">
+                <a14:useLocalDpi xmlns:a14="http://schemas.microsoft.com/office/drawing/2010/main" val="0"/>
+              </a:ext>
+            </a:extLst>
+          </a:blip>
+          <a:stretch>
+            <a:fillRect/>
+          </a:stretch>
+        </p:blipFill>
+        <p:spPr>
+          <a:xfrm>
+            <a:off x="6318847" y="1091466"/>
+            <a:ext cx="4685019" cy="5449003"/>
+          </a:xfrm>
+          <a:prstGeom prst="rect">
+            <a:avLst/>
+          </a:prstGeom>
+        </p:spPr>
+      </p:pic>
+      <p:sp>
+        <p:nvSpPr>
+          <p:cNvPr id="7" name="TextBox 6"/>
+          <p:cNvSpPr txBox="1"/>
+          <p:nvPr/>
+        </p:nvSpPr>
+        <p:spPr>
+          <a:xfrm>
+            <a:off x="1837427" y="1091466"/>
+            <a:ext cx="2329132" cy="366398"/>
+          </a:xfrm>
+          <a:prstGeom prst="rect">
+            <a:avLst/>
+          </a:prstGeom>
+          <a:noFill/>
+        </p:spPr>
+        <p:txBody>
+          <a:bodyPr wrap="square" rtlCol="0">
+            <a:spAutoFit/>
+          </a:bodyPr>
+          <a:lstStyle/>
+          <a:p>
+            <a:r>
+              <a:rPr lang="en-US" b="1" dirty="0" smtClean="0">
+                <a:solidFill>
+                  <a:schemeClr val="bg1"/>
+                </a:solidFill>
+              </a:rPr>
+              <a:t>Before MAY</a:t>
+            </a:r>
+            <a:endParaRPr lang="en-US" b="1" dirty="0">
+              <a:solidFill>
+                <a:schemeClr val="bg1"/>
+              </a:solidFill>
+            </a:endParaRPr>
+          </a:p>
+        </p:txBody>
+      </p:sp>
+      <p:sp>
+        <p:nvSpPr>
+          <p:cNvPr id="8" name="TextBox 7"/>
+          <p:cNvSpPr txBox="1"/>
+          <p:nvPr/>
+        </p:nvSpPr>
+        <p:spPr>
+          <a:xfrm>
+            <a:off x="7898922" y="1091466"/>
+            <a:ext cx="2329132" cy="366398"/>
+          </a:xfrm>
+          <a:prstGeom prst="rect">
+            <a:avLst/>
+          </a:prstGeom>
+          <a:noFill/>
+        </p:spPr>
+        <p:txBody>
+          <a:bodyPr wrap="square" rtlCol="0">
+            <a:spAutoFit/>
+          </a:bodyPr>
+          <a:lstStyle/>
+          <a:p>
+            <a:r>
+              <a:rPr lang="en-US" b="1" dirty="0" smtClean="0">
+                <a:solidFill>
+                  <a:schemeClr val="bg1"/>
+                </a:solidFill>
+              </a:rPr>
+              <a:t>After MAY</a:t>
+            </a:r>
+            <a:endParaRPr lang="en-US" b="1" dirty="0">
+              <a:solidFill>
+                <a:schemeClr val="bg1"/>
+              </a:solidFill>
+            </a:endParaRPr>
+          </a:p>
+        </p:txBody>
+      </p:sp>
+    </p:spTree>
+    <p:extLst>
+      <p:ext uri="{BB962C8B-B14F-4D97-AF65-F5344CB8AC3E}">
+        <p14:creationId xmlns:p14="http://schemas.microsoft.com/office/powerpoint/2010/main" val="3792931441"/>
+      </p:ext>
+    </p:extLst>
+  </p:cSld>
+  <p:clrMapOvr>
+    <a:masterClrMapping/>
+  </p:clrMapOvr>
+  <p:timing>
+    <p:tnLst>
+      <p:par>
+        <p:cTn id="1" dur="indefinite" restart="never" nodeType="tmRoot"/>
+      </p:par>
+    </p:tnLst>
+  </p:timing>
+</p:sld>
+</file>
+
+<file path=ppt/slides/slide11.xml><?xml version="1.0" encoding="utf-8"?>
+<p:sld xmlns:a="http://schemas.openxmlformats.org/drawingml/2006/main" xmlns:r="http://schemas.openxmlformats.org/officeDocument/2006/relationships" xmlns:p="http://schemas.openxmlformats.org/presentationml/2006/main">
+  <p:cSld>
+    <p:spTree>
+      <p:nvGrpSpPr>
+        <p:cNvPr id="1" name=""/>
+        <p:cNvGrpSpPr/>
+        <p:nvPr/>
+      </p:nvGrpSpPr>
+      <p:grpSpPr>
+        <a:xfrm>
+          <a:off x="0" y="0"/>
+          <a:ext cx="0" cy="0"/>
+          <a:chOff x="0" y="0"/>
+          <a:chExt cx="0" cy="0"/>
+        </a:xfrm>
+      </p:grpSpPr>
+      <p:sp>
+        <p:nvSpPr>
+          <p:cNvPr id="2" name="Title 1"/>
+          <p:cNvSpPr>
+            <a:spLocks noGrp="1"/>
+          </p:cNvSpPr>
+          <p:nvPr>
+            <p:ph type="title"/>
+          </p:nvPr>
+        </p:nvSpPr>
+        <p:spPr>
+          <a:xfrm>
+            <a:off x="684212" y="154797"/>
+            <a:ext cx="10788920" cy="3387784"/>
+          </a:xfrm>
+        </p:spPr>
+        <p:txBody>
+          <a:bodyPr/>
+          <a:lstStyle/>
+          <a:p>
+            <a:pPr algn="ctr"/>
+            <a:r>
+              <a:rPr lang="en-US" dirty="0"/>
+              <a:t>Questions?</a:t>
+            </a:r>
+          </a:p>
+        </p:txBody>
+      </p:sp>
+      <p:sp>
+        <p:nvSpPr>
+          <p:cNvPr id="3" name="Text Placeholder 2"/>
+          <p:cNvSpPr>
+            <a:spLocks noGrp="1"/>
+          </p:cNvSpPr>
+          <p:nvPr>
+            <p:ph type="body" idx="1"/>
+          </p:nvPr>
+        </p:nvSpPr>
+        <p:spPr>
+          <a:xfrm>
+            <a:off x="684212" y="4830792"/>
+            <a:ext cx="9627229" cy="1163608"/>
+          </a:xfrm>
+        </p:spPr>
+        <p:txBody>
+          <a:bodyPr>
+            <a:normAutofit/>
+          </a:bodyPr>
+          <a:lstStyle/>
+          <a:p>
+            <a:endParaRPr lang="en-US" dirty="0"/>
+          </a:p>
+        </p:txBody>
+      </p:sp>
+    </p:spTree>
+    <p:extLst>
+      <p:ext uri="{BB962C8B-B14F-4D97-AF65-F5344CB8AC3E}">
+        <p14:creationId xmlns:p14="http://schemas.microsoft.com/office/powerpoint/2010/main" val="1775056545"/>
+      </p:ext>
+    </p:extLst>
+  </p:cSld>
+  <p:clrMapOvr>
+    <a:masterClrMapping/>
+  </p:clrMapOvr>
+  <p:timing>
+    <p:tnLst>
+      <p:par>
+        <p:cTn id="1" dur="indefinite" restart="never" nodeType="tmRoot"/>
+      </p:par>
+    </p:tnLst>
+  </p:timing>
+</p:sld>
+</file>
+
+<file path=ppt/slides/slide12.xml><?xml version="1.0" encoding="utf-8"?>
+<p:sld xmlns:a="http://schemas.openxmlformats.org/drawingml/2006/main" xmlns:r="http://schemas.openxmlformats.org/officeDocument/2006/relationships" xmlns:p="http://schemas.openxmlformats.org/presentationml/2006/main">
+  <p:cSld>
+    <p:spTree>
+      <p:nvGrpSpPr>
+        <p:cNvPr id="1" name=""/>
+        <p:cNvGrpSpPr/>
+        <p:nvPr/>
+      </p:nvGrpSpPr>
+      <p:grpSpPr>
+        <a:xfrm>
+          <a:off x="0" y="0"/>
+          <a:ext cx="0" cy="0"/>
+          <a:chOff x="0" y="0"/>
+          <a:chExt cx="0" cy="0"/>
+        </a:xfrm>
+      </p:grpSpPr>
+      <p:sp>
+        <p:nvSpPr>
           <p:cNvPr id="2" name="Title 1"/>
           <p:cNvSpPr>
             <a:spLocks noGrp="1"/>
@@ -5719,6 +6015,14 @@
               </a:rPr>
               <a:t>NinjaTrader</a:t>
             </a:r>
+            <a:r>
+              <a:rPr lang="en-US" dirty="0">
+                <a:solidFill>
+                  <a:schemeClr val="bg1"/>
+                </a:solidFill>
+              </a:rPr>
+              <a:t/>
+            </a:r>
             <a:br>
               <a:rPr lang="en-US" dirty="0">
                 <a:solidFill>
@@ -6131,7 +6435,7 @@
           <p:cNvPr id="5" name="Picture 4">
             <a:extLst>
               <a:ext uri="{FF2B5EF4-FFF2-40B4-BE49-F238E27FC236}">
-                <a16:creationId xmlns:a16="http://schemas.microsoft.com/office/drawing/2014/main" id="{EA1399E7-6309-4723-86AD-38062D8F1D72}"/>
+                <a16:creationId xmlns:a16="http://schemas.microsoft.com/office/drawing/2014/main" xmlns="" id="{EA1399E7-6309-4723-86AD-38062D8F1D72}"/>
               </a:ext>
             </a:extLst>
           </p:cNvPr>
@@ -6161,7 +6465,7 @@
           <p:cNvPr id="6" name="TextBox 5">
             <a:extLst>
               <a:ext uri="{FF2B5EF4-FFF2-40B4-BE49-F238E27FC236}">
-                <a16:creationId xmlns:a16="http://schemas.microsoft.com/office/drawing/2014/main" id="{82AFC9A5-1D8A-436E-8718-8EBCE4864537}"/>
+                <a16:creationId xmlns:a16="http://schemas.microsoft.com/office/drawing/2014/main" xmlns="" id="{82AFC9A5-1D8A-436E-8718-8EBCE4864537}"/>
               </a:ext>
             </a:extLst>
           </p:cNvPr>
@@ -6425,7 +6729,7 @@
           <p:cNvPr id="6" name="TextBox 5">
             <a:extLst>
               <a:ext uri="{FF2B5EF4-FFF2-40B4-BE49-F238E27FC236}">
-                <a16:creationId xmlns:a16="http://schemas.microsoft.com/office/drawing/2014/main" id="{82AFC9A5-1D8A-436E-8718-8EBCE4864537}"/>
+                <a16:creationId xmlns:a16="http://schemas.microsoft.com/office/drawing/2014/main" xmlns="" id="{82AFC9A5-1D8A-436E-8718-8EBCE4864537}"/>
               </a:ext>
             </a:extLst>
           </p:cNvPr>
@@ -6515,7 +6819,7 @@
           <p:cNvPr id="7" name="Picture 6">
             <a:extLst>
               <a:ext uri="{FF2B5EF4-FFF2-40B4-BE49-F238E27FC236}">
-                <a16:creationId xmlns:a16="http://schemas.microsoft.com/office/drawing/2014/main" id="{234576BE-CC9D-4EBD-8E3B-BFB54B1D808F}"/>
+                <a16:creationId xmlns:a16="http://schemas.microsoft.com/office/drawing/2014/main" xmlns="" id="{234576BE-CC9D-4EBD-8E3B-BFB54B1D808F}"/>
               </a:ext>
             </a:extLst>
           </p:cNvPr>
@@ -6708,6 +7012,13 @@
   <p:clrMapOvr>
     <a:masterClrMapping/>
   </p:clrMapOvr>
+  <p:timing>
+    <p:tnLst>
+      <p:par>
+        <p:cTn id="1" dur="indefinite" restart="never" nodeType="tmRoot"/>
+      </p:par>
+    </p:tnLst>
+  </p:timing>
 </p:sld>
 </file>
 
@@ -6746,14 +7057,23 @@
         </p:spPr>
         <p:txBody>
           <a:bodyPr>
-            <a:normAutofit fontScale="90000"/>
+            <a:normAutofit/>
           </a:bodyPr>
           <a:lstStyle/>
           <a:p>
             <a:r>
               <a:rPr lang="en-US" dirty="0"/>
-              <a:t>Question 4: can we correlate positive news articles to stock market gains via Word Cloud?</a:t>
-            </a:r>
+              <a:t>Question 4: </a:t>
+            </a:r>
+            <a:r>
+              <a:rPr lang="en-US" dirty="0" err="1" smtClean="0"/>
+              <a:t>wordcloud</a:t>
+            </a:r>
+            <a:r>
+              <a:rPr lang="en-US" dirty="0" smtClean="0"/>
+              <a:t> from articles during significant market drops</a:t>
+            </a:r>
+            <a:endParaRPr lang="en-US" dirty="0"/>
           </a:p>
         </p:txBody>
       </p:sp>
@@ -6769,8 +7089,8 @@
         </p:nvSpPr>
         <p:spPr>
           <a:xfrm>
-            <a:off x="684213" y="1518249"/>
-            <a:ext cx="11047712" cy="4790536"/>
+            <a:off x="8238227" y="1518249"/>
+            <a:ext cx="3493698" cy="4790536"/>
           </a:xfrm>
         </p:spPr>
         <p:txBody>
@@ -6779,17 +7099,76 @@
           </a:bodyPr>
           <a:lstStyle/>
           <a:p>
-            <a:r>
-              <a:rPr lang="en-US" dirty="0">
+            <a:pPr marL="285750" indent="-285750">
+              <a:buFont typeface="Arial" panose="020B0604020202020204" pitchFamily="34" charset="0"/>
+              <a:buChar char="•"/>
+            </a:pPr>
+            <a:r>
+              <a:rPr lang="en-US" dirty="0" smtClean="0">
                 <a:solidFill>
                   <a:schemeClr val="bg1"/>
                 </a:solidFill>
               </a:rPr>
-              <a:t>Place Text Here</a:t>
-            </a:r>
-          </a:p>
-        </p:txBody>
-      </p:sp>
+              <a:t>Brief look at the Daily Percent Change of S&amp;P500 </a:t>
+            </a:r>
+          </a:p>
+          <a:p>
+            <a:pPr marL="285750" indent="-285750">
+              <a:buFont typeface="Arial" panose="020B0604020202020204" pitchFamily="34" charset="0"/>
+              <a:buChar char="•"/>
+            </a:pPr>
+            <a:r>
+              <a:rPr lang="en-US" dirty="0" smtClean="0">
+                <a:solidFill>
+                  <a:schemeClr val="bg1"/>
+                </a:solidFill>
+              </a:rPr>
+              <a:t>Significant Volatility during the initial COVID Period</a:t>
+            </a:r>
+          </a:p>
+          <a:p>
+            <a:pPr marL="285750" indent="-285750">
+              <a:buFont typeface="Arial" panose="020B0604020202020204" pitchFamily="34" charset="0"/>
+              <a:buChar char="•"/>
+            </a:pPr>
+            <a:endParaRPr lang="en-US" dirty="0">
+              <a:solidFill>
+                <a:schemeClr val="bg1"/>
+              </a:solidFill>
+            </a:endParaRPr>
+          </a:p>
+        </p:txBody>
+      </p:sp>
+      <p:pic>
+        <p:nvPicPr>
+          <p:cNvPr id="4" name="Picture 3"/>
+          <p:cNvPicPr>
+            <a:picLocks noChangeAspect="1"/>
+          </p:cNvPicPr>
+          <p:nvPr/>
+        </p:nvPicPr>
+        <p:blipFill>
+          <a:blip r:embed="rId2">
+            <a:extLst>
+              <a:ext uri="{28A0092B-C50C-407E-A947-70E740481C1C}">
+                <a14:useLocalDpi xmlns:a14="http://schemas.microsoft.com/office/drawing/2010/main" val="0"/>
+              </a:ext>
+            </a:extLst>
+          </a:blip>
+          <a:stretch>
+            <a:fillRect/>
+          </a:stretch>
+        </p:blipFill>
+        <p:spPr>
+          <a:xfrm>
+            <a:off x="324922" y="1320796"/>
+            <a:ext cx="7378467" cy="4918978"/>
+          </a:xfrm>
+          <a:prstGeom prst="rect">
+            <a:avLst/>
+          </a:prstGeom>
+        </p:spPr>
+      </p:pic>
     </p:spTree>
     <p:extLst>
       <p:ext uri="{BB962C8B-B14F-4D97-AF65-F5344CB8AC3E}">
@@ -6800,6 +7179,13 @@
   <p:clrMapOvr>
     <a:masterClrMapping/>
   </p:clrMapOvr>
+  <p:timing>
+    <p:tnLst>
+      <p:par>
+        <p:cTn id="1" dur="indefinite" restart="never" nodeType="tmRoot"/>
+      </p:par>
+    </p:tnLst>
+  </p:timing>
 </p:sld>
 </file>
 
@@ -6820,56 +7206,256 @@
           <a:chExt cx="0" cy="0"/>
         </a:xfrm>
       </p:grpSpPr>
-      <p:sp>
-        <p:nvSpPr>
-          <p:cNvPr id="2" name="Title 1"/>
-          <p:cNvSpPr>
-            <a:spLocks noGrp="1"/>
-          </p:cNvSpPr>
-          <p:nvPr>
-            <p:ph type="title"/>
-          </p:nvPr>
-        </p:nvSpPr>
+      <p:pic>
+        <p:nvPicPr>
+          <p:cNvPr id="4" name="Picture 3"/>
+          <p:cNvPicPr>
+            <a:picLocks noChangeAspect="1"/>
+          </p:cNvPicPr>
+          <p:nvPr/>
+        </p:nvPicPr>
+        <p:blipFill>
+          <a:blip r:embed="rId2">
+            <a:extLst>
+              <a:ext uri="{28A0092B-C50C-407E-A947-70E740481C1C}">
+                <a14:useLocalDpi xmlns:a14="http://schemas.microsoft.com/office/drawing/2010/main" val="0"/>
+              </a:ext>
+            </a:extLst>
+          </a:blip>
+          <a:stretch>
+            <a:fillRect/>
+          </a:stretch>
+        </p:blipFill>
         <p:spPr>
           <a:xfrm>
-            <a:off x="684212" y="154797"/>
-            <a:ext cx="10788920" cy="3387784"/>
-          </a:xfrm>
-        </p:spPr>
-        <p:txBody>
-          <a:bodyPr/>
-          <a:lstStyle/>
-          <a:p>
-            <a:pPr algn="ctr"/>
+            <a:off x="306237" y="103770"/>
+            <a:ext cx="4632385" cy="3088256"/>
+          </a:xfrm>
+          <a:prstGeom prst="rect">
+            <a:avLst/>
+          </a:prstGeom>
+        </p:spPr>
+      </p:pic>
+      <p:pic>
+        <p:nvPicPr>
+          <p:cNvPr id="5" name="Picture 4"/>
+          <p:cNvPicPr>
+            <a:picLocks noChangeAspect="1"/>
+          </p:cNvPicPr>
+          <p:nvPr/>
+        </p:nvPicPr>
+        <p:blipFill rotWithShape="1">
+          <a:blip r:embed="rId3">
+            <a:extLst>
+              <a:ext uri="{28A0092B-C50C-407E-A947-70E740481C1C}">
+                <a14:useLocalDpi xmlns:a14="http://schemas.microsoft.com/office/drawing/2010/main" val="0"/>
+              </a:ext>
+            </a:extLst>
+          </a:blip>
+          <a:srcRect l="839" t="10495"/>
+          <a:stretch/>
+        </p:blipFill>
+        <p:spPr>
+          <a:xfrm>
+            <a:off x="0" y="3536832"/>
+            <a:ext cx="5244860" cy="3156063"/>
+          </a:xfrm>
+          <a:prstGeom prst="rect">
+            <a:avLst/>
+          </a:prstGeom>
+        </p:spPr>
+      </p:pic>
+      <p:sp>
+        <p:nvSpPr>
+          <p:cNvPr id="6" name="TextBox 5"/>
+          <p:cNvSpPr txBox="1"/>
+          <p:nvPr/>
+        </p:nvSpPr>
+        <p:spPr>
+          <a:xfrm>
+            <a:off x="1078303" y="3259833"/>
+            <a:ext cx="3312543" cy="276999"/>
+          </a:xfrm>
+          <a:prstGeom prst="rect">
+            <a:avLst/>
+          </a:prstGeom>
+          <a:noFill/>
+        </p:spPr>
+        <p:txBody>
+          <a:bodyPr wrap="square" rtlCol="0">
+            <a:spAutoFit/>
+          </a:bodyPr>
+          <a:lstStyle/>
+          <a:p>
+            <a:r>
+              <a:rPr lang="en-US" sz="1200" b="1" dirty="0" smtClean="0">
+                <a:solidFill>
+                  <a:schemeClr val="bg1"/>
+                </a:solidFill>
+              </a:rPr>
+              <a:t>Daily Percent Change Before May</a:t>
+            </a:r>
+            <a:endParaRPr lang="en-US" sz="1200" b="1" dirty="0">
+              <a:solidFill>
+                <a:schemeClr val="bg1"/>
+              </a:solidFill>
+            </a:endParaRPr>
+          </a:p>
+        </p:txBody>
+      </p:sp>
+      <p:pic>
+        <p:nvPicPr>
+          <p:cNvPr id="7" name="Picture 6"/>
+          <p:cNvPicPr>
+            <a:picLocks noChangeAspect="1"/>
+          </p:cNvPicPr>
+          <p:nvPr/>
+        </p:nvPicPr>
+        <p:blipFill rotWithShape="1">
+          <a:blip r:embed="rId4">
+            <a:extLst>
+              <a:ext uri="{28A0092B-C50C-407E-A947-70E740481C1C}">
+                <a14:useLocalDpi xmlns:a14="http://schemas.microsoft.com/office/drawing/2010/main" val="0"/>
+              </a:ext>
+            </a:extLst>
+          </a:blip>
+          <a:srcRect l="315" t="10849"/>
+          <a:stretch/>
+        </p:blipFill>
+        <p:spPr>
+          <a:xfrm>
+            <a:off x="4537495" y="276045"/>
+            <a:ext cx="5469158" cy="3260787"/>
+          </a:xfrm>
+          <a:prstGeom prst="rect">
+            <a:avLst/>
+          </a:prstGeom>
+        </p:spPr>
+      </p:pic>
+      <p:sp>
+        <p:nvSpPr>
+          <p:cNvPr id="8" name="TextBox 7"/>
+          <p:cNvSpPr txBox="1"/>
+          <p:nvPr/>
+        </p:nvSpPr>
+        <p:spPr>
+          <a:xfrm>
+            <a:off x="5883215" y="51408"/>
+            <a:ext cx="3804249" cy="276999"/>
+          </a:xfrm>
+          <a:prstGeom prst="rect">
+            <a:avLst/>
+          </a:prstGeom>
+          <a:noFill/>
+        </p:spPr>
+        <p:txBody>
+          <a:bodyPr wrap="square" rtlCol="0">
+            <a:spAutoFit/>
+          </a:bodyPr>
+          <a:lstStyle/>
+          <a:p>
+            <a:r>
+              <a:rPr lang="en-US" sz="1200" b="1" dirty="0" smtClean="0">
+                <a:solidFill>
+                  <a:schemeClr val="bg1"/>
+                </a:solidFill>
+              </a:rPr>
+              <a:t>Daily Percent Change After May</a:t>
+            </a:r>
+            <a:endParaRPr lang="en-US" sz="1200" b="1" dirty="0">
+              <a:solidFill>
+                <a:schemeClr val="bg1"/>
+              </a:solidFill>
+            </a:endParaRPr>
+          </a:p>
+        </p:txBody>
+      </p:sp>
+      <p:sp>
+        <p:nvSpPr>
+          <p:cNvPr id="9" name="TextBox 8"/>
+          <p:cNvSpPr txBox="1"/>
+          <p:nvPr/>
+        </p:nvSpPr>
+        <p:spPr>
+          <a:xfrm>
+            <a:off x="5244860" y="3813831"/>
+            <a:ext cx="5417389" cy="1754326"/>
+          </a:xfrm>
+          <a:prstGeom prst="rect">
+            <a:avLst/>
+          </a:prstGeom>
+          <a:noFill/>
+        </p:spPr>
+        <p:txBody>
+          <a:bodyPr wrap="square" rtlCol="0">
+            <a:spAutoFit/>
+          </a:bodyPr>
+          <a:lstStyle/>
+          <a:p>
+            <a:pPr marL="285750" indent="-285750">
+              <a:buFont typeface="Arial" panose="020B0604020202020204" pitchFamily="34" charset="0"/>
+              <a:buChar char="•"/>
+            </a:pPr>
+            <a:r>
+              <a:rPr lang="en-US" dirty="0" smtClean="0"/>
+              <a:t>The market has much greater volatility before May </a:t>
+            </a:r>
+          </a:p>
+          <a:p>
+            <a:pPr marL="285750" indent="-285750">
+              <a:buFont typeface="Arial" panose="020B0604020202020204" pitchFamily="34" charset="0"/>
+              <a:buChar char="•"/>
+            </a:pPr>
+            <a:r>
+              <a:rPr lang="en-US" dirty="0" smtClean="0"/>
+              <a:t>The outlier </a:t>
+            </a:r>
             <a:r>
               <a:rPr lang="en-US" dirty="0"/>
-              <a:t>Questions?</a:t>
-            </a:r>
-          </a:p>
-        </p:txBody>
-      </p:sp>
-      <p:sp>
-        <p:nvSpPr>
-          <p:cNvPr id="3" name="Text Placeholder 2"/>
-          <p:cNvSpPr>
-            <a:spLocks noGrp="1"/>
-          </p:cNvSpPr>
-          <p:nvPr>
-            <p:ph type="body" idx="1"/>
-          </p:nvPr>
-        </p:nvSpPr>
-        <p:spPr>
-          <a:xfrm>
-            <a:off x="684212" y="4830792"/>
-            <a:ext cx="9627229" cy="1163608"/>
-          </a:xfrm>
-        </p:spPr>
-        <p:txBody>
-          <a:bodyPr>
-            <a:normAutofit/>
-          </a:bodyPr>
-          <a:lstStyle/>
-          <a:p>
+              <a:t>Upper Bound is </a:t>
+            </a:r>
+            <a:r>
+              <a:rPr lang="en-US" dirty="0" smtClean="0"/>
+              <a:t>1.70, </a:t>
+            </a:r>
+            <a:r>
+              <a:rPr lang="en-US" dirty="0"/>
+              <a:t>and Lower Bound is </a:t>
+            </a:r>
+            <a:r>
+              <a:rPr lang="en-US" dirty="0" smtClean="0"/>
+              <a:t>-1.50 after May.</a:t>
+            </a:r>
+          </a:p>
+          <a:p>
+            <a:pPr marL="285750" indent="-285750">
+              <a:buFont typeface="Arial" panose="020B0604020202020204" pitchFamily="34" charset="0"/>
+              <a:buChar char="•"/>
+            </a:pPr>
+            <a:r>
+              <a:rPr lang="en-US" dirty="0"/>
+              <a:t>The </a:t>
+            </a:r>
+            <a:r>
+              <a:rPr lang="en-US" dirty="0" smtClean="0"/>
+              <a:t>outlier </a:t>
+            </a:r>
+            <a:r>
+              <a:rPr lang="en-US" dirty="0"/>
+              <a:t>Upper Bound is </a:t>
+            </a:r>
+            <a:r>
+              <a:rPr lang="en-US" dirty="0" smtClean="0"/>
+              <a:t>2.79, </a:t>
+            </a:r>
+            <a:r>
+              <a:rPr lang="en-US" dirty="0"/>
+              <a:t>and Lower Bound is </a:t>
+            </a:r>
+            <a:r>
+              <a:rPr lang="en-US" dirty="0" smtClean="0"/>
+              <a:t>-3.03 before May</a:t>
+            </a:r>
             <a:endParaRPr lang="en-US" dirty="0"/>
           </a:p>
         </p:txBody>
@@ -6877,13 +7463,20 @@
     </p:spTree>
     <p:extLst>
       <p:ext uri="{BB962C8B-B14F-4D97-AF65-F5344CB8AC3E}">
-        <p14:creationId xmlns:p14="http://schemas.microsoft.com/office/powerpoint/2010/main" val="1775056545"/>
+        <p14:creationId xmlns:p14="http://schemas.microsoft.com/office/powerpoint/2010/main" val="1522517010"/>
       </p:ext>
     </p:extLst>
   </p:cSld>
   <p:clrMapOvr>
     <a:masterClrMapping/>
   </p:clrMapOvr>
+  <p:timing>
+    <p:tnLst>
+      <p:par>
+        <p:cTn id="1" dur="indefinite" restart="never" nodeType="tmRoot"/>
+      </p:par>
+    </p:tnLst>
+  </p:timing>
 </p:sld>
 </file>
 

</xml_diff>

<commit_message>
updated ppt file for question 3 section
</commit_message>
<xml_diff>
--- a/Project1.pptx
+++ b/Project1.pptx
@@ -317,7 +317,7 @@
             <a:fld id="{B61BEF0D-F0BB-DE4B-95CE-6DB70DBA9567}" type="datetimeFigureOut">
               <a:rPr lang="en-US" dirty="0"/>
               <a:pPr/>
-              <a:t>5/1/2021</a:t>
+              <a:t>5/3/2021</a:t>
             </a:fld>
             <a:endParaRPr lang="en-US" dirty="0"/>
           </a:p>
@@ -750,7 +750,7 @@
             <a:fld id="{B61BEF0D-F0BB-DE4B-95CE-6DB70DBA9567}" type="datetimeFigureOut">
               <a:rPr lang="en-US" dirty="0"/>
               <a:pPr/>
-              <a:t>5/1/2021</a:t>
+              <a:t>5/3/2021</a:t>
             </a:fld>
             <a:endParaRPr lang="en-US" dirty="0"/>
           </a:p>
@@ -997,7 +997,7 @@
             <a:fld id="{B61BEF0D-F0BB-DE4B-95CE-6DB70DBA9567}" type="datetimeFigureOut">
               <a:rPr lang="en-US" dirty="0"/>
               <a:pPr/>
-              <a:t>5/1/2021</a:t>
+              <a:t>5/3/2021</a:t>
             </a:fld>
             <a:endParaRPr lang="en-US" dirty="0"/>
           </a:p>
@@ -1302,7 +1302,7 @@
             <a:fld id="{B61BEF0D-F0BB-DE4B-95CE-6DB70DBA9567}" type="datetimeFigureOut">
               <a:rPr lang="en-US" dirty="0"/>
               <a:pPr/>
-              <a:t>5/1/2021</a:t>
+              <a:t>5/3/2021</a:t>
             </a:fld>
             <a:endParaRPr lang="en-US" dirty="0"/>
           </a:p>
@@ -1617,7 +1617,7 @@
             <a:fld id="{B61BEF0D-F0BB-DE4B-95CE-6DB70DBA9567}" type="datetimeFigureOut">
               <a:rPr lang="en-US" dirty="0"/>
               <a:pPr/>
-              <a:t>5/1/2021</a:t>
+              <a:t>5/3/2021</a:t>
             </a:fld>
             <a:endParaRPr lang="en-US" dirty="0"/>
           </a:p>
@@ -1916,7 +1916,7 @@
             <a:fld id="{B61BEF0D-F0BB-DE4B-95CE-6DB70DBA9567}" type="datetimeFigureOut">
               <a:rPr lang="en-US" dirty="0"/>
               <a:pPr/>
-              <a:t>5/1/2021</a:t>
+              <a:t>5/3/2021</a:t>
             </a:fld>
             <a:endParaRPr lang="en-US" dirty="0"/>
           </a:p>
@@ -2280,7 +2280,7 @@
             <a:fld id="{B61BEF0D-F0BB-DE4B-95CE-6DB70DBA9567}" type="datetimeFigureOut">
               <a:rPr lang="en-US" dirty="0"/>
               <a:pPr/>
-              <a:t>5/1/2021</a:t>
+              <a:t>5/3/2021</a:t>
             </a:fld>
             <a:endParaRPr lang="en-US" dirty="0"/>
           </a:p>
@@ -2451,7 +2451,7 @@
             <a:fld id="{B61BEF0D-F0BB-DE4B-95CE-6DB70DBA9567}" type="datetimeFigureOut">
               <a:rPr lang="en-US" dirty="0"/>
               <a:pPr/>
-              <a:t>5/1/2021</a:t>
+              <a:t>5/3/2021</a:t>
             </a:fld>
             <a:endParaRPr lang="en-US" dirty="0"/>
           </a:p>
@@ -2628,7 +2628,7 @@
             <a:fld id="{B61BEF0D-F0BB-DE4B-95CE-6DB70DBA9567}" type="datetimeFigureOut">
               <a:rPr lang="en-US" dirty="0"/>
               <a:pPr/>
-              <a:t>5/1/2021</a:t>
+              <a:t>5/3/2021</a:t>
             </a:fld>
             <a:endParaRPr lang="en-US" dirty="0"/>
           </a:p>
@@ -2795,7 +2795,7 @@
             <a:fld id="{B61BEF0D-F0BB-DE4B-95CE-6DB70DBA9567}" type="datetimeFigureOut">
               <a:rPr lang="en-US" dirty="0"/>
               <a:pPr/>
-              <a:t>5/1/2021</a:t>
+              <a:t>5/3/2021</a:t>
             </a:fld>
             <a:endParaRPr lang="en-US" dirty="0"/>
           </a:p>
@@ -3042,7 +3042,7 @@
             <a:fld id="{B61BEF0D-F0BB-DE4B-95CE-6DB70DBA9567}" type="datetimeFigureOut">
               <a:rPr lang="en-US" dirty="0"/>
               <a:pPr/>
-              <a:t>5/1/2021</a:t>
+              <a:t>5/3/2021</a:t>
             </a:fld>
             <a:endParaRPr lang="en-US" dirty="0"/>
           </a:p>
@@ -3275,7 +3275,7 @@
             <a:fld id="{B61BEF0D-F0BB-DE4B-95CE-6DB70DBA9567}" type="datetimeFigureOut">
               <a:rPr lang="en-US" dirty="0"/>
               <a:pPr/>
-              <a:t>5/1/2021</a:t>
+              <a:t>5/3/2021</a:t>
             </a:fld>
             <a:endParaRPr lang="en-US" dirty="0"/>
           </a:p>
@@ -3654,7 +3654,7 @@
             <a:fld id="{B61BEF0D-F0BB-DE4B-95CE-6DB70DBA9567}" type="datetimeFigureOut">
               <a:rPr lang="en-US" dirty="0"/>
               <a:pPr/>
-              <a:t>5/1/2021</a:t>
+              <a:t>5/3/2021</a:t>
             </a:fld>
             <a:endParaRPr lang="en-US" dirty="0"/>
           </a:p>
@@ -3769,7 +3769,7 @@
             <a:fld id="{B61BEF0D-F0BB-DE4B-95CE-6DB70DBA9567}" type="datetimeFigureOut">
               <a:rPr lang="en-US" dirty="0"/>
               <a:pPr/>
-              <a:t>5/1/2021</a:t>
+              <a:t>5/3/2021</a:t>
             </a:fld>
             <a:endParaRPr lang="en-US" dirty="0"/>
           </a:p>
@@ -3861,7 +3861,7 @@
             <a:fld id="{B61BEF0D-F0BB-DE4B-95CE-6DB70DBA9567}" type="datetimeFigureOut">
               <a:rPr lang="en-US" dirty="0"/>
               <a:pPr/>
-              <a:t>5/1/2021</a:t>
+              <a:t>5/3/2021</a:t>
             </a:fld>
             <a:endParaRPr lang="en-US" dirty="0"/>
           </a:p>
@@ -4113,7 +4113,7 @@
             <a:fld id="{B61BEF0D-F0BB-DE4B-95CE-6DB70DBA9567}" type="datetimeFigureOut">
               <a:rPr lang="en-US" dirty="0"/>
               <a:pPr/>
-              <a:t>5/1/2021</a:t>
+              <a:t>5/3/2021</a:t>
             </a:fld>
             <a:endParaRPr lang="en-US" dirty="0"/>
           </a:p>
@@ -4393,7 +4393,7 @@
             <a:fld id="{B61BEF0D-F0BB-DE4B-95CE-6DB70DBA9567}" type="datetimeFigureOut">
               <a:rPr lang="en-US" dirty="0"/>
               <a:pPr/>
-              <a:t>5/1/2021</a:t>
+              <a:t>5/3/2021</a:t>
             </a:fld>
             <a:endParaRPr lang="en-US" dirty="0"/>
           </a:p>
@@ -4796,7 +4796,7 @@
             <a:fld id="{B61BEF0D-F0BB-DE4B-95CE-6DB70DBA9567}" type="datetimeFigureOut">
               <a:rPr lang="en-US" dirty="0"/>
               <a:pPr/>
-              <a:t>5/1/2021</a:t>
+              <a:t>5/3/2021</a:t>
             </a:fld>
             <a:endParaRPr lang="en-US" dirty="0"/>
           </a:p>
@@ -7279,7 +7279,7 @@
                   <a:schemeClr val="bg1"/>
                 </a:solidFill>
               </a:rPr>
-              <a:t>The correlation between NASDAQ and US Covid Deaths is 0.59</a:t>
+              <a:t>The correlation between daily NASDAQ change and US Covid Deaths is -0.01.</a:t>
             </a:r>
           </a:p>
           <a:p>
@@ -7296,7 +7296,7 @@
                   <a:schemeClr val="bg1"/>
                 </a:solidFill>
               </a:rPr>
-              <a:t>The correlation between the S&amp;P 500 and US Covid Deaths is 0.52</a:t>
+              <a:t>The correlation between daily S&amp;P 500 change and US Covid Deaths is -0.04.</a:t>
             </a:r>
           </a:p>
           <a:p>
@@ -7313,7 +7313,7 @@
                   <a:schemeClr val="bg1"/>
                 </a:solidFill>
               </a:rPr>
-              <a:t>The correlation between the DOW and US Covid Deaths is 0.45</a:t>
+              <a:t>The correlation between daily DOW change and US Covid Deaths is 0.0.</a:t>
             </a:r>
           </a:p>
         </p:txBody>
@@ -7543,7 +7543,7 @@
                   <a:schemeClr val="bg1"/>
                 </a:solidFill>
               </a:rPr>
-              <a:t>The correlation between NASDAQ and Global Covid Deaths is 0.77</a:t>
+              <a:t>The correlation between daily NASDAQ change and Global Covid Deaths is 0.01.</a:t>
             </a:r>
           </a:p>
           <a:p>
@@ -7560,7 +7560,7 @@
                   <a:schemeClr val="bg1"/>
                 </a:solidFill>
               </a:rPr>
-              <a:t>The correlation between the S&amp;P 500 and Global Covid Deaths is 0.69</a:t>
+              <a:t>The correlation between daily S&amp;P 500 change and Global Covid Deaths is -0.05.</a:t>
             </a:r>
           </a:p>
           <a:p>
@@ -7577,7 +7577,7 @@
                   <a:schemeClr val="bg1"/>
                 </a:solidFill>
               </a:rPr>
-              <a:t>The correlation between the DOW and US Global Deaths is 0.61</a:t>
+              <a:t>The correlation between daily DOW change and US Global Deaths is -0.05</a:t>
             </a:r>
           </a:p>
         </p:txBody>
@@ -7697,7 +7697,7 @@
         </p:spPr>
         <p:txBody>
           <a:bodyPr>
-            <a:normAutofit fontScale="92500"/>
+            <a:normAutofit/>
           </a:bodyPr>
           <a:lstStyle/>
           <a:p>
@@ -7716,56 +7716,6 @@
                 </a:solidFill>
               </a:rPr>
               <a:t>:</a:t>
-            </a:r>
-          </a:p>
-          <a:p>
-            <a:r>
-              <a:rPr lang="en-US" dirty="0">
-                <a:solidFill>
-                  <a:schemeClr val="bg1"/>
-                </a:solidFill>
-              </a:rPr>
-              <a:t>Initially, I was expecting a greater correlation between the number of covid deaths and the stock market.  I was expecting that the greater the number of deaths, the lower the stock market would be.</a:t>
-            </a:r>
-          </a:p>
-          <a:p>
-            <a:r>
-              <a:rPr lang="en-US" dirty="0">
-                <a:solidFill>
-                  <a:schemeClr val="bg1"/>
-                </a:solidFill>
-              </a:rPr>
-              <a:t>Using US only covid data at first, I noticed that at the very beginning of the pandemic, the stock market did start to drop right away, however it dropped the most before US deaths really started.  This drop in the stock market in the first month not as closely tied to actual death numbers as I assumed it would be.</a:t>
-            </a:r>
-          </a:p>
-          <a:p>
-            <a:r>
-              <a:rPr lang="en-US" dirty="0">
-                <a:solidFill>
-                  <a:schemeClr val="bg1"/>
-                </a:solidFill>
-              </a:rPr>
-              <a:t>Since the US was not the first country to have covid exposure, I decided to go back and run the numbers again using global covid death data.  This did show a closer correlation for about the first month than using just US data did.</a:t>
-            </a:r>
-          </a:p>
-          <a:p>
-            <a:r>
-              <a:rPr lang="en-US" dirty="0">
-                <a:solidFill>
-                  <a:schemeClr val="bg1"/>
-                </a:solidFill>
-              </a:rPr>
-              <a:t>However, in late March 2020 as the deaths continued to climb, the stock market started to go back up.  The stock market continued to basically go up from that time forward regardless of the covid death counts.  During the big global covid death spike that started around November 2020 and continued into January 2021, the stock market actually went up consistently (which is the opposite of what happened at the beginning of the pandemic).</a:t>
-            </a:r>
-          </a:p>
-          <a:p>
-            <a:r>
-              <a:rPr lang="en-US" dirty="0">
-                <a:solidFill>
-                  <a:schemeClr val="bg1"/>
-                </a:solidFill>
-              </a:rPr>
-              <a:t>My final conclusion is that other than the initial onset of the global pandemic, the number of covid deaths did not affect the stock market in a major way.</a:t>
             </a:r>
           </a:p>
         </p:txBody>

</xml_diff>

<commit_message>
updated ppt again for question 3 conclusion
</commit_message>
<xml_diff>
--- a/Project1.pptx
+++ b/Project1.pptx
@@ -7697,7 +7697,7 @@
         </p:spPr>
         <p:txBody>
           <a:bodyPr>
-            <a:normAutofit/>
+            <a:normAutofit fontScale="92500" lnSpcReduction="10000"/>
           </a:bodyPr>
           <a:lstStyle/>
           <a:p>
@@ -7707,15 +7707,80 @@
                   <a:schemeClr val="bg1"/>
                 </a:solidFill>
               </a:rPr>
-              <a:t>Conclusion</a:t>
-            </a:r>
+              <a:t>Question:</a:t>
+            </a:r>
+          </a:p>
+          <a:p>
             <a:r>
               <a:rPr lang="en-US" dirty="0">
                 <a:solidFill>
                   <a:schemeClr val="bg1"/>
                 </a:solidFill>
               </a:rPr>
-              <a:t>:</a:t>
+              <a:t>Did the daily number of covid deaths correlate with the daily performance of the stock market?</a:t>
+            </a:r>
+          </a:p>
+          <a:p>
+            <a:r>
+              <a:rPr lang="en-US" b="1" dirty="0">
+                <a:solidFill>
+                  <a:schemeClr val="bg1"/>
+                </a:solidFill>
+              </a:rPr>
+              <a:t>Analysis:</a:t>
+            </a:r>
+          </a:p>
+          <a:p>
+            <a:pPr lvl="1"/>
+            <a:r>
+              <a:rPr lang="en-US" dirty="0">
+                <a:solidFill>
+                  <a:schemeClr val="bg1"/>
+                </a:solidFill>
+              </a:rPr>
+              <a:t>Initially the assumption was that there would be some correlation between a greater number of covid deaths and a lower stock market performance.</a:t>
+            </a:r>
+          </a:p>
+          <a:p>
+            <a:pPr lvl="1"/>
+            <a:r>
+              <a:rPr lang="en-US" dirty="0">
+                <a:solidFill>
+                  <a:schemeClr val="bg1"/>
+                </a:solidFill>
+              </a:rPr>
+              <a:t>Comparing the US covid death data and the stock market showed that there was almost no correlation.  The stock marked start to drop in the beginning, but almost all of this drop was before the US deaths started.</a:t>
+            </a:r>
+          </a:p>
+          <a:p>
+            <a:pPr lvl="1"/>
+            <a:r>
+              <a:rPr lang="en-US" dirty="0">
+                <a:solidFill>
+                  <a:schemeClr val="bg1"/>
+                </a:solidFill>
+              </a:rPr>
+              <a:t>Since the US was not the first country to have covid exposure, the next step was to compare global covid deaths with stock market performance.  The global data did show more of a correlation for about the first month of the pandemic.  However, from that point forward the stock market generally went up regardless of higher or lower global covid deaths.  There was a spike in global deaths from November 2020 through January 2021, but the stock market continued to go up during that period (which is the opposite of what was seen in the first month of the pandemic).</a:t>
+            </a:r>
+          </a:p>
+          <a:p>
+            <a:r>
+              <a:rPr lang="en-US" b="1" dirty="0">
+                <a:solidFill>
+                  <a:schemeClr val="bg1"/>
+                </a:solidFill>
+              </a:rPr>
+              <a:t>Conclusion:</a:t>
+            </a:r>
+          </a:p>
+          <a:p>
+            <a:r>
+              <a:rPr lang="en-US" dirty="0">
+                <a:solidFill>
+                  <a:schemeClr val="bg1"/>
+                </a:solidFill>
+              </a:rPr>
+              <a:t>Over the first year of the pandemic, it does not appear that there was a direct correlation, with the possible exception of the first month.</a:t>
             </a:r>
           </a:p>
         </p:txBody>

</xml_diff>

<commit_message>
Slides modified in preditcion section
</commit_message>
<xml_diff>
--- a/Project1.pptx
+++ b/Project1.pptx
@@ -8,9 +8,9 @@
     <p:sldId id="256" r:id="rId2"/>
     <p:sldId id="257" r:id="rId3"/>
     <p:sldId id="259" r:id="rId4"/>
-    <p:sldId id="262" r:id="rId5"/>
-    <p:sldId id="270" r:id="rId6"/>
-    <p:sldId id="271" r:id="rId7"/>
+    <p:sldId id="272" r:id="rId5"/>
+    <p:sldId id="262" r:id="rId6"/>
+    <p:sldId id="270" r:id="rId7"/>
     <p:sldId id="263" r:id="rId8"/>
     <p:sldId id="265" r:id="rId9"/>
     <p:sldId id="266" r:id="rId10"/>
@@ -6559,123 +6559,12 @@
           <a:chExt cx="0" cy="0"/>
         </a:xfrm>
       </p:grpSpPr>
-      <p:sp>
-        <p:nvSpPr>
-          <p:cNvPr id="2" name="Title 1"/>
-          <p:cNvSpPr>
-            <a:spLocks noGrp="1"/>
-          </p:cNvSpPr>
-          <p:nvPr>
-            <p:ph type="title"/>
-          </p:nvPr>
-        </p:nvSpPr>
-        <p:spPr>
-          <a:xfrm>
-            <a:off x="684212" y="154797"/>
-            <a:ext cx="11225992" cy="1242682"/>
-          </a:xfrm>
-        </p:spPr>
-        <p:txBody>
-          <a:bodyPr>
-            <a:normAutofit fontScale="90000"/>
-          </a:bodyPr>
-          <a:lstStyle/>
-          <a:p>
-            <a:r>
-              <a:rPr lang="en-US"/>
-              <a:t>Question 2: Can we predict the market for the next three weeks using Linear Regression or Polynomial Regression?</a:t>
-            </a:r>
-            <a:endParaRPr lang="en-US" dirty="0"/>
-          </a:p>
-        </p:txBody>
-      </p:sp>
-      <p:sp>
-        <p:nvSpPr>
-          <p:cNvPr id="3" name="Text Placeholder 2"/>
-          <p:cNvSpPr>
-            <a:spLocks noGrp="1"/>
-          </p:cNvSpPr>
-          <p:nvPr>
-            <p:ph type="body" idx="1"/>
-          </p:nvPr>
-        </p:nvSpPr>
-        <p:spPr>
-          <a:xfrm>
-            <a:off x="7115410" y="1474287"/>
-            <a:ext cx="4794794" cy="4794628"/>
-          </a:xfrm>
-        </p:spPr>
-        <p:txBody>
-          <a:bodyPr>
-            <a:normAutofit/>
-          </a:bodyPr>
-          <a:lstStyle/>
-          <a:p>
-            <a:r>
-              <a:rPr lang="en-US" dirty="0">
-                <a:solidFill>
-                  <a:schemeClr val="tx1"/>
-                </a:solidFill>
-              </a:rPr>
-              <a:t>Although we have a prediction value as shown, what would another large drop have done to our trendline?</a:t>
-            </a:r>
-          </a:p>
-          <a:p>
-            <a:endParaRPr lang="en-US" dirty="0">
-              <a:solidFill>
-                <a:schemeClr val="tx1"/>
-              </a:solidFill>
-            </a:endParaRPr>
-          </a:p>
-          <a:p>
-            <a:r>
-              <a:rPr lang="en-US" dirty="0">
-                <a:solidFill>
-                  <a:schemeClr val="tx1"/>
-                </a:solidFill>
-              </a:rPr>
-              <a:t>The accuracy for this type of model is 63%.</a:t>
-            </a:r>
-          </a:p>
-          <a:p>
-            <a:endParaRPr lang="en-US" dirty="0">
-              <a:solidFill>
-                <a:schemeClr val="tx1"/>
-              </a:solidFill>
-            </a:endParaRPr>
-          </a:p>
-          <a:p>
-            <a:r>
-              <a:rPr lang="en-US" dirty="0">
-                <a:solidFill>
-                  <a:schemeClr val="tx1"/>
-                </a:solidFill>
-              </a:rPr>
-              <a:t>If we started making our prediction after the dip/March-2020 then our prediction would be more accurate.</a:t>
-            </a:r>
-          </a:p>
-          <a:p>
-            <a:endParaRPr lang="en-US" dirty="0">
-              <a:solidFill>
-                <a:schemeClr val="bg1"/>
-              </a:solidFill>
-            </a:endParaRPr>
-          </a:p>
-          <a:p>
-            <a:endParaRPr lang="en-US" dirty="0">
-              <a:solidFill>
-                <a:schemeClr val="bg1"/>
-              </a:solidFill>
-            </a:endParaRPr>
-          </a:p>
-        </p:txBody>
-      </p:sp>
       <p:pic>
         <p:nvPicPr>
-          <p:cNvPr id="5" name="Picture 4" descr="Chart, line chart&#10;&#10;Description automatically generated">
+          <p:cNvPr id="5" name="Picture 4">
             <a:extLst>
               <a:ext uri="{FF2B5EF4-FFF2-40B4-BE49-F238E27FC236}">
-                <a16:creationId xmlns:a16="http://schemas.microsoft.com/office/drawing/2014/main" id="{5518163D-1008-4916-9DD4-085D43F88D3D}"/>
+                <a16:creationId xmlns:a16="http://schemas.microsoft.com/office/drawing/2014/main" id="{9CE29964-C462-4B09-848E-C9C1E4DEC2AD}"/>
               </a:ext>
             </a:extLst>
           </p:cNvPr>
@@ -6692,48 +6581,53 @@
         </p:blipFill>
         <p:spPr>
           <a:xfrm>
-            <a:off x="-495177" y="1397479"/>
-            <a:ext cx="8362480" cy="4181240"/>
+            <a:off x="839666" y="1138684"/>
+            <a:ext cx="10401302" cy="5380813"/>
           </a:xfrm>
           <a:prstGeom prst="rect">
             <a:avLst/>
           </a:prstGeom>
         </p:spPr>
       </p:pic>
-      <p:pic>
-        <p:nvPicPr>
-          <p:cNvPr id="7" name="Picture 6">
+      <p:sp>
+        <p:nvSpPr>
+          <p:cNvPr id="7" name="TextBox 6">
             <a:extLst>
               <a:ext uri="{FF2B5EF4-FFF2-40B4-BE49-F238E27FC236}">
-                <a16:creationId xmlns:a16="http://schemas.microsoft.com/office/drawing/2014/main" id="{DF30E173-6C1B-41E6-B648-0CCEDFBFDB79}"/>
+                <a16:creationId xmlns:a16="http://schemas.microsoft.com/office/drawing/2014/main" id="{10515BEC-70E9-4D92-8077-14BEB1024A77}"/>
               </a:ext>
             </a:extLst>
           </p:cNvPr>
-          <p:cNvPicPr>
-            <a:picLocks noChangeAspect="1"/>
-          </p:cNvPicPr>
+          <p:cNvSpPr txBox="1"/>
           <p:nvPr/>
-        </p:nvPicPr>
-        <p:blipFill>
-          <a:blip r:embed="rId3"/>
-          <a:stretch>
-            <a:fillRect/>
-          </a:stretch>
-        </p:blipFill>
-        <p:spPr>
-          <a:xfrm>
-            <a:off x="684212" y="5431799"/>
-            <a:ext cx="6229371" cy="293839"/>
+        </p:nvSpPr>
+        <p:spPr>
+          <a:xfrm>
+            <a:off x="1756265" y="215344"/>
+            <a:ext cx="9484703" cy="830997"/>
           </a:xfrm>
           <a:prstGeom prst="rect">
             <a:avLst/>
           </a:prstGeom>
-        </p:spPr>
-      </p:pic>
+          <a:noFill/>
+        </p:spPr>
+        <p:txBody>
+          <a:bodyPr wrap="square">
+            <a:spAutoFit/>
+          </a:bodyPr>
+          <a:lstStyle/>
+          <a:p>
+            <a:r>
+              <a:rPr lang="en-US" sz="2400" dirty="0"/>
+              <a:t>Question 2: Can we predict the market for the next three weeks using Linear Regression or Polynomial Regression?</a:t>
+            </a:r>
+          </a:p>
+        </p:txBody>
+      </p:sp>
     </p:spTree>
     <p:extLst>
       <p:ext uri="{BB962C8B-B14F-4D97-AF65-F5344CB8AC3E}">
-        <p14:creationId xmlns:p14="http://schemas.microsoft.com/office/powerpoint/2010/main" val="1991492134"/>
+        <p14:creationId xmlns:p14="http://schemas.microsoft.com/office/powerpoint/2010/main" val="2301200173"/>
       </p:ext>
     </p:extLst>
   </p:cSld>
@@ -6762,13 +6656,7 @@
       </p:grpSpPr>
       <p:sp>
         <p:nvSpPr>
-          <p:cNvPr id="2" name="Title 1">
-            <a:extLst>
-              <a:ext uri="{FF2B5EF4-FFF2-40B4-BE49-F238E27FC236}">
-                <a16:creationId xmlns:a16="http://schemas.microsoft.com/office/drawing/2014/main" id="{47287D70-E8D8-45FF-A602-278B17EDAA4F}"/>
-              </a:ext>
-            </a:extLst>
-          </p:cNvPr>
+          <p:cNvPr id="2" name="Title 1"/>
           <p:cNvSpPr>
             <a:spLocks noGrp="1"/>
           </p:cNvSpPr>
@@ -6778,45 +6666,43 @@
         </p:nvSpPr>
         <p:spPr>
           <a:xfrm>
-            <a:off x="6948522" y="-157842"/>
-            <a:ext cx="6019800" cy="1143000"/>
-          </a:xfrm>
-        </p:spPr>
-        <p:txBody>
-          <a:bodyPr/>
+            <a:off x="684212" y="154797"/>
+            <a:ext cx="11225992" cy="1242682"/>
+          </a:xfrm>
+        </p:spPr>
+        <p:txBody>
+          <a:bodyPr>
+            <a:normAutofit/>
+          </a:bodyPr>
           <a:lstStyle/>
           <a:p>
             <a:r>
               <a:rPr lang="en-US" dirty="0"/>
-              <a:t>Polynomial regression</a:t>
-            </a:r>
-          </a:p>
-        </p:txBody>
-      </p:sp>
-      <p:sp>
-        <p:nvSpPr>
-          <p:cNvPr id="4" name="Text Placeholder 3">
-            <a:extLst>
-              <a:ext uri="{FF2B5EF4-FFF2-40B4-BE49-F238E27FC236}">
-                <a16:creationId xmlns:a16="http://schemas.microsoft.com/office/drawing/2014/main" id="{508CB0EF-3688-4243-9320-D37CAB7BF1B7}"/>
-              </a:ext>
-            </a:extLst>
-          </p:cNvPr>
-          <p:cNvSpPr>
-            <a:spLocks noGrp="1"/>
-          </p:cNvSpPr>
-          <p:nvPr>
-            <p:ph type="body" sz="half" idx="2"/>
-          </p:nvPr>
-        </p:nvSpPr>
-        <p:spPr>
-          <a:xfrm>
-            <a:off x="6370654" y="1183333"/>
-            <a:ext cx="5776877" cy="4661655"/>
-          </a:xfrm>
-        </p:spPr>
-        <p:txBody>
-          <a:bodyPr/>
+              <a:t>Linear Regression</a:t>
+            </a:r>
+          </a:p>
+        </p:txBody>
+      </p:sp>
+      <p:sp>
+        <p:nvSpPr>
+          <p:cNvPr id="3" name="Text Placeholder 2"/>
+          <p:cNvSpPr>
+            <a:spLocks noGrp="1"/>
+          </p:cNvSpPr>
+          <p:nvPr>
+            <p:ph type="body" idx="1"/>
+          </p:nvPr>
+        </p:nvSpPr>
+        <p:spPr>
+          <a:xfrm>
+            <a:off x="7115410" y="1474287"/>
+            <a:ext cx="4794794" cy="4794628"/>
+          </a:xfrm>
+        </p:spPr>
+        <p:txBody>
+          <a:bodyPr>
+            <a:normAutofit/>
+          </a:bodyPr>
           <a:lstStyle/>
           <a:p>
             <a:r>
@@ -6825,7 +6711,7 @@
                   <a:schemeClr val="tx1"/>
                 </a:solidFill>
               </a:rPr>
-              <a:t>What is Polynomial Regression?</a:t>
+              <a:t>Although we have a prediction value as shown, what would another large drop have done to our trendline?</a:t>
             </a:r>
           </a:p>
           <a:p>
@@ -6842,7 +6728,7 @@
                   <a:schemeClr val="tx1"/>
                 </a:solidFill>
               </a:rPr>
-              <a:t>Degrees set to 3 in this model.</a:t>
+              <a:t>The accuracy for this type of model is 63%.</a:t>
             </a:r>
           </a:p>
           <a:p>
@@ -6859,45 +6745,31 @@
                   <a:schemeClr val="tx1"/>
                 </a:solidFill>
               </a:rPr>
-              <a:t>The accuracy using Polynomial Regression is 78% compared to the 63% from linear regression</a:t>
+              <a:t>If we started making our prediction after the dip/March-2020 then our prediction would be more accurate.</a:t>
             </a:r>
           </a:p>
           <a:p>
             <a:endParaRPr lang="en-US" dirty="0">
               <a:solidFill>
-                <a:schemeClr val="tx1"/>
+                <a:schemeClr val="bg1"/>
               </a:solidFill>
             </a:endParaRPr>
           </a:p>
           <a:p>
             <a:endParaRPr lang="en-US" dirty="0">
               <a:solidFill>
-                <a:schemeClr val="tx1"/>
+                <a:schemeClr val="bg1"/>
               </a:solidFill>
             </a:endParaRPr>
           </a:p>
-          <a:p>
-            <a:endParaRPr lang="en-US" dirty="0">
-              <a:solidFill>
-                <a:schemeClr val="tx1"/>
-              </a:solidFill>
-            </a:endParaRPr>
-          </a:p>
-          <a:p>
-            <a:endParaRPr lang="en-US" dirty="0">
-              <a:solidFill>
-                <a:schemeClr val="tx1"/>
-              </a:solidFill>
-            </a:endParaRPr>
-          </a:p>
         </p:txBody>
       </p:sp>
       <p:pic>
         <p:nvPicPr>
-          <p:cNvPr id="10" name="Picture 9" descr="Chart, histogram&#10;&#10;Description automatically generated">
+          <p:cNvPr id="5" name="Picture 4" descr="Chart, line chart&#10;&#10;Description automatically generated">
             <a:extLst>
               <a:ext uri="{FF2B5EF4-FFF2-40B4-BE49-F238E27FC236}">
-                <a16:creationId xmlns:a16="http://schemas.microsoft.com/office/drawing/2014/main" id="{54F1F3DD-29E8-439D-90EA-7CA53231F0EC}"/>
+                <a16:creationId xmlns:a16="http://schemas.microsoft.com/office/drawing/2014/main" id="{5518163D-1008-4916-9DD4-085D43F88D3D}"/>
               </a:ext>
             </a:extLst>
           </p:cNvPr>
@@ -6914,8 +6786,8 @@
         </p:blipFill>
         <p:spPr>
           <a:xfrm>
-            <a:off x="-764070" y="1444869"/>
-            <a:ext cx="7936523" cy="3968262"/>
+            <a:off x="-495177" y="1397479"/>
+            <a:ext cx="8362480" cy="4181240"/>
           </a:xfrm>
           <a:prstGeom prst="rect">
             <a:avLst/>
@@ -6924,10 +6796,10 @@
       </p:pic>
       <p:pic>
         <p:nvPicPr>
-          <p:cNvPr id="12" name="Picture 11">
+          <p:cNvPr id="7" name="Picture 6">
             <a:extLst>
               <a:ext uri="{FF2B5EF4-FFF2-40B4-BE49-F238E27FC236}">
-                <a16:creationId xmlns:a16="http://schemas.microsoft.com/office/drawing/2014/main" id="{61A22602-5AB0-44C4-B54B-898E3585569A}"/>
+                <a16:creationId xmlns:a16="http://schemas.microsoft.com/office/drawing/2014/main" id="{DF30E173-6C1B-41E6-B648-0CCEDFBFDB79}"/>
               </a:ext>
             </a:extLst>
           </p:cNvPr>
@@ -6944,8 +6816,8 @@
         </p:blipFill>
         <p:spPr>
           <a:xfrm>
-            <a:off x="2189711" y="5325036"/>
-            <a:ext cx="2272188" cy="425277"/>
+            <a:off x="684212" y="5431799"/>
+            <a:ext cx="6229371" cy="293839"/>
           </a:xfrm>
           <a:prstGeom prst="rect">
             <a:avLst/>
@@ -6955,7 +6827,7 @@
     </p:spTree>
     <p:extLst>
       <p:ext uri="{BB962C8B-B14F-4D97-AF65-F5344CB8AC3E}">
-        <p14:creationId xmlns:p14="http://schemas.microsoft.com/office/powerpoint/2010/main" val="44619690"/>
+        <p14:creationId xmlns:p14="http://schemas.microsoft.com/office/powerpoint/2010/main" val="1991492134"/>
       </p:ext>
     </p:extLst>
   </p:cSld>
@@ -6987,7 +6859,7 @@
           <p:cNvPr id="2" name="Title 1">
             <a:extLst>
               <a:ext uri="{FF2B5EF4-FFF2-40B4-BE49-F238E27FC236}">
-                <a16:creationId xmlns:a16="http://schemas.microsoft.com/office/drawing/2014/main" id="{9AB31560-5FA9-4C69-B818-8BEB4C8DCF2B}"/>
+                <a16:creationId xmlns:a16="http://schemas.microsoft.com/office/drawing/2014/main" id="{47287D70-E8D8-45FF-A602-278B17EDAA4F}"/>
               </a:ext>
             </a:extLst>
           </p:cNvPr>
@@ -7000,34 +6872,184 @@
         </p:nvSpPr>
         <p:spPr>
           <a:xfrm>
-            <a:off x="1057883" y="1846385"/>
-            <a:ext cx="10306173" cy="2268415"/>
-          </a:xfrm>
-        </p:spPr>
-        <p:txBody>
-          <a:bodyPr>
-            <a:normAutofit fontScale="90000"/>
-          </a:bodyPr>
+            <a:off x="6948522" y="-157842"/>
+            <a:ext cx="6019800" cy="1143000"/>
+          </a:xfrm>
+        </p:spPr>
+        <p:txBody>
+          <a:bodyPr/>
           <a:lstStyle/>
           <a:p>
             <a:r>
               <a:rPr lang="en-US" dirty="0"/>
-              <a:t>Conclusion: </a:t>
-            </a:r>
-            <a:br>
-              <a:rPr lang="en-US" dirty="0"/>
-            </a:br>
-            <a:r>
-              <a:rPr lang="en-US" dirty="0"/>
-              <a:t>polynomial Regression provides a more accurate prediction than linear regression but there are better machine learning models for predicting time-series data such as LSTM(Long Short Term Memory)</a:t>
-            </a:r>
-          </a:p>
-        </p:txBody>
-      </p:sp>
+              <a:t>Polynomial regression</a:t>
+            </a:r>
+          </a:p>
+        </p:txBody>
+      </p:sp>
+      <p:sp>
+        <p:nvSpPr>
+          <p:cNvPr id="4" name="Text Placeholder 3">
+            <a:extLst>
+              <a:ext uri="{FF2B5EF4-FFF2-40B4-BE49-F238E27FC236}">
+                <a16:creationId xmlns:a16="http://schemas.microsoft.com/office/drawing/2014/main" id="{508CB0EF-3688-4243-9320-D37CAB7BF1B7}"/>
+              </a:ext>
+            </a:extLst>
+          </p:cNvPr>
+          <p:cNvSpPr>
+            <a:spLocks noGrp="1"/>
+          </p:cNvSpPr>
+          <p:nvPr>
+            <p:ph type="body" sz="half" idx="2"/>
+          </p:nvPr>
+        </p:nvSpPr>
+        <p:spPr>
+          <a:xfrm>
+            <a:off x="6370654" y="1183333"/>
+            <a:ext cx="5776877" cy="4661655"/>
+          </a:xfrm>
+        </p:spPr>
+        <p:txBody>
+          <a:bodyPr/>
+          <a:lstStyle/>
+          <a:p>
+            <a:r>
+              <a:rPr lang="en-US" dirty="0">
+                <a:solidFill>
+                  <a:schemeClr val="tx1"/>
+                </a:solidFill>
+              </a:rPr>
+              <a:t>Polynomial Regression considers non-linear data, such as the stock market.</a:t>
+            </a:r>
+          </a:p>
+          <a:p>
+            <a:endParaRPr lang="en-US" dirty="0">
+              <a:solidFill>
+                <a:schemeClr val="tx1"/>
+              </a:solidFill>
+            </a:endParaRPr>
+          </a:p>
+          <a:p>
+            <a:r>
+              <a:rPr lang="en-US" dirty="0">
+                <a:solidFill>
+                  <a:schemeClr val="tx1"/>
+                </a:solidFill>
+              </a:rPr>
+              <a:t>Degrees set to 3 in this model.</a:t>
+            </a:r>
+          </a:p>
+          <a:p>
+            <a:endParaRPr lang="en-US" dirty="0">
+              <a:solidFill>
+                <a:schemeClr val="tx1"/>
+              </a:solidFill>
+            </a:endParaRPr>
+          </a:p>
+          <a:p>
+            <a:r>
+              <a:rPr lang="en-US" dirty="0">
+                <a:solidFill>
+                  <a:schemeClr val="tx1"/>
+                </a:solidFill>
+              </a:rPr>
+              <a:t>The accuracy using Polynomial Regression is 78% compared to the 63% from linear regression</a:t>
+            </a:r>
+          </a:p>
+          <a:p>
+            <a:endParaRPr lang="en-US" dirty="0">
+              <a:solidFill>
+                <a:schemeClr val="tx1"/>
+              </a:solidFill>
+            </a:endParaRPr>
+          </a:p>
+          <a:p>
+            <a:endParaRPr lang="en-US" dirty="0">
+              <a:solidFill>
+                <a:schemeClr val="tx1"/>
+              </a:solidFill>
+            </a:endParaRPr>
+          </a:p>
+          <a:p>
+            <a:endParaRPr lang="en-US" dirty="0">
+              <a:solidFill>
+                <a:schemeClr val="tx1"/>
+              </a:solidFill>
+            </a:endParaRPr>
+          </a:p>
+          <a:p>
+            <a:endParaRPr lang="en-US" dirty="0">
+              <a:solidFill>
+                <a:schemeClr val="tx1"/>
+              </a:solidFill>
+            </a:endParaRPr>
+          </a:p>
+        </p:txBody>
+      </p:sp>
+      <p:pic>
+        <p:nvPicPr>
+          <p:cNvPr id="10" name="Picture 9" descr="Chart, histogram&#10;&#10;Description automatically generated">
+            <a:extLst>
+              <a:ext uri="{FF2B5EF4-FFF2-40B4-BE49-F238E27FC236}">
+                <a16:creationId xmlns:a16="http://schemas.microsoft.com/office/drawing/2014/main" id="{54F1F3DD-29E8-439D-90EA-7CA53231F0EC}"/>
+              </a:ext>
+            </a:extLst>
+          </p:cNvPr>
+          <p:cNvPicPr>
+            <a:picLocks noChangeAspect="1"/>
+          </p:cNvPicPr>
+          <p:nvPr/>
+        </p:nvPicPr>
+        <p:blipFill>
+          <a:blip r:embed="rId2"/>
+          <a:stretch>
+            <a:fillRect/>
+          </a:stretch>
+        </p:blipFill>
+        <p:spPr>
+          <a:xfrm>
+            <a:off x="-764070" y="1444869"/>
+            <a:ext cx="7936523" cy="3968262"/>
+          </a:xfrm>
+          <a:prstGeom prst="rect">
+            <a:avLst/>
+          </a:prstGeom>
+        </p:spPr>
+      </p:pic>
+      <p:pic>
+        <p:nvPicPr>
+          <p:cNvPr id="12" name="Picture 11">
+            <a:extLst>
+              <a:ext uri="{FF2B5EF4-FFF2-40B4-BE49-F238E27FC236}">
+                <a16:creationId xmlns:a16="http://schemas.microsoft.com/office/drawing/2014/main" id="{61A22602-5AB0-44C4-B54B-898E3585569A}"/>
+              </a:ext>
+            </a:extLst>
+          </p:cNvPr>
+          <p:cNvPicPr>
+            <a:picLocks noChangeAspect="1"/>
+          </p:cNvPicPr>
+          <p:nvPr/>
+        </p:nvPicPr>
+        <p:blipFill>
+          <a:blip r:embed="rId3"/>
+          <a:stretch>
+            <a:fillRect/>
+          </a:stretch>
+        </p:blipFill>
+        <p:spPr>
+          <a:xfrm>
+            <a:off x="2189711" y="5325036"/>
+            <a:ext cx="2272188" cy="425277"/>
+          </a:xfrm>
+          <a:prstGeom prst="rect">
+            <a:avLst/>
+          </a:prstGeom>
+        </p:spPr>
+      </p:pic>
     </p:spTree>
     <p:extLst>
       <p:ext uri="{BB962C8B-B14F-4D97-AF65-F5344CB8AC3E}">
-        <p14:creationId xmlns:p14="http://schemas.microsoft.com/office/powerpoint/2010/main" val="2598162917"/>
+        <p14:creationId xmlns:p14="http://schemas.microsoft.com/office/powerpoint/2010/main" val="44619690"/>
       </p:ext>
     </p:extLst>
   </p:cSld>

</xml_diff>

<commit_message>
added question 1 slides
</commit_message>
<xml_diff>
--- a/Project1.pptx
+++ b/Project1.pptx
@@ -9,16 +9,18 @@
     <p:sldId id="257" r:id="rId3"/>
     <p:sldId id="259" r:id="rId4"/>
     <p:sldId id="272" r:id="rId5"/>
-    <p:sldId id="262" r:id="rId6"/>
-    <p:sldId id="270" r:id="rId7"/>
-    <p:sldId id="263" r:id="rId8"/>
-    <p:sldId id="265" r:id="rId9"/>
-    <p:sldId id="266" r:id="rId10"/>
-    <p:sldId id="264" r:id="rId11"/>
-    <p:sldId id="269" r:id="rId12"/>
-    <p:sldId id="268" r:id="rId13"/>
-    <p:sldId id="258" r:id="rId14"/>
-    <p:sldId id="261" r:id="rId15"/>
+    <p:sldId id="273" r:id="rId6"/>
+    <p:sldId id="262" r:id="rId7"/>
+    <p:sldId id="270" r:id="rId8"/>
+    <p:sldId id="271" r:id="rId9"/>
+    <p:sldId id="263" r:id="rId10"/>
+    <p:sldId id="265" r:id="rId11"/>
+    <p:sldId id="266" r:id="rId12"/>
+    <p:sldId id="264" r:id="rId13"/>
+    <p:sldId id="269" r:id="rId14"/>
+    <p:sldId id="268" r:id="rId15"/>
+    <p:sldId id="258" r:id="rId16"/>
+    <p:sldId id="261" r:id="rId17"/>
   </p:sldIdLst>
   <p:sldSz cx="12192000" cy="6858000"/>
   <p:notesSz cx="6858000" cy="9144000"/>
@@ -5479,6 +5481,473 @@
           <a:p>
             <a:r>
               <a:rPr lang="en-US" dirty="0"/>
+              <a:t>Question 3: How did the stock market perform in correlation to </a:t>
+            </a:r>
+            <a:r>
+              <a:rPr lang="en-US" dirty="0" err="1"/>
+              <a:t>covid</a:t>
+            </a:r>
+            <a:r>
+              <a:rPr lang="en-US" dirty="0"/>
+              <a:t> deaths?</a:t>
+            </a:r>
+          </a:p>
+        </p:txBody>
+      </p:sp>
+      <p:sp>
+        <p:nvSpPr>
+          <p:cNvPr id="3" name="Text Placeholder 2"/>
+          <p:cNvSpPr>
+            <a:spLocks noGrp="1"/>
+          </p:cNvSpPr>
+          <p:nvPr>
+            <p:ph type="body" idx="1"/>
+          </p:nvPr>
+        </p:nvSpPr>
+        <p:spPr>
+          <a:xfrm>
+            <a:off x="684213" y="1518249"/>
+            <a:ext cx="11047712" cy="5184954"/>
+          </a:xfrm>
+        </p:spPr>
+        <p:txBody>
+          <a:bodyPr>
+            <a:normAutofit/>
+          </a:bodyPr>
+          <a:lstStyle/>
+          <a:p>
+            <a:endParaRPr lang="en-US" dirty="0">
+              <a:solidFill>
+                <a:schemeClr val="bg1"/>
+              </a:solidFill>
+            </a:endParaRPr>
+          </a:p>
+          <a:p>
+            <a:endParaRPr lang="en-US" dirty="0">
+              <a:solidFill>
+                <a:schemeClr val="bg1"/>
+              </a:solidFill>
+            </a:endParaRPr>
+          </a:p>
+          <a:p>
+            <a:endParaRPr lang="en-US" dirty="0">
+              <a:solidFill>
+                <a:schemeClr val="bg1"/>
+              </a:solidFill>
+            </a:endParaRPr>
+          </a:p>
+          <a:p>
+            <a:endParaRPr lang="en-US" dirty="0">
+              <a:solidFill>
+                <a:schemeClr val="bg1"/>
+              </a:solidFill>
+            </a:endParaRPr>
+          </a:p>
+          <a:p>
+            <a:endParaRPr lang="en-US" dirty="0">
+              <a:solidFill>
+                <a:schemeClr val="bg1"/>
+              </a:solidFill>
+            </a:endParaRPr>
+          </a:p>
+          <a:p>
+            <a:endParaRPr lang="en-US" dirty="0">
+              <a:solidFill>
+                <a:schemeClr val="bg1"/>
+              </a:solidFill>
+            </a:endParaRPr>
+          </a:p>
+          <a:p>
+            <a:endParaRPr lang="en-US" dirty="0">
+              <a:solidFill>
+                <a:schemeClr val="bg1"/>
+              </a:solidFill>
+            </a:endParaRPr>
+          </a:p>
+          <a:p>
+            <a:endParaRPr lang="en-US" dirty="0">
+              <a:solidFill>
+                <a:schemeClr val="bg1"/>
+              </a:solidFill>
+            </a:endParaRPr>
+          </a:p>
+          <a:p>
+            <a:endParaRPr lang="en-US" dirty="0">
+              <a:solidFill>
+                <a:schemeClr val="bg1"/>
+              </a:solidFill>
+            </a:endParaRPr>
+          </a:p>
+          <a:p>
+            <a:endParaRPr lang="en-US" dirty="0">
+              <a:solidFill>
+                <a:schemeClr val="bg1"/>
+              </a:solidFill>
+            </a:endParaRPr>
+          </a:p>
+          <a:p>
+            <a:endParaRPr lang="en-US" dirty="0">
+              <a:solidFill>
+                <a:schemeClr val="bg1"/>
+              </a:solidFill>
+            </a:endParaRPr>
+          </a:p>
+          <a:p>
+            <a:endParaRPr lang="en-US" dirty="0">
+              <a:solidFill>
+                <a:schemeClr val="bg1"/>
+              </a:solidFill>
+            </a:endParaRPr>
+          </a:p>
+        </p:txBody>
+      </p:sp>
+      <p:sp>
+        <p:nvSpPr>
+          <p:cNvPr id="6" name="TextBox 5">
+            <a:extLst>
+              <a:ext uri="{FF2B5EF4-FFF2-40B4-BE49-F238E27FC236}">
+                <a16:creationId xmlns:a16="http://schemas.microsoft.com/office/drawing/2014/main" id="{82AFC9A5-1D8A-436E-8718-8EBCE4864537}"/>
+              </a:ext>
+            </a:extLst>
+          </p:cNvPr>
+          <p:cNvSpPr txBox="1"/>
+          <p:nvPr/>
+        </p:nvSpPr>
+        <p:spPr>
+          <a:xfrm>
+            <a:off x="7496432" y="1680519"/>
+            <a:ext cx="3682314" cy="3693319"/>
+          </a:xfrm>
+          <a:prstGeom prst="rect">
+            <a:avLst/>
+          </a:prstGeom>
+          <a:noFill/>
+        </p:spPr>
+        <p:txBody>
+          <a:bodyPr wrap="square" rtlCol="0">
+            <a:spAutoFit/>
+          </a:bodyPr>
+          <a:lstStyle/>
+          <a:p>
+            <a:r>
+              <a:rPr lang="en-US" dirty="0">
+                <a:solidFill>
+                  <a:schemeClr val="bg1"/>
+                </a:solidFill>
+              </a:rPr>
+              <a:t>For Global Covid Death Data:</a:t>
+            </a:r>
+          </a:p>
+          <a:p>
+            <a:endParaRPr lang="en-US" dirty="0">
+              <a:solidFill>
+                <a:schemeClr val="bg1"/>
+              </a:solidFill>
+            </a:endParaRPr>
+          </a:p>
+          <a:p>
+            <a:r>
+              <a:rPr lang="en-US" dirty="0">
+                <a:solidFill>
+                  <a:schemeClr val="bg1"/>
+                </a:solidFill>
+              </a:rPr>
+              <a:t>The correlation between daily NASDAQ change and Global Covid Deaths is 0.01.</a:t>
+            </a:r>
+          </a:p>
+          <a:p>
+            <a:endParaRPr lang="en-US" dirty="0">
+              <a:solidFill>
+                <a:schemeClr val="bg1"/>
+              </a:solidFill>
+            </a:endParaRPr>
+          </a:p>
+          <a:p>
+            <a:r>
+              <a:rPr lang="en-US" dirty="0">
+                <a:solidFill>
+                  <a:schemeClr val="bg1"/>
+                </a:solidFill>
+              </a:rPr>
+              <a:t>The correlation between daily S&amp;P 500 change and Global Covid Deaths is -0.05.</a:t>
+            </a:r>
+          </a:p>
+          <a:p>
+            <a:endParaRPr lang="en-US" dirty="0">
+              <a:solidFill>
+                <a:schemeClr val="bg1"/>
+              </a:solidFill>
+            </a:endParaRPr>
+          </a:p>
+          <a:p>
+            <a:r>
+              <a:rPr lang="en-US" dirty="0">
+                <a:solidFill>
+                  <a:schemeClr val="bg1"/>
+                </a:solidFill>
+              </a:rPr>
+              <a:t>The correlation between daily DOW change and US Global Deaths is -0.05</a:t>
+            </a:r>
+          </a:p>
+        </p:txBody>
+      </p:sp>
+      <p:pic>
+        <p:nvPicPr>
+          <p:cNvPr id="7" name="Picture 6">
+            <a:extLst>
+              <a:ext uri="{FF2B5EF4-FFF2-40B4-BE49-F238E27FC236}">
+                <a16:creationId xmlns:a16="http://schemas.microsoft.com/office/drawing/2014/main" id="{234576BE-CC9D-4EBD-8E3B-BFB54B1D808F}"/>
+              </a:ext>
+            </a:extLst>
+          </p:cNvPr>
+          <p:cNvPicPr>
+            <a:picLocks noChangeAspect="1"/>
+          </p:cNvPicPr>
+          <p:nvPr/>
+        </p:nvPicPr>
+        <p:blipFill>
+          <a:blip r:embed="rId2"/>
+          <a:stretch>
+            <a:fillRect/>
+          </a:stretch>
+        </p:blipFill>
+        <p:spPr>
+          <a:xfrm>
+            <a:off x="-131806" y="1079156"/>
+            <a:ext cx="8073082" cy="5045676"/>
+          </a:xfrm>
+          <a:prstGeom prst="rect">
+            <a:avLst/>
+          </a:prstGeom>
+        </p:spPr>
+      </p:pic>
+    </p:spTree>
+    <p:extLst>
+      <p:ext uri="{BB962C8B-B14F-4D97-AF65-F5344CB8AC3E}">
+        <p14:creationId xmlns:p14="http://schemas.microsoft.com/office/powerpoint/2010/main" val="3321936870"/>
+      </p:ext>
+    </p:extLst>
+  </p:cSld>
+  <p:clrMapOvr>
+    <a:masterClrMapping/>
+  </p:clrMapOvr>
+</p:sld>
+</file>
+
+<file path=ppt/slides/slide11.xml><?xml version="1.0" encoding="utf-8"?>
+<p:sld xmlns:a="http://schemas.openxmlformats.org/drawingml/2006/main" xmlns:r="http://schemas.openxmlformats.org/officeDocument/2006/relationships" xmlns:p="http://schemas.openxmlformats.org/presentationml/2006/main">
+  <p:cSld>
+    <p:spTree>
+      <p:nvGrpSpPr>
+        <p:cNvPr id="1" name=""/>
+        <p:cNvGrpSpPr/>
+        <p:nvPr/>
+      </p:nvGrpSpPr>
+      <p:grpSpPr>
+        <a:xfrm>
+          <a:off x="0" y="0"/>
+          <a:ext cx="0" cy="0"/>
+          <a:chOff x="0" y="0"/>
+          <a:chExt cx="0" cy="0"/>
+        </a:xfrm>
+      </p:grpSpPr>
+      <p:sp>
+        <p:nvSpPr>
+          <p:cNvPr id="2" name="Title 1"/>
+          <p:cNvSpPr>
+            <a:spLocks noGrp="1"/>
+          </p:cNvSpPr>
+          <p:nvPr>
+            <p:ph type="title"/>
+          </p:nvPr>
+        </p:nvSpPr>
+        <p:spPr>
+          <a:xfrm>
+            <a:off x="684212" y="154797"/>
+            <a:ext cx="11225992" cy="1242682"/>
+          </a:xfrm>
+        </p:spPr>
+        <p:txBody>
+          <a:bodyPr>
+            <a:normAutofit/>
+          </a:bodyPr>
+          <a:lstStyle/>
+          <a:p>
+            <a:r>
+              <a:rPr lang="en-US" dirty="0"/>
+              <a:t>Question 3: How did the stock market perform in correlation to </a:t>
+            </a:r>
+            <a:r>
+              <a:rPr lang="en-US" dirty="0" err="1"/>
+              <a:t>covid</a:t>
+            </a:r>
+            <a:r>
+              <a:rPr lang="en-US" dirty="0"/>
+              <a:t> deaths?</a:t>
+            </a:r>
+          </a:p>
+        </p:txBody>
+      </p:sp>
+      <p:sp>
+        <p:nvSpPr>
+          <p:cNvPr id="3" name="Text Placeholder 2"/>
+          <p:cNvSpPr>
+            <a:spLocks noGrp="1"/>
+          </p:cNvSpPr>
+          <p:nvPr>
+            <p:ph type="body" idx="1"/>
+          </p:nvPr>
+        </p:nvSpPr>
+        <p:spPr>
+          <a:xfrm>
+            <a:off x="684213" y="1518249"/>
+            <a:ext cx="11047712" cy="5184954"/>
+          </a:xfrm>
+        </p:spPr>
+        <p:txBody>
+          <a:bodyPr>
+            <a:normAutofit fontScale="92500" lnSpcReduction="10000"/>
+          </a:bodyPr>
+          <a:lstStyle/>
+          <a:p>
+            <a:r>
+              <a:rPr lang="en-US" b="1" dirty="0">
+                <a:solidFill>
+                  <a:schemeClr val="bg1"/>
+                </a:solidFill>
+              </a:rPr>
+              <a:t>Question:</a:t>
+            </a:r>
+          </a:p>
+          <a:p>
+            <a:r>
+              <a:rPr lang="en-US" dirty="0">
+                <a:solidFill>
+                  <a:schemeClr val="bg1"/>
+                </a:solidFill>
+              </a:rPr>
+              <a:t>Did the daily number of covid deaths correlate with the daily performance of the stock market?</a:t>
+            </a:r>
+          </a:p>
+          <a:p>
+            <a:r>
+              <a:rPr lang="en-US" b="1" dirty="0">
+                <a:solidFill>
+                  <a:schemeClr val="bg1"/>
+                </a:solidFill>
+              </a:rPr>
+              <a:t>Analysis:</a:t>
+            </a:r>
+          </a:p>
+          <a:p>
+            <a:pPr lvl="1"/>
+            <a:r>
+              <a:rPr lang="en-US" dirty="0">
+                <a:solidFill>
+                  <a:schemeClr val="bg1"/>
+                </a:solidFill>
+              </a:rPr>
+              <a:t>Initially the assumption was that there would be some correlation between a greater number of covid deaths and a lower stock market performance.</a:t>
+            </a:r>
+          </a:p>
+          <a:p>
+            <a:pPr lvl="1"/>
+            <a:r>
+              <a:rPr lang="en-US" dirty="0">
+                <a:solidFill>
+                  <a:schemeClr val="bg1"/>
+                </a:solidFill>
+              </a:rPr>
+              <a:t>Comparing the US covid death data and the stock market showed that there was almost no correlation.  The stock marked start to drop in the beginning, but almost all of this drop was before the US deaths started.</a:t>
+            </a:r>
+          </a:p>
+          <a:p>
+            <a:pPr lvl="1"/>
+            <a:r>
+              <a:rPr lang="en-US" dirty="0">
+                <a:solidFill>
+                  <a:schemeClr val="bg1"/>
+                </a:solidFill>
+              </a:rPr>
+              <a:t>Since the US was not the first country to have covid exposure, the next step was to compare global covid deaths with stock market performance.  The global data did show more of a correlation for about the first month of the pandemic.  However, from that point forward the stock market generally went up regardless of higher or lower global covid deaths.  There was a spike in global deaths from November 2020 through January 2021, but the stock market continued to go up during that period (which is the opposite of what was seen in the first month of the pandemic).</a:t>
+            </a:r>
+          </a:p>
+          <a:p>
+            <a:r>
+              <a:rPr lang="en-US" b="1" dirty="0">
+                <a:solidFill>
+                  <a:schemeClr val="bg1"/>
+                </a:solidFill>
+              </a:rPr>
+              <a:t>Conclusion:</a:t>
+            </a:r>
+          </a:p>
+          <a:p>
+            <a:r>
+              <a:rPr lang="en-US" dirty="0">
+                <a:solidFill>
+                  <a:schemeClr val="bg1"/>
+                </a:solidFill>
+              </a:rPr>
+              <a:t>Over the first year of the pandemic, it does not appear that there was a direct correlation, with the possible exception of the first month in which there was a slight negative correlation (NASDAQ -0.13, S&amp;P 500 -0.17, DOW -0.17).</a:t>
+            </a:r>
+          </a:p>
+        </p:txBody>
+      </p:sp>
+    </p:spTree>
+    <p:extLst>
+      <p:ext uri="{BB962C8B-B14F-4D97-AF65-F5344CB8AC3E}">
+        <p14:creationId xmlns:p14="http://schemas.microsoft.com/office/powerpoint/2010/main" val="1361964820"/>
+      </p:ext>
+    </p:extLst>
+  </p:cSld>
+  <p:clrMapOvr>
+    <a:masterClrMapping/>
+  </p:clrMapOvr>
+</p:sld>
+</file>
+
+<file path=ppt/slides/slide12.xml><?xml version="1.0" encoding="utf-8"?>
+<p:sld xmlns:a="http://schemas.openxmlformats.org/drawingml/2006/main" xmlns:r="http://schemas.openxmlformats.org/officeDocument/2006/relationships" xmlns:p="http://schemas.openxmlformats.org/presentationml/2006/main">
+  <p:cSld>
+    <p:spTree>
+      <p:nvGrpSpPr>
+        <p:cNvPr id="1" name=""/>
+        <p:cNvGrpSpPr/>
+        <p:nvPr/>
+      </p:nvGrpSpPr>
+      <p:grpSpPr>
+        <a:xfrm>
+          <a:off x="0" y="0"/>
+          <a:ext cx="0" cy="0"/>
+          <a:chOff x="0" y="0"/>
+          <a:chExt cx="0" cy="0"/>
+        </a:xfrm>
+      </p:grpSpPr>
+      <p:sp>
+        <p:nvSpPr>
+          <p:cNvPr id="2" name="Title 1"/>
+          <p:cNvSpPr>
+            <a:spLocks noGrp="1"/>
+          </p:cNvSpPr>
+          <p:nvPr>
+            <p:ph type="title"/>
+          </p:nvPr>
+        </p:nvSpPr>
+        <p:spPr>
+          <a:xfrm>
+            <a:off x="684212" y="154797"/>
+            <a:ext cx="11225992" cy="1242682"/>
+          </a:xfrm>
+        </p:spPr>
+        <p:txBody>
+          <a:bodyPr>
+            <a:normAutofit/>
+          </a:bodyPr>
+          <a:lstStyle/>
+          <a:p>
+            <a:r>
+              <a:rPr lang="en-US" dirty="0"/>
               <a:t>Question 4: </a:t>
             </a:r>
             <a:r>
@@ -5597,7 +6066,7 @@
 </p:sld>
 </file>
 
-<file path=ppt/slides/slide11.xml><?xml version="1.0" encoding="utf-8"?>
+<file path=ppt/slides/slide13.xml><?xml version="1.0" encoding="utf-8"?>
 <p:sld xmlns:a="http://schemas.openxmlformats.org/drawingml/2006/main" xmlns:r="http://schemas.openxmlformats.org/officeDocument/2006/relationships" xmlns:p="http://schemas.openxmlformats.org/presentationml/2006/main">
   <p:cSld>
     <p:spTree>
@@ -5834,7 +6303,7 @@
 </p:sld>
 </file>
 
-<file path=ppt/slides/slide12.xml><?xml version="1.0" encoding="utf-8"?>
+<file path=ppt/slides/slide14.xml><?xml version="1.0" encoding="utf-8"?>
 <p:sld xmlns:a="http://schemas.openxmlformats.org/drawingml/2006/main" xmlns:r="http://schemas.openxmlformats.org/officeDocument/2006/relationships" xmlns:p="http://schemas.openxmlformats.org/presentationml/2006/main">
   <p:cSld>
     <p:spTree>
@@ -6019,7 +6488,7 @@
 </p:sld>
 </file>
 
-<file path=ppt/slides/slide13.xml><?xml version="1.0" encoding="utf-8"?>
+<file path=ppt/slides/slide15.xml><?xml version="1.0" encoding="utf-8"?>
 <p:sld xmlns:a="http://schemas.openxmlformats.org/drawingml/2006/main" xmlns:r="http://schemas.openxmlformats.org/officeDocument/2006/relationships" xmlns:p="http://schemas.openxmlformats.org/presentationml/2006/main">
   <p:cSld>
     <p:spTree>
@@ -6103,7 +6572,7 @@
 </p:sld>
 </file>
 
-<file path=ppt/slides/slide14.xml><?xml version="1.0" encoding="utf-8"?>
+<file path=ppt/slides/slide16.xml><?xml version="1.0" encoding="utf-8"?>
 <p:sld xmlns:a="http://schemas.openxmlformats.org/drawingml/2006/main" xmlns:r="http://schemas.openxmlformats.org/officeDocument/2006/relationships" xmlns:p="http://schemas.openxmlformats.org/presentationml/2006/main">
   <p:cSld>
     <p:spTree>
@@ -6508,8 +6977,8 @@
         </p:nvSpPr>
         <p:spPr>
           <a:xfrm>
-            <a:off x="684212" y="1518249"/>
-            <a:ext cx="11047713" cy="4790536"/>
+            <a:off x="6095999" y="1518249"/>
+            <a:ext cx="5635926" cy="4790536"/>
           </a:xfrm>
         </p:spPr>
         <p:txBody>
@@ -6524,11 +6993,86 @@
                   <a:schemeClr val="bg1"/>
                 </a:solidFill>
               </a:rPr>
-              <a:t>Place Text Here</a:t>
-            </a:r>
-          </a:p>
-        </p:txBody>
-      </p:sp>
+              <a:t>With the large finical crisis that occurred during the pandemic, we we’re wondering </a:t>
+            </a:r>
+          </a:p>
+          <a:p>
+            <a:pPr marL="285750" indent="-285750">
+              <a:buFont typeface="Arial" panose="020B0604020202020204" pitchFamily="34" charset="0"/>
+              <a:buChar char="•"/>
+            </a:pPr>
+            <a:r>
+              <a:rPr lang="en-US" dirty="0">
+                <a:solidFill>
+                  <a:schemeClr val="bg1"/>
+                </a:solidFill>
+              </a:rPr>
+              <a:t>Did the pandemic effect each stock market sector equally?</a:t>
+            </a:r>
+          </a:p>
+          <a:p>
+            <a:pPr marL="285750" indent="-285750">
+              <a:buFont typeface="Arial" panose="020B0604020202020204" pitchFamily="34" charset="0"/>
+              <a:buChar char="•"/>
+            </a:pPr>
+            <a:r>
+              <a:rPr lang="en-US" dirty="0">
+                <a:solidFill>
+                  <a:schemeClr val="bg1"/>
+                </a:solidFill>
+              </a:rPr>
+              <a:t>Did any sectors benefit from the pandemic?</a:t>
+            </a:r>
+          </a:p>
+        </p:txBody>
+      </p:sp>
+      <p:pic>
+        <p:nvPicPr>
+          <p:cNvPr id="2050" name="Picture 2">
+            <a:extLst>
+              <a:ext uri="{FF2B5EF4-FFF2-40B4-BE49-F238E27FC236}">
+                <a16:creationId xmlns:a16="http://schemas.microsoft.com/office/drawing/2014/main" id="{55016512-736B-4816-9682-4494EE519C90}"/>
+              </a:ext>
+            </a:extLst>
+          </p:cNvPr>
+          <p:cNvPicPr>
+            <a:picLocks noChangeAspect="1" noChangeArrowheads="1"/>
+          </p:cNvPicPr>
+          <p:nvPr/>
+        </p:nvPicPr>
+        <p:blipFill>
+          <a:blip r:embed="rId2">
+            <a:extLst>
+              <a:ext uri="{28A0092B-C50C-407E-A947-70E740481C1C}">
+                <a14:useLocalDpi xmlns:a14="http://schemas.microsoft.com/office/drawing/2010/main" val="0"/>
+              </a:ext>
+            </a:extLst>
+          </a:blip>
+          <a:srcRect/>
+          <a:stretch>
+            <a:fillRect/>
+          </a:stretch>
+        </p:blipFill>
+        <p:spPr bwMode="auto">
+          <a:xfrm>
+            <a:off x="386951" y="1659585"/>
+            <a:ext cx="5379016" cy="4507864"/>
+          </a:xfrm>
+          <a:prstGeom prst="rect">
+            <a:avLst/>
+          </a:prstGeom>
+          <a:noFill/>
+          <a:extLst>
+            <a:ext uri="{909E8E84-426E-40DD-AFC4-6F175D3DCCD1}">
+              <a14:hiddenFill xmlns:a14="http://schemas.microsoft.com/office/drawing/2010/main">
+                <a:solidFill>
+                  <a:srgbClr val="FFFFFF"/>
+                </a:solidFill>
+              </a14:hiddenFill>
+            </a:ext>
+          </a:extLst>
+        </p:spPr>
+      </p:pic>
     </p:spTree>
     <p:extLst>
       <p:ext uri="{BB962C8B-B14F-4D97-AF65-F5344CB8AC3E}">
@@ -6559,75 +7103,154 @@
           <a:chExt cx="0" cy="0"/>
         </a:xfrm>
       </p:grpSpPr>
+      <p:sp>
+        <p:nvSpPr>
+          <p:cNvPr id="4" name="Text Placeholder 3">
+            <a:extLst>
+              <a:ext uri="{FF2B5EF4-FFF2-40B4-BE49-F238E27FC236}">
+                <a16:creationId xmlns:a16="http://schemas.microsoft.com/office/drawing/2014/main" id="{0C518CE1-87B1-4415-9560-7BBD26D87F5E}"/>
+              </a:ext>
+            </a:extLst>
+          </p:cNvPr>
+          <p:cNvSpPr>
+            <a:spLocks noGrp="1"/>
+          </p:cNvSpPr>
+          <p:nvPr>
+            <p:ph type="body" sz="half" idx="2"/>
+          </p:nvPr>
+        </p:nvSpPr>
+        <p:spPr>
+          <a:xfrm>
+            <a:off x="4819134" y="1311700"/>
+            <a:ext cx="6021388" cy="3909780"/>
+          </a:xfrm>
+        </p:spPr>
+        <p:txBody>
+          <a:bodyPr/>
+          <a:lstStyle/>
+          <a:p>
+            <a:r>
+              <a:rPr lang="en-US" dirty="0"/>
+              <a:t>After constructing the graphs and analyzing the data. None of the sectors had seemed to have benefited from the pandemic.</a:t>
+            </a:r>
+          </a:p>
+          <a:p>
+            <a:r>
+              <a:rPr lang="en-US" dirty="0"/>
+              <a:t>It’s interesting to note, that almost every single sector not only recovered from the plunge, but actually gained in value as the pandemic has dragged except for the Energy and Utilities sectors.</a:t>
+            </a:r>
+          </a:p>
+          <a:p>
+            <a:r>
+              <a:rPr lang="en-US" dirty="0"/>
+              <a:t>Some sectors doubled in Value over the course of the pandemic such as IT, Materials, and </a:t>
+            </a:r>
+            <a:r>
+              <a:rPr lang="en-US"/>
+              <a:t>Communication services..  </a:t>
+            </a:r>
+            <a:endParaRPr lang="en-US" dirty="0"/>
+          </a:p>
+        </p:txBody>
+      </p:sp>
       <p:pic>
         <p:nvPicPr>
-          <p:cNvPr id="5" name="Picture 4">
+          <p:cNvPr id="3076" name="Picture 4">
             <a:extLst>
               <a:ext uri="{FF2B5EF4-FFF2-40B4-BE49-F238E27FC236}">
-                <a16:creationId xmlns:a16="http://schemas.microsoft.com/office/drawing/2014/main" id="{9CE29964-C462-4B09-848E-C9C1E4DEC2AD}"/>
+                <a16:creationId xmlns:a16="http://schemas.microsoft.com/office/drawing/2014/main" id="{0D0CAF4A-458E-4427-9039-AC1168DA98BA}"/>
               </a:ext>
             </a:extLst>
           </p:cNvPr>
           <p:cNvPicPr>
-            <a:picLocks noChangeAspect="1"/>
+            <a:picLocks noChangeAspect="1" noChangeArrowheads="1"/>
           </p:cNvPicPr>
           <p:nvPr/>
         </p:nvPicPr>
         <p:blipFill>
-          <a:blip r:embed="rId2"/>
+          <a:blip r:embed="rId2">
+            <a:extLst>
+              <a:ext uri="{28A0092B-C50C-407E-A947-70E740481C1C}">
+                <a14:useLocalDpi xmlns:a14="http://schemas.microsoft.com/office/drawing/2010/main" val="0"/>
+              </a:ext>
+            </a:extLst>
+          </a:blip>
+          <a:srcRect/>
           <a:stretch>
             <a:fillRect/>
           </a:stretch>
         </p:blipFill>
-        <p:spPr>
-          <a:xfrm>
-            <a:off x="839666" y="1138684"/>
-            <a:ext cx="10401302" cy="5380813"/>
-          </a:xfrm>
-          <a:prstGeom prst="rect">
-            <a:avLst/>
-          </a:prstGeom>
-        </p:spPr>
-      </p:pic>
-      <p:sp>
-        <p:nvSpPr>
-          <p:cNvPr id="7" name="TextBox 6">
-            <a:extLst>
-              <a:ext uri="{FF2B5EF4-FFF2-40B4-BE49-F238E27FC236}">
-                <a16:creationId xmlns:a16="http://schemas.microsoft.com/office/drawing/2014/main" id="{10515BEC-70E9-4D92-8077-14BEB1024A77}"/>
-              </a:ext>
-            </a:extLst>
-          </p:cNvPr>
-          <p:cNvSpPr txBox="1"/>
-          <p:nvPr/>
-        </p:nvSpPr>
-        <p:spPr>
-          <a:xfrm>
-            <a:off x="1756265" y="215344"/>
-            <a:ext cx="9484703" cy="830997"/>
+        <p:spPr bwMode="auto">
+          <a:xfrm>
+            <a:off x="293116" y="284165"/>
+            <a:ext cx="4038845" cy="3384739"/>
           </a:xfrm>
           <a:prstGeom prst="rect">
             <a:avLst/>
           </a:prstGeom>
           <a:noFill/>
-        </p:spPr>
-        <p:txBody>
-          <a:bodyPr wrap="square">
-            <a:spAutoFit/>
-          </a:bodyPr>
-          <a:lstStyle/>
-          <a:p>
-            <a:r>
-              <a:rPr lang="en-US" sz="2400" dirty="0"/>
-              <a:t>Question 2: Can we predict the market for the next three weeks using Linear Regression or Polynomial Regression?</a:t>
-            </a:r>
-          </a:p>
-        </p:txBody>
-      </p:sp>
+          <a:extLst>
+            <a:ext uri="{909E8E84-426E-40DD-AFC4-6F175D3DCCD1}">
+              <a14:hiddenFill xmlns:a14="http://schemas.microsoft.com/office/drawing/2010/main">
+                <a:solidFill>
+                  <a:srgbClr val="FFFFFF"/>
+                </a:solidFill>
+              </a14:hiddenFill>
+            </a:ext>
+          </a:extLst>
+        </p:spPr>
+      </p:pic>
+      <p:pic>
+        <p:nvPicPr>
+          <p:cNvPr id="3080" name="Picture 8">
+            <a:extLst>
+              <a:ext uri="{FF2B5EF4-FFF2-40B4-BE49-F238E27FC236}">
+                <a16:creationId xmlns:a16="http://schemas.microsoft.com/office/drawing/2014/main" id="{608F6648-75F5-453A-8461-6A5B2E1B2165}"/>
+              </a:ext>
+            </a:extLst>
+          </p:cNvPr>
+          <p:cNvPicPr>
+            <a:picLocks noChangeAspect="1" noChangeArrowheads="1"/>
+          </p:cNvPicPr>
+          <p:nvPr/>
+        </p:nvPicPr>
+        <p:blipFill>
+          <a:blip r:embed="rId3">
+            <a:extLst>
+              <a:ext uri="{28A0092B-C50C-407E-A947-70E740481C1C}">
+                <a14:useLocalDpi xmlns:a14="http://schemas.microsoft.com/office/drawing/2010/main" val="0"/>
+              </a:ext>
+            </a:extLst>
+          </a:blip>
+          <a:srcRect/>
+          <a:stretch>
+            <a:fillRect/>
+          </a:stretch>
+        </p:blipFill>
+        <p:spPr bwMode="auto">
+          <a:xfrm>
+            <a:off x="293115" y="3566328"/>
+            <a:ext cx="4038845" cy="3333325"/>
+          </a:xfrm>
+          <a:prstGeom prst="rect">
+            <a:avLst/>
+          </a:prstGeom>
+          <a:noFill/>
+          <a:extLst>
+            <a:ext uri="{909E8E84-426E-40DD-AFC4-6F175D3DCCD1}">
+              <a14:hiddenFill xmlns:a14="http://schemas.microsoft.com/office/drawing/2010/main">
+                <a:solidFill>
+                  <a:srgbClr val="FFFFFF"/>
+                </a:solidFill>
+              </a14:hiddenFill>
+            </a:ext>
+          </a:extLst>
+        </p:spPr>
+      </p:pic>
     </p:spTree>
     <p:extLst>
       <p:ext uri="{BB962C8B-B14F-4D97-AF65-F5344CB8AC3E}">
-        <p14:creationId xmlns:p14="http://schemas.microsoft.com/office/powerpoint/2010/main" val="2301200173"/>
+        <p14:creationId xmlns:p14="http://schemas.microsoft.com/office/powerpoint/2010/main" val="856230985"/>
       </p:ext>
     </p:extLst>
   </p:cSld>
@@ -6656,178 +7279,74 @@
       </p:grpSpPr>
       <p:sp>
         <p:nvSpPr>
-          <p:cNvPr id="2" name="Title 1"/>
-          <p:cNvSpPr>
-            <a:spLocks noGrp="1"/>
-          </p:cNvSpPr>
-          <p:nvPr>
-            <p:ph type="title"/>
-          </p:nvPr>
-        </p:nvSpPr>
-        <p:spPr>
-          <a:xfrm>
-            <a:off x="684212" y="154797"/>
-            <a:ext cx="11225992" cy="1242682"/>
-          </a:xfrm>
-        </p:spPr>
-        <p:txBody>
-          <a:bodyPr>
-            <a:normAutofit/>
-          </a:bodyPr>
-          <a:lstStyle/>
-          <a:p>
-            <a:r>
-              <a:rPr lang="en-US" dirty="0"/>
-              <a:t>Linear Regression</a:t>
-            </a:r>
-          </a:p>
-        </p:txBody>
-      </p:sp>
-      <p:sp>
-        <p:nvSpPr>
-          <p:cNvPr id="3" name="Text Placeholder 2"/>
-          <p:cNvSpPr>
-            <a:spLocks noGrp="1"/>
-          </p:cNvSpPr>
-          <p:nvPr>
-            <p:ph type="body" idx="1"/>
-          </p:nvPr>
-        </p:nvSpPr>
-        <p:spPr>
-          <a:xfrm>
-            <a:off x="7115410" y="1474287"/>
-            <a:ext cx="4794794" cy="4794628"/>
-          </a:xfrm>
-        </p:spPr>
-        <p:txBody>
-          <a:bodyPr>
-            <a:normAutofit/>
-          </a:bodyPr>
-          <a:lstStyle/>
-          <a:p>
-            <a:r>
-              <a:rPr lang="en-US" dirty="0">
-                <a:solidFill>
-                  <a:schemeClr val="tx1"/>
-                </a:solidFill>
-              </a:rPr>
-              <a:t>Although we have a prediction value as shown, what would another large drop have done to our trendline?</a:t>
-            </a:r>
-          </a:p>
-          <a:p>
-            <a:endParaRPr lang="en-US" dirty="0">
-              <a:solidFill>
-                <a:schemeClr val="tx1"/>
-              </a:solidFill>
-            </a:endParaRPr>
-          </a:p>
-          <a:p>
-            <a:r>
-              <a:rPr lang="en-US" dirty="0">
-                <a:solidFill>
-                  <a:schemeClr val="tx1"/>
-                </a:solidFill>
-              </a:rPr>
-              <a:t>The accuracy for this type of model is 63%.</a:t>
-            </a:r>
-          </a:p>
-          <a:p>
-            <a:endParaRPr lang="en-US" dirty="0">
-              <a:solidFill>
-                <a:schemeClr val="tx1"/>
-              </a:solidFill>
-            </a:endParaRPr>
-          </a:p>
-          <a:p>
-            <a:r>
-              <a:rPr lang="en-US" dirty="0">
-                <a:solidFill>
-                  <a:schemeClr val="tx1"/>
-                </a:solidFill>
-              </a:rPr>
-              <a:t>If we started making our prediction after the dip/March-2020 then our prediction would be more accurate.</a:t>
-            </a:r>
-          </a:p>
-          <a:p>
-            <a:endParaRPr lang="en-US" dirty="0">
-              <a:solidFill>
-                <a:schemeClr val="bg1"/>
-              </a:solidFill>
-            </a:endParaRPr>
-          </a:p>
-          <a:p>
-            <a:endParaRPr lang="en-US" dirty="0">
-              <a:solidFill>
-                <a:schemeClr val="bg1"/>
-              </a:solidFill>
-            </a:endParaRPr>
-          </a:p>
-        </p:txBody>
-      </p:sp>
-      <p:pic>
-        <p:nvPicPr>
-          <p:cNvPr id="5" name="Picture 4" descr="Chart, line chart&#10;&#10;Description automatically generated">
+          <p:cNvPr id="2" name="Title 1">
             <a:extLst>
               <a:ext uri="{FF2B5EF4-FFF2-40B4-BE49-F238E27FC236}">
-                <a16:creationId xmlns:a16="http://schemas.microsoft.com/office/drawing/2014/main" id="{5518163D-1008-4916-9DD4-085D43F88D3D}"/>
+                <a16:creationId xmlns:a16="http://schemas.microsoft.com/office/drawing/2014/main" id="{816A84C7-63B0-497F-B745-10971956DDAA}"/>
               </a:ext>
             </a:extLst>
           </p:cNvPr>
-          <p:cNvPicPr>
-            <a:picLocks noChangeAspect="1"/>
-          </p:cNvPicPr>
-          <p:nvPr/>
-        </p:nvPicPr>
-        <p:blipFill>
-          <a:blip r:embed="rId2"/>
-          <a:stretch>
-            <a:fillRect/>
-          </a:stretch>
-        </p:blipFill>
-        <p:spPr>
-          <a:xfrm>
-            <a:off x="-495177" y="1397479"/>
-            <a:ext cx="8362480" cy="4181240"/>
-          </a:xfrm>
-          <a:prstGeom prst="rect">
-            <a:avLst/>
-          </a:prstGeom>
-        </p:spPr>
-      </p:pic>
-      <p:pic>
-        <p:nvPicPr>
-          <p:cNvPr id="7" name="Picture 6">
+          <p:cNvSpPr>
+            <a:spLocks noGrp="1"/>
+          </p:cNvSpPr>
+          <p:nvPr>
+            <p:ph type="title"/>
+          </p:nvPr>
+        </p:nvSpPr>
+        <p:spPr>
+          <a:xfrm>
+            <a:off x="684213" y="1561983"/>
+            <a:ext cx="5188083" cy="1422400"/>
+          </a:xfrm>
+        </p:spPr>
+        <p:txBody>
+          <a:bodyPr/>
+          <a:lstStyle/>
+          <a:p>
+            <a:r>
+              <a:rPr lang="en-US" dirty="0"/>
+              <a:t>Conclusion</a:t>
+            </a:r>
+          </a:p>
+        </p:txBody>
+      </p:sp>
+      <p:sp>
+        <p:nvSpPr>
+          <p:cNvPr id="3" name="Text Placeholder 2">
             <a:extLst>
               <a:ext uri="{FF2B5EF4-FFF2-40B4-BE49-F238E27FC236}">
-                <a16:creationId xmlns:a16="http://schemas.microsoft.com/office/drawing/2014/main" id="{DF30E173-6C1B-41E6-B648-0CCEDFBFDB79}"/>
+                <a16:creationId xmlns:a16="http://schemas.microsoft.com/office/drawing/2014/main" id="{525B9D3F-FA03-4202-A142-B5AADB5A1D1F}"/>
               </a:ext>
             </a:extLst>
           </p:cNvPr>
-          <p:cNvPicPr>
-            <a:picLocks noChangeAspect="1"/>
-          </p:cNvPicPr>
-          <p:nvPr/>
-        </p:nvPicPr>
-        <p:blipFill>
-          <a:blip r:embed="rId3"/>
-          <a:stretch>
-            <a:fillRect/>
-          </a:stretch>
-        </p:blipFill>
-        <p:spPr>
-          <a:xfrm>
-            <a:off x="684212" y="5431799"/>
-            <a:ext cx="6229371" cy="293839"/>
-          </a:xfrm>
-          <a:prstGeom prst="rect">
-            <a:avLst/>
-          </a:prstGeom>
-        </p:spPr>
-      </p:pic>
+          <p:cNvSpPr>
+            <a:spLocks noGrp="1"/>
+          </p:cNvSpPr>
+          <p:nvPr>
+            <p:ph type="body" idx="1"/>
+          </p:nvPr>
+        </p:nvSpPr>
+        <p:spPr>
+          <a:xfrm>
+            <a:off x="684213" y="3262618"/>
+            <a:ext cx="8534400" cy="1498600"/>
+          </a:xfrm>
+        </p:spPr>
+        <p:txBody>
+          <a:bodyPr/>
+          <a:lstStyle/>
+          <a:p>
+            <a:r>
+              <a:rPr lang="en-US" dirty="0"/>
+              <a:t>No sector directly benefited from pandemic. How due to new economic demands made by the pandemic, certain sectors experienced massive growth as the year passed. </a:t>
+            </a:r>
+          </a:p>
+        </p:txBody>
+      </p:sp>
     </p:spTree>
     <p:extLst>
       <p:ext uri="{BB962C8B-B14F-4D97-AF65-F5344CB8AC3E}">
-        <p14:creationId xmlns:p14="http://schemas.microsoft.com/office/powerpoint/2010/main" val="1991492134"/>
+        <p14:creationId xmlns:p14="http://schemas.microsoft.com/office/powerpoint/2010/main" val="591320083"/>
       </p:ext>
     </p:extLst>
   </p:cSld>
@@ -6856,13 +7375,7 @@
       </p:grpSpPr>
       <p:sp>
         <p:nvSpPr>
-          <p:cNvPr id="2" name="Title 1">
-            <a:extLst>
-              <a:ext uri="{FF2B5EF4-FFF2-40B4-BE49-F238E27FC236}">
-                <a16:creationId xmlns:a16="http://schemas.microsoft.com/office/drawing/2014/main" id="{47287D70-E8D8-45FF-A602-278B17EDAA4F}"/>
-              </a:ext>
-            </a:extLst>
-          </p:cNvPr>
+          <p:cNvPr id="2" name="Title 1"/>
           <p:cNvSpPr>
             <a:spLocks noGrp="1"/>
           </p:cNvSpPr>
@@ -6872,45 +7385,44 @@
         </p:nvSpPr>
         <p:spPr>
           <a:xfrm>
-            <a:off x="6948522" y="-157842"/>
-            <a:ext cx="6019800" cy="1143000"/>
-          </a:xfrm>
-        </p:spPr>
-        <p:txBody>
-          <a:bodyPr/>
-          <a:lstStyle/>
-          <a:p>
-            <a:r>
-              <a:rPr lang="en-US" dirty="0"/>
-              <a:t>Polynomial regression</a:t>
-            </a:r>
-          </a:p>
-        </p:txBody>
-      </p:sp>
-      <p:sp>
-        <p:nvSpPr>
-          <p:cNvPr id="4" name="Text Placeholder 3">
-            <a:extLst>
-              <a:ext uri="{FF2B5EF4-FFF2-40B4-BE49-F238E27FC236}">
-                <a16:creationId xmlns:a16="http://schemas.microsoft.com/office/drawing/2014/main" id="{508CB0EF-3688-4243-9320-D37CAB7BF1B7}"/>
-              </a:ext>
-            </a:extLst>
-          </p:cNvPr>
-          <p:cNvSpPr>
-            <a:spLocks noGrp="1"/>
-          </p:cNvSpPr>
-          <p:nvPr>
-            <p:ph type="body" sz="half" idx="2"/>
-          </p:nvPr>
-        </p:nvSpPr>
-        <p:spPr>
-          <a:xfrm>
-            <a:off x="6370654" y="1183333"/>
-            <a:ext cx="5776877" cy="4661655"/>
-          </a:xfrm>
-        </p:spPr>
-        <p:txBody>
-          <a:bodyPr/>
+            <a:off x="684212" y="154797"/>
+            <a:ext cx="11225992" cy="1242682"/>
+          </a:xfrm>
+        </p:spPr>
+        <p:txBody>
+          <a:bodyPr>
+            <a:normAutofit fontScale="90000"/>
+          </a:bodyPr>
+          <a:lstStyle/>
+          <a:p>
+            <a:r>
+              <a:rPr lang="en-US"/>
+              <a:t>Question 2: Can we predict the market for the next three weeks using Linear Regression or Polynomial Regression?</a:t>
+            </a:r>
+            <a:endParaRPr lang="en-US" dirty="0"/>
+          </a:p>
+        </p:txBody>
+      </p:sp>
+      <p:sp>
+        <p:nvSpPr>
+          <p:cNvPr id="3" name="Text Placeholder 2"/>
+          <p:cNvSpPr>
+            <a:spLocks noGrp="1"/>
+          </p:cNvSpPr>
+          <p:nvPr>
+            <p:ph type="body" idx="1"/>
+          </p:nvPr>
+        </p:nvSpPr>
+        <p:spPr>
+          <a:xfrm>
+            <a:off x="7115410" y="1474287"/>
+            <a:ext cx="4794794" cy="4794628"/>
+          </a:xfrm>
+        </p:spPr>
+        <p:txBody>
+          <a:bodyPr>
+            <a:normAutofit/>
+          </a:bodyPr>
           <a:lstStyle/>
           <a:p>
             <a:r>
@@ -6919,7 +7431,7 @@
                   <a:schemeClr val="tx1"/>
                 </a:solidFill>
               </a:rPr>
-              <a:t>Polynomial Regression considers non-linear data, such as the stock market.</a:t>
+              <a:t>Although we have a prediction value as shown, what would another large drop have done to our trendline?</a:t>
             </a:r>
           </a:p>
           <a:p>
@@ -6936,7 +7448,7 @@
                   <a:schemeClr val="tx1"/>
                 </a:solidFill>
               </a:rPr>
-              <a:t>Degrees set to 3 in this model.</a:t>
+              <a:t>The accuracy for this type of model is 63%.</a:t>
             </a:r>
           </a:p>
           <a:p>
@@ -6953,45 +7465,31 @@
                   <a:schemeClr val="tx1"/>
                 </a:solidFill>
               </a:rPr>
-              <a:t>The accuracy using Polynomial Regression is 78% compared to the 63% from linear regression</a:t>
+              <a:t>If we started making our prediction after the dip/March-2020 then our prediction would be more accurate.</a:t>
             </a:r>
           </a:p>
           <a:p>
             <a:endParaRPr lang="en-US" dirty="0">
               <a:solidFill>
-                <a:schemeClr val="tx1"/>
+                <a:schemeClr val="bg1"/>
               </a:solidFill>
             </a:endParaRPr>
           </a:p>
           <a:p>
             <a:endParaRPr lang="en-US" dirty="0">
               <a:solidFill>
-                <a:schemeClr val="tx1"/>
+                <a:schemeClr val="bg1"/>
               </a:solidFill>
             </a:endParaRPr>
           </a:p>
-          <a:p>
-            <a:endParaRPr lang="en-US" dirty="0">
-              <a:solidFill>
-                <a:schemeClr val="tx1"/>
-              </a:solidFill>
-            </a:endParaRPr>
-          </a:p>
-          <a:p>
-            <a:endParaRPr lang="en-US" dirty="0">
-              <a:solidFill>
-                <a:schemeClr val="tx1"/>
-              </a:solidFill>
-            </a:endParaRPr>
-          </a:p>
         </p:txBody>
       </p:sp>
       <p:pic>
         <p:nvPicPr>
-          <p:cNvPr id="10" name="Picture 9" descr="Chart, histogram&#10;&#10;Description automatically generated">
+          <p:cNvPr id="5" name="Picture 4" descr="Chart, line chart&#10;&#10;Description automatically generated">
             <a:extLst>
               <a:ext uri="{FF2B5EF4-FFF2-40B4-BE49-F238E27FC236}">
-                <a16:creationId xmlns:a16="http://schemas.microsoft.com/office/drawing/2014/main" id="{54F1F3DD-29E8-439D-90EA-7CA53231F0EC}"/>
+                <a16:creationId xmlns:a16="http://schemas.microsoft.com/office/drawing/2014/main" id="{5518163D-1008-4916-9DD4-085D43F88D3D}"/>
               </a:ext>
             </a:extLst>
           </p:cNvPr>
@@ -7008,8 +7506,8 @@
         </p:blipFill>
         <p:spPr>
           <a:xfrm>
-            <a:off x="-764070" y="1444869"/>
-            <a:ext cx="7936523" cy="3968262"/>
+            <a:off x="-495177" y="1397479"/>
+            <a:ext cx="8362480" cy="4181240"/>
           </a:xfrm>
           <a:prstGeom prst="rect">
             <a:avLst/>
@@ -7018,10 +7516,10 @@
       </p:pic>
       <p:pic>
         <p:nvPicPr>
-          <p:cNvPr id="12" name="Picture 11">
+          <p:cNvPr id="7" name="Picture 6">
             <a:extLst>
               <a:ext uri="{FF2B5EF4-FFF2-40B4-BE49-F238E27FC236}">
-                <a16:creationId xmlns:a16="http://schemas.microsoft.com/office/drawing/2014/main" id="{61A22602-5AB0-44C4-B54B-898E3585569A}"/>
+                <a16:creationId xmlns:a16="http://schemas.microsoft.com/office/drawing/2014/main" id="{DF30E173-6C1B-41E6-B648-0CCEDFBFDB79}"/>
               </a:ext>
             </a:extLst>
           </p:cNvPr>
@@ -7038,8 +7536,8 @@
         </p:blipFill>
         <p:spPr>
           <a:xfrm>
-            <a:off x="2189711" y="5325036"/>
-            <a:ext cx="2272188" cy="425277"/>
+            <a:off x="684212" y="5431799"/>
+            <a:ext cx="6229371" cy="293839"/>
           </a:xfrm>
           <a:prstGeom prst="rect">
             <a:avLst/>
@@ -7049,7 +7547,7 @@
     </p:spTree>
     <p:extLst>
       <p:ext uri="{BB962C8B-B14F-4D97-AF65-F5344CB8AC3E}">
-        <p14:creationId xmlns:p14="http://schemas.microsoft.com/office/powerpoint/2010/main" val="44619690"/>
+        <p14:creationId xmlns:p14="http://schemas.microsoft.com/office/powerpoint/2010/main" val="1991492134"/>
       </p:ext>
     </p:extLst>
   </p:cSld>
@@ -7078,7 +7576,13 @@
       </p:grpSpPr>
       <p:sp>
         <p:nvSpPr>
-          <p:cNvPr id="2" name="Title 1"/>
+          <p:cNvPr id="2" name="Title 1">
+            <a:extLst>
+              <a:ext uri="{FF2B5EF4-FFF2-40B4-BE49-F238E27FC236}">
+                <a16:creationId xmlns:a16="http://schemas.microsoft.com/office/drawing/2014/main" id="{47287D70-E8D8-45FF-A602-278B17EDAA4F}"/>
+              </a:ext>
+            </a:extLst>
+          </p:cNvPr>
           <p:cNvSpPr>
             <a:spLocks noGrp="1"/>
           </p:cNvSpPr>
@@ -7088,144 +7592,126 @@
         </p:nvSpPr>
         <p:spPr>
           <a:xfrm>
-            <a:off x="684212" y="154797"/>
-            <a:ext cx="11225992" cy="1242682"/>
-          </a:xfrm>
-        </p:spPr>
-        <p:txBody>
-          <a:bodyPr>
-            <a:normAutofit/>
-          </a:bodyPr>
+            <a:off x="6948522" y="-157842"/>
+            <a:ext cx="6019800" cy="1143000"/>
+          </a:xfrm>
+        </p:spPr>
+        <p:txBody>
+          <a:bodyPr/>
           <a:lstStyle/>
           <a:p>
             <a:r>
               <a:rPr lang="en-US" dirty="0"/>
-              <a:t>Question 3: How did the stock market perform in correlation to </a:t>
-            </a:r>
-            <a:r>
-              <a:rPr lang="en-US" dirty="0" err="1"/>
-              <a:t>covid</a:t>
-            </a:r>
-            <a:r>
-              <a:rPr lang="en-US" dirty="0"/>
-              <a:t> deaths?</a:t>
-            </a:r>
-          </a:p>
-        </p:txBody>
-      </p:sp>
-      <p:sp>
-        <p:nvSpPr>
-          <p:cNvPr id="3" name="Text Placeholder 2"/>
-          <p:cNvSpPr>
-            <a:spLocks noGrp="1"/>
-          </p:cNvSpPr>
-          <p:nvPr>
-            <p:ph type="body" idx="1"/>
-          </p:nvPr>
-        </p:nvSpPr>
-        <p:spPr>
-          <a:xfrm>
-            <a:off x="684213" y="1518249"/>
-            <a:ext cx="11047712" cy="5184954"/>
-          </a:xfrm>
-        </p:spPr>
-        <p:txBody>
-          <a:bodyPr>
-            <a:normAutofit/>
-          </a:bodyPr>
-          <a:lstStyle/>
+              <a:t>Polynomial regression</a:t>
+            </a:r>
+          </a:p>
+        </p:txBody>
+      </p:sp>
+      <p:sp>
+        <p:nvSpPr>
+          <p:cNvPr id="4" name="Text Placeholder 3">
+            <a:extLst>
+              <a:ext uri="{FF2B5EF4-FFF2-40B4-BE49-F238E27FC236}">
+                <a16:creationId xmlns:a16="http://schemas.microsoft.com/office/drawing/2014/main" id="{508CB0EF-3688-4243-9320-D37CAB7BF1B7}"/>
+              </a:ext>
+            </a:extLst>
+          </p:cNvPr>
+          <p:cNvSpPr>
+            <a:spLocks noGrp="1"/>
+          </p:cNvSpPr>
+          <p:nvPr>
+            <p:ph type="body" sz="half" idx="2"/>
+          </p:nvPr>
+        </p:nvSpPr>
+        <p:spPr>
+          <a:xfrm>
+            <a:off x="6370654" y="1183333"/>
+            <a:ext cx="5776877" cy="4661655"/>
+          </a:xfrm>
+        </p:spPr>
+        <p:txBody>
+          <a:bodyPr/>
+          <a:lstStyle/>
+          <a:p>
+            <a:r>
+              <a:rPr lang="en-US" dirty="0">
+                <a:solidFill>
+                  <a:schemeClr val="tx1"/>
+                </a:solidFill>
+              </a:rPr>
+              <a:t>What is Polynomial Regression?</a:t>
+            </a:r>
+          </a:p>
           <a:p>
             <a:endParaRPr lang="en-US" dirty="0">
               <a:solidFill>
-                <a:schemeClr val="bg1"/>
+                <a:schemeClr val="tx1"/>
               </a:solidFill>
             </a:endParaRPr>
           </a:p>
           <a:p>
+            <a:r>
+              <a:rPr lang="en-US" dirty="0">
+                <a:solidFill>
+                  <a:schemeClr val="tx1"/>
+                </a:solidFill>
+              </a:rPr>
+              <a:t>Degrees set to 3 in this model.</a:t>
+            </a:r>
+          </a:p>
+          <a:p>
             <a:endParaRPr lang="en-US" dirty="0">
               <a:solidFill>
-                <a:schemeClr val="bg1"/>
+                <a:schemeClr val="tx1"/>
               </a:solidFill>
             </a:endParaRPr>
           </a:p>
           <a:p>
+            <a:r>
+              <a:rPr lang="en-US" dirty="0">
+                <a:solidFill>
+                  <a:schemeClr val="tx1"/>
+                </a:solidFill>
+              </a:rPr>
+              <a:t>The accuracy using Polynomial Regression is 78% compared to the 63% from linear regression</a:t>
+            </a:r>
+          </a:p>
+          <a:p>
             <a:endParaRPr lang="en-US" dirty="0">
               <a:solidFill>
-                <a:schemeClr val="bg1"/>
+                <a:schemeClr val="tx1"/>
               </a:solidFill>
             </a:endParaRPr>
           </a:p>
           <a:p>
             <a:endParaRPr lang="en-US" dirty="0">
               <a:solidFill>
-                <a:schemeClr val="bg1"/>
+                <a:schemeClr val="tx1"/>
               </a:solidFill>
             </a:endParaRPr>
           </a:p>
           <a:p>
             <a:endParaRPr lang="en-US" dirty="0">
               <a:solidFill>
-                <a:schemeClr val="bg1"/>
+                <a:schemeClr val="tx1"/>
               </a:solidFill>
             </a:endParaRPr>
           </a:p>
           <a:p>
             <a:endParaRPr lang="en-US" dirty="0">
               <a:solidFill>
-                <a:schemeClr val="bg1"/>
+                <a:schemeClr val="tx1"/>
               </a:solidFill>
             </a:endParaRPr>
           </a:p>
-          <a:p>
-            <a:endParaRPr lang="en-US" dirty="0">
-              <a:solidFill>
-                <a:schemeClr val="bg1"/>
-              </a:solidFill>
-            </a:endParaRPr>
-          </a:p>
-          <a:p>
-            <a:endParaRPr lang="en-US" dirty="0">
-              <a:solidFill>
-                <a:schemeClr val="bg1"/>
-              </a:solidFill>
-            </a:endParaRPr>
-          </a:p>
-          <a:p>
-            <a:endParaRPr lang="en-US" dirty="0">
-              <a:solidFill>
-                <a:schemeClr val="bg1"/>
-              </a:solidFill>
-            </a:endParaRPr>
-          </a:p>
-          <a:p>
-            <a:endParaRPr lang="en-US" dirty="0">
-              <a:solidFill>
-                <a:schemeClr val="bg1"/>
-              </a:solidFill>
-            </a:endParaRPr>
-          </a:p>
-          <a:p>
-            <a:endParaRPr lang="en-US" dirty="0">
-              <a:solidFill>
-                <a:schemeClr val="bg1"/>
-              </a:solidFill>
-            </a:endParaRPr>
-          </a:p>
-          <a:p>
-            <a:endParaRPr lang="en-US" dirty="0">
-              <a:solidFill>
-                <a:schemeClr val="bg1"/>
-              </a:solidFill>
-            </a:endParaRPr>
-          </a:p>
         </p:txBody>
       </p:sp>
       <p:pic>
         <p:nvPicPr>
-          <p:cNvPr id="5" name="Picture 4">
+          <p:cNvPr id="10" name="Picture 9" descr="Chart, histogram&#10;&#10;Description automatically generated">
             <a:extLst>
               <a:ext uri="{FF2B5EF4-FFF2-40B4-BE49-F238E27FC236}">
-                <a16:creationId xmlns:a16="http://schemas.microsoft.com/office/drawing/2014/main" id="{EA1399E7-6309-4723-86AD-38062D8F1D72}"/>
+                <a16:creationId xmlns:a16="http://schemas.microsoft.com/office/drawing/2014/main" id="{54F1F3DD-29E8-439D-90EA-7CA53231F0EC}"/>
               </a:ext>
             </a:extLst>
           </p:cNvPr>
@@ -7242,108 +7728,48 @@
         </p:blipFill>
         <p:spPr>
           <a:xfrm>
-            <a:off x="-98383" y="1042749"/>
-            <a:ext cx="8031421" cy="5019638"/>
+            <a:off x="-764070" y="1444869"/>
+            <a:ext cx="7936523" cy="3968262"/>
           </a:xfrm>
           <a:prstGeom prst="rect">
             <a:avLst/>
           </a:prstGeom>
         </p:spPr>
       </p:pic>
-      <p:sp>
-        <p:nvSpPr>
-          <p:cNvPr id="6" name="TextBox 5">
+      <p:pic>
+        <p:nvPicPr>
+          <p:cNvPr id="12" name="Picture 11">
             <a:extLst>
               <a:ext uri="{FF2B5EF4-FFF2-40B4-BE49-F238E27FC236}">
-                <a16:creationId xmlns:a16="http://schemas.microsoft.com/office/drawing/2014/main" id="{82AFC9A5-1D8A-436E-8718-8EBCE4864537}"/>
+                <a16:creationId xmlns:a16="http://schemas.microsoft.com/office/drawing/2014/main" id="{61A22602-5AB0-44C4-B54B-898E3585569A}"/>
               </a:ext>
             </a:extLst>
           </p:cNvPr>
-          <p:cNvSpPr txBox="1"/>
+          <p:cNvPicPr>
+            <a:picLocks noChangeAspect="1"/>
+          </p:cNvPicPr>
           <p:nvPr/>
-        </p:nvSpPr>
-        <p:spPr>
-          <a:xfrm>
-            <a:off x="7496432" y="1680519"/>
-            <a:ext cx="3682314" cy="3693319"/>
+        </p:nvPicPr>
+        <p:blipFill>
+          <a:blip r:embed="rId3"/>
+          <a:stretch>
+            <a:fillRect/>
+          </a:stretch>
+        </p:blipFill>
+        <p:spPr>
+          <a:xfrm>
+            <a:off x="2189711" y="5325036"/>
+            <a:ext cx="2272188" cy="425277"/>
           </a:xfrm>
           <a:prstGeom prst="rect">
             <a:avLst/>
           </a:prstGeom>
-          <a:noFill/>
-        </p:spPr>
-        <p:txBody>
-          <a:bodyPr wrap="square" rtlCol="0">
-            <a:spAutoFit/>
-          </a:bodyPr>
-          <a:lstStyle/>
-          <a:p>
-            <a:r>
-              <a:rPr lang="en-US" dirty="0">
-                <a:solidFill>
-                  <a:schemeClr val="bg1"/>
-                </a:solidFill>
-              </a:rPr>
-              <a:t>For US Covid Death Data:</a:t>
-            </a:r>
-          </a:p>
-          <a:p>
-            <a:endParaRPr lang="en-US" dirty="0">
-              <a:solidFill>
-                <a:schemeClr val="bg1"/>
-              </a:solidFill>
-            </a:endParaRPr>
-          </a:p>
-          <a:p>
-            <a:r>
-              <a:rPr lang="en-US" dirty="0">
-                <a:solidFill>
-                  <a:schemeClr val="bg1"/>
-                </a:solidFill>
-              </a:rPr>
-              <a:t>The correlation between daily NASDAQ change and US Covid Deaths is -0.01.</a:t>
-            </a:r>
-          </a:p>
-          <a:p>
-            <a:endParaRPr lang="en-US" dirty="0">
-              <a:solidFill>
-                <a:schemeClr val="bg1"/>
-              </a:solidFill>
-            </a:endParaRPr>
-          </a:p>
-          <a:p>
-            <a:r>
-              <a:rPr lang="en-US" dirty="0">
-                <a:solidFill>
-                  <a:schemeClr val="bg1"/>
-                </a:solidFill>
-              </a:rPr>
-              <a:t>The correlation between daily S&amp;P 500 change and US Covid Deaths is -0.04.</a:t>
-            </a:r>
-          </a:p>
-          <a:p>
-            <a:endParaRPr lang="en-US" dirty="0">
-              <a:solidFill>
-                <a:schemeClr val="bg1"/>
-              </a:solidFill>
-            </a:endParaRPr>
-          </a:p>
-          <a:p>
-            <a:r>
-              <a:rPr lang="en-US" dirty="0">
-                <a:solidFill>
-                  <a:schemeClr val="bg1"/>
-                </a:solidFill>
-              </a:rPr>
-              <a:t>The correlation between daily DOW change and US Covid Deaths is 0.0.</a:t>
-            </a:r>
-          </a:p>
-        </p:txBody>
-      </p:sp>
+        </p:spPr>
+      </p:pic>
     </p:spTree>
     <p:extLst>
       <p:ext uri="{BB962C8B-B14F-4D97-AF65-F5344CB8AC3E}">
-        <p14:creationId xmlns:p14="http://schemas.microsoft.com/office/powerpoint/2010/main" val="436767519"/>
+        <p14:creationId xmlns:p14="http://schemas.microsoft.com/office/powerpoint/2010/main" val="44619690"/>
       </p:ext>
     </p:extLst>
   </p:cSld>
@@ -7372,272 +7798,50 @@
       </p:grpSpPr>
       <p:sp>
         <p:nvSpPr>
-          <p:cNvPr id="2" name="Title 1"/>
-          <p:cNvSpPr>
-            <a:spLocks noGrp="1"/>
-          </p:cNvSpPr>
-          <p:nvPr>
-            <p:ph type="title"/>
-          </p:nvPr>
-        </p:nvSpPr>
-        <p:spPr>
-          <a:xfrm>
-            <a:off x="684212" y="154797"/>
-            <a:ext cx="11225992" cy="1242682"/>
-          </a:xfrm>
-        </p:spPr>
-        <p:txBody>
-          <a:bodyPr>
-            <a:normAutofit/>
-          </a:bodyPr>
-          <a:lstStyle/>
-          <a:p>
-            <a:r>
-              <a:rPr lang="en-US" dirty="0"/>
-              <a:t>Question 3: How did the stock market perform in correlation to </a:t>
-            </a:r>
-            <a:r>
-              <a:rPr lang="en-US" dirty="0" err="1"/>
-              <a:t>covid</a:t>
-            </a:r>
-            <a:r>
-              <a:rPr lang="en-US" dirty="0"/>
-              <a:t> deaths?</a:t>
-            </a:r>
-          </a:p>
-        </p:txBody>
-      </p:sp>
-      <p:sp>
-        <p:nvSpPr>
-          <p:cNvPr id="3" name="Text Placeholder 2"/>
-          <p:cNvSpPr>
-            <a:spLocks noGrp="1"/>
-          </p:cNvSpPr>
-          <p:nvPr>
-            <p:ph type="body" idx="1"/>
-          </p:nvPr>
-        </p:nvSpPr>
-        <p:spPr>
-          <a:xfrm>
-            <a:off x="684213" y="1518249"/>
-            <a:ext cx="11047712" cy="5184954"/>
-          </a:xfrm>
-        </p:spPr>
-        <p:txBody>
-          <a:bodyPr>
-            <a:normAutofit/>
-          </a:bodyPr>
-          <a:lstStyle/>
-          <a:p>
-            <a:endParaRPr lang="en-US" dirty="0">
-              <a:solidFill>
-                <a:schemeClr val="bg1"/>
-              </a:solidFill>
-            </a:endParaRPr>
-          </a:p>
-          <a:p>
-            <a:endParaRPr lang="en-US" dirty="0">
-              <a:solidFill>
-                <a:schemeClr val="bg1"/>
-              </a:solidFill>
-            </a:endParaRPr>
-          </a:p>
-          <a:p>
-            <a:endParaRPr lang="en-US" dirty="0">
-              <a:solidFill>
-                <a:schemeClr val="bg1"/>
-              </a:solidFill>
-            </a:endParaRPr>
-          </a:p>
-          <a:p>
-            <a:endParaRPr lang="en-US" dirty="0">
-              <a:solidFill>
-                <a:schemeClr val="bg1"/>
-              </a:solidFill>
-            </a:endParaRPr>
-          </a:p>
-          <a:p>
-            <a:endParaRPr lang="en-US" dirty="0">
-              <a:solidFill>
-                <a:schemeClr val="bg1"/>
-              </a:solidFill>
-            </a:endParaRPr>
-          </a:p>
-          <a:p>
-            <a:endParaRPr lang="en-US" dirty="0">
-              <a:solidFill>
-                <a:schemeClr val="bg1"/>
-              </a:solidFill>
-            </a:endParaRPr>
-          </a:p>
-          <a:p>
-            <a:endParaRPr lang="en-US" dirty="0">
-              <a:solidFill>
-                <a:schemeClr val="bg1"/>
-              </a:solidFill>
-            </a:endParaRPr>
-          </a:p>
-          <a:p>
-            <a:endParaRPr lang="en-US" dirty="0">
-              <a:solidFill>
-                <a:schemeClr val="bg1"/>
-              </a:solidFill>
-            </a:endParaRPr>
-          </a:p>
-          <a:p>
-            <a:endParaRPr lang="en-US" dirty="0">
-              <a:solidFill>
-                <a:schemeClr val="bg1"/>
-              </a:solidFill>
-            </a:endParaRPr>
-          </a:p>
-          <a:p>
-            <a:endParaRPr lang="en-US" dirty="0">
-              <a:solidFill>
-                <a:schemeClr val="bg1"/>
-              </a:solidFill>
-            </a:endParaRPr>
-          </a:p>
-          <a:p>
-            <a:endParaRPr lang="en-US" dirty="0">
-              <a:solidFill>
-                <a:schemeClr val="bg1"/>
-              </a:solidFill>
-            </a:endParaRPr>
-          </a:p>
-          <a:p>
-            <a:endParaRPr lang="en-US" dirty="0">
-              <a:solidFill>
-                <a:schemeClr val="bg1"/>
-              </a:solidFill>
-            </a:endParaRPr>
-          </a:p>
-        </p:txBody>
-      </p:sp>
-      <p:sp>
-        <p:nvSpPr>
-          <p:cNvPr id="6" name="TextBox 5">
+          <p:cNvPr id="2" name="Title 1">
             <a:extLst>
               <a:ext uri="{FF2B5EF4-FFF2-40B4-BE49-F238E27FC236}">
-                <a16:creationId xmlns:a16="http://schemas.microsoft.com/office/drawing/2014/main" id="{82AFC9A5-1D8A-436E-8718-8EBCE4864537}"/>
+                <a16:creationId xmlns:a16="http://schemas.microsoft.com/office/drawing/2014/main" id="{9AB31560-5FA9-4C69-B818-8BEB4C8DCF2B}"/>
               </a:ext>
             </a:extLst>
           </p:cNvPr>
-          <p:cNvSpPr txBox="1"/>
-          <p:nvPr/>
-        </p:nvSpPr>
-        <p:spPr>
-          <a:xfrm>
-            <a:off x="7496432" y="1680519"/>
-            <a:ext cx="3682314" cy="3693319"/>
-          </a:xfrm>
-          <a:prstGeom prst="rect">
-            <a:avLst/>
-          </a:prstGeom>
-          <a:noFill/>
-        </p:spPr>
-        <p:txBody>
-          <a:bodyPr wrap="square" rtlCol="0">
-            <a:spAutoFit/>
+          <p:cNvSpPr>
+            <a:spLocks noGrp="1"/>
+          </p:cNvSpPr>
+          <p:nvPr>
+            <p:ph type="title"/>
+          </p:nvPr>
+        </p:nvSpPr>
+        <p:spPr>
+          <a:xfrm>
+            <a:off x="1057883" y="1846385"/>
+            <a:ext cx="10306173" cy="2268415"/>
+          </a:xfrm>
+        </p:spPr>
+        <p:txBody>
+          <a:bodyPr>
+            <a:normAutofit fontScale="90000"/>
           </a:bodyPr>
           <a:lstStyle/>
           <a:p>
             <a:r>
-              <a:rPr lang="en-US" dirty="0">
-                <a:solidFill>
-                  <a:schemeClr val="bg1"/>
-                </a:solidFill>
-              </a:rPr>
-              <a:t>For Global Covid Death Data:</a:t>
-            </a:r>
-          </a:p>
-          <a:p>
-            <a:endParaRPr lang="en-US" dirty="0">
-              <a:solidFill>
-                <a:schemeClr val="bg1"/>
-              </a:solidFill>
-            </a:endParaRPr>
-          </a:p>
-          <a:p>
-            <a:r>
-              <a:rPr lang="en-US" dirty="0">
-                <a:solidFill>
-                  <a:schemeClr val="bg1"/>
-                </a:solidFill>
-              </a:rPr>
-              <a:t>The correlation between daily NASDAQ change and Global Covid Deaths is 0.01.</a:t>
-            </a:r>
-          </a:p>
-          <a:p>
-            <a:endParaRPr lang="en-US" dirty="0">
-              <a:solidFill>
-                <a:schemeClr val="bg1"/>
-              </a:solidFill>
-            </a:endParaRPr>
-          </a:p>
-          <a:p>
-            <a:r>
-              <a:rPr lang="en-US" dirty="0">
-                <a:solidFill>
-                  <a:schemeClr val="bg1"/>
-                </a:solidFill>
-              </a:rPr>
-              <a:t>The correlation between daily S&amp;P 500 change and Global Covid Deaths is -0.05.</a:t>
-            </a:r>
-          </a:p>
-          <a:p>
-            <a:endParaRPr lang="en-US" dirty="0">
-              <a:solidFill>
-                <a:schemeClr val="bg1"/>
-              </a:solidFill>
-            </a:endParaRPr>
-          </a:p>
-          <a:p>
-            <a:r>
-              <a:rPr lang="en-US" dirty="0">
-                <a:solidFill>
-                  <a:schemeClr val="bg1"/>
-                </a:solidFill>
-              </a:rPr>
-              <a:t>The correlation between daily DOW change and US Global Deaths is -0.05</a:t>
-            </a:r>
-          </a:p>
-        </p:txBody>
-      </p:sp>
-      <p:pic>
-        <p:nvPicPr>
-          <p:cNvPr id="7" name="Picture 6">
-            <a:extLst>
-              <a:ext uri="{FF2B5EF4-FFF2-40B4-BE49-F238E27FC236}">
-                <a16:creationId xmlns:a16="http://schemas.microsoft.com/office/drawing/2014/main" id="{234576BE-CC9D-4EBD-8E3B-BFB54B1D808F}"/>
-              </a:ext>
-            </a:extLst>
-          </p:cNvPr>
-          <p:cNvPicPr>
-            <a:picLocks noChangeAspect="1"/>
-          </p:cNvPicPr>
-          <p:nvPr/>
-        </p:nvPicPr>
-        <p:blipFill>
-          <a:blip r:embed="rId2"/>
-          <a:stretch>
-            <a:fillRect/>
-          </a:stretch>
-        </p:blipFill>
-        <p:spPr>
-          <a:xfrm>
-            <a:off x="-131806" y="1079156"/>
-            <a:ext cx="8073082" cy="5045676"/>
-          </a:xfrm>
-          <a:prstGeom prst="rect">
-            <a:avLst/>
-          </a:prstGeom>
-        </p:spPr>
-      </p:pic>
+              <a:rPr lang="en-US" dirty="0"/>
+              <a:t>Conclusion: </a:t>
+            </a:r>
+            <a:br>
+              <a:rPr lang="en-US" dirty="0"/>
+            </a:br>
+            <a:r>
+              <a:rPr lang="en-US" dirty="0"/>
+              <a:t>polynomial Regression provides a more accurate prediction than linear regression but there are better machine learning models for predicting time-series data such as LSTM(Long Short Term Memory)</a:t>
+            </a:r>
+          </a:p>
+        </p:txBody>
+      </p:sp>
     </p:spTree>
     <p:extLst>
       <p:ext uri="{BB962C8B-B14F-4D97-AF65-F5344CB8AC3E}">
-        <p14:creationId xmlns:p14="http://schemas.microsoft.com/office/powerpoint/2010/main" val="3321936870"/>
+        <p14:creationId xmlns:p14="http://schemas.microsoft.com/office/powerpoint/2010/main" val="2598162917"/>
       </p:ext>
     </p:extLst>
   </p:cSld>
@@ -7719,18 +7923,168 @@
         </p:spPr>
         <p:txBody>
           <a:bodyPr>
-            <a:normAutofit fontScale="92500" lnSpcReduction="10000"/>
+            <a:normAutofit/>
           </a:bodyPr>
           <a:lstStyle/>
           <a:p>
-            <a:r>
-              <a:rPr lang="en-US" b="1" dirty="0">
+            <a:endParaRPr lang="en-US" dirty="0">
+              <a:solidFill>
+                <a:schemeClr val="bg1"/>
+              </a:solidFill>
+            </a:endParaRPr>
+          </a:p>
+          <a:p>
+            <a:endParaRPr lang="en-US" dirty="0">
+              <a:solidFill>
+                <a:schemeClr val="bg1"/>
+              </a:solidFill>
+            </a:endParaRPr>
+          </a:p>
+          <a:p>
+            <a:endParaRPr lang="en-US" dirty="0">
+              <a:solidFill>
+                <a:schemeClr val="bg1"/>
+              </a:solidFill>
+            </a:endParaRPr>
+          </a:p>
+          <a:p>
+            <a:endParaRPr lang="en-US" dirty="0">
+              <a:solidFill>
+                <a:schemeClr val="bg1"/>
+              </a:solidFill>
+            </a:endParaRPr>
+          </a:p>
+          <a:p>
+            <a:endParaRPr lang="en-US" dirty="0">
+              <a:solidFill>
+                <a:schemeClr val="bg1"/>
+              </a:solidFill>
+            </a:endParaRPr>
+          </a:p>
+          <a:p>
+            <a:endParaRPr lang="en-US" dirty="0">
+              <a:solidFill>
+                <a:schemeClr val="bg1"/>
+              </a:solidFill>
+            </a:endParaRPr>
+          </a:p>
+          <a:p>
+            <a:endParaRPr lang="en-US" dirty="0">
+              <a:solidFill>
+                <a:schemeClr val="bg1"/>
+              </a:solidFill>
+            </a:endParaRPr>
+          </a:p>
+          <a:p>
+            <a:endParaRPr lang="en-US" dirty="0">
+              <a:solidFill>
+                <a:schemeClr val="bg1"/>
+              </a:solidFill>
+            </a:endParaRPr>
+          </a:p>
+          <a:p>
+            <a:endParaRPr lang="en-US" dirty="0">
+              <a:solidFill>
+                <a:schemeClr val="bg1"/>
+              </a:solidFill>
+            </a:endParaRPr>
+          </a:p>
+          <a:p>
+            <a:endParaRPr lang="en-US" dirty="0">
+              <a:solidFill>
+                <a:schemeClr val="bg1"/>
+              </a:solidFill>
+            </a:endParaRPr>
+          </a:p>
+          <a:p>
+            <a:endParaRPr lang="en-US" dirty="0">
+              <a:solidFill>
+                <a:schemeClr val="bg1"/>
+              </a:solidFill>
+            </a:endParaRPr>
+          </a:p>
+          <a:p>
+            <a:endParaRPr lang="en-US" dirty="0">
+              <a:solidFill>
+                <a:schemeClr val="bg1"/>
+              </a:solidFill>
+            </a:endParaRPr>
+          </a:p>
+        </p:txBody>
+      </p:sp>
+      <p:pic>
+        <p:nvPicPr>
+          <p:cNvPr id="5" name="Picture 4">
+            <a:extLst>
+              <a:ext uri="{FF2B5EF4-FFF2-40B4-BE49-F238E27FC236}">
+                <a16:creationId xmlns:a16="http://schemas.microsoft.com/office/drawing/2014/main" id="{EA1399E7-6309-4723-86AD-38062D8F1D72}"/>
+              </a:ext>
+            </a:extLst>
+          </p:cNvPr>
+          <p:cNvPicPr>
+            <a:picLocks noChangeAspect="1"/>
+          </p:cNvPicPr>
+          <p:nvPr/>
+        </p:nvPicPr>
+        <p:blipFill>
+          <a:blip r:embed="rId2"/>
+          <a:stretch>
+            <a:fillRect/>
+          </a:stretch>
+        </p:blipFill>
+        <p:spPr>
+          <a:xfrm>
+            <a:off x="-98383" y="1042749"/>
+            <a:ext cx="8031421" cy="5019638"/>
+          </a:xfrm>
+          <a:prstGeom prst="rect">
+            <a:avLst/>
+          </a:prstGeom>
+        </p:spPr>
+      </p:pic>
+      <p:sp>
+        <p:nvSpPr>
+          <p:cNvPr id="6" name="TextBox 5">
+            <a:extLst>
+              <a:ext uri="{FF2B5EF4-FFF2-40B4-BE49-F238E27FC236}">
+                <a16:creationId xmlns:a16="http://schemas.microsoft.com/office/drawing/2014/main" id="{82AFC9A5-1D8A-436E-8718-8EBCE4864537}"/>
+              </a:ext>
+            </a:extLst>
+          </p:cNvPr>
+          <p:cNvSpPr txBox="1"/>
+          <p:nvPr/>
+        </p:nvSpPr>
+        <p:spPr>
+          <a:xfrm>
+            <a:off x="7496432" y="1680519"/>
+            <a:ext cx="3682314" cy="3693319"/>
+          </a:xfrm>
+          <a:prstGeom prst="rect">
+            <a:avLst/>
+          </a:prstGeom>
+          <a:noFill/>
+        </p:spPr>
+        <p:txBody>
+          <a:bodyPr wrap="square" rtlCol="0">
+            <a:spAutoFit/>
+          </a:bodyPr>
+          <a:lstStyle/>
+          <a:p>
+            <a:r>
+              <a:rPr lang="en-US" dirty="0">
                 <a:solidFill>
                   <a:schemeClr val="bg1"/>
                 </a:solidFill>
               </a:rPr>
-              <a:t>Question:</a:t>
-            </a:r>
+              <a:t>For US Covid Death Data:</a:t>
+            </a:r>
+          </a:p>
+          <a:p>
+            <a:endParaRPr lang="en-US" dirty="0">
+              <a:solidFill>
+                <a:schemeClr val="bg1"/>
+              </a:solidFill>
+            </a:endParaRPr>
           </a:p>
           <a:p>
             <a:r>
@@ -7739,70 +8093,41 @@
                   <a:schemeClr val="bg1"/>
                 </a:solidFill>
               </a:rPr>
-              <a:t>Did the daily number of covid deaths correlate with the daily performance of the stock market?</a:t>
-            </a:r>
-          </a:p>
-          <a:p>
-            <a:r>
-              <a:rPr lang="en-US" b="1" dirty="0">
+              <a:t>The correlation between daily NASDAQ change and US Covid Deaths is -0.01.</a:t>
+            </a:r>
+          </a:p>
+          <a:p>
+            <a:endParaRPr lang="en-US" dirty="0">
+              <a:solidFill>
+                <a:schemeClr val="bg1"/>
+              </a:solidFill>
+            </a:endParaRPr>
+          </a:p>
+          <a:p>
+            <a:r>
+              <a:rPr lang="en-US" dirty="0">
                 <a:solidFill>
                   <a:schemeClr val="bg1"/>
                 </a:solidFill>
               </a:rPr>
-              <a:t>Analysis:</a:t>
-            </a:r>
-          </a:p>
-          <a:p>
-            <a:pPr lvl="1"/>
+              <a:t>The correlation between daily S&amp;P 500 change and US Covid Deaths is -0.04.</a:t>
+            </a:r>
+          </a:p>
+          <a:p>
+            <a:endParaRPr lang="en-US" dirty="0">
+              <a:solidFill>
+                <a:schemeClr val="bg1"/>
+              </a:solidFill>
+            </a:endParaRPr>
+          </a:p>
+          <a:p>
             <a:r>
               <a:rPr lang="en-US" dirty="0">
                 <a:solidFill>
                   <a:schemeClr val="bg1"/>
                 </a:solidFill>
               </a:rPr>
-              <a:t>Initially the assumption was that there would be some correlation between a greater number of covid deaths and a lower stock market performance.</a:t>
-            </a:r>
-          </a:p>
-          <a:p>
-            <a:pPr lvl="1"/>
-            <a:r>
-              <a:rPr lang="en-US" dirty="0">
-                <a:solidFill>
-                  <a:schemeClr val="bg1"/>
-                </a:solidFill>
-              </a:rPr>
-              <a:t>Comparing the US covid death data and the stock market showed that there was almost no correlation.  The stock marked start to drop in the beginning, but almost all of this drop was before the US deaths started.</a:t>
-            </a:r>
-          </a:p>
-          <a:p>
-            <a:pPr lvl="1"/>
-            <a:r>
-              <a:rPr lang="en-US" dirty="0">
-                <a:solidFill>
-                  <a:schemeClr val="bg1"/>
-                </a:solidFill>
-              </a:rPr>
-              <a:t>Since the US was not the first country to have covid exposure, the next step was to compare global covid deaths with stock market performance.  The global data did show more of a correlation for about the first month of the pandemic.  However, from that point forward the stock market generally went up regardless of higher or lower global covid deaths.  There was a spike in global deaths from November 2020 through January 2021, but the stock market continued to go up during that period (which is the opposite of what was seen in the first month of the pandemic).</a:t>
-            </a:r>
-          </a:p>
-          <a:p>
-            <a:r>
-              <a:rPr lang="en-US" b="1" dirty="0">
-                <a:solidFill>
-                  <a:schemeClr val="bg1"/>
-                </a:solidFill>
-              </a:rPr>
-              <a:t>Conclusion:</a:t>
-            </a:r>
-          </a:p>
-          <a:p>
-            <a:r>
-              <a:rPr lang="en-US" dirty="0">
-                <a:solidFill>
-                  <a:schemeClr val="bg1"/>
-                </a:solidFill>
-              </a:rPr>
-              <a:t>Over the first year of the pandemic, it does not appear that there was a direct correlation, with the possible exception of the first month in which there was a slight negative correlation (NASDAQ -0.13, S&amp;P 500 -0.17, DOW -0.17).</a:t>
+              <a:t>The correlation between daily DOW change and US Covid Deaths is 0.0.</a:t>
             </a:r>
           </a:p>
         </p:txBody>
@@ -7810,7 +8135,7 @@
     </p:spTree>
     <p:extLst>
       <p:ext uri="{BB962C8B-B14F-4D97-AF65-F5344CB8AC3E}">
-        <p14:creationId xmlns:p14="http://schemas.microsoft.com/office/powerpoint/2010/main" val="1361964820"/>
+        <p14:creationId xmlns:p14="http://schemas.microsoft.com/office/powerpoint/2010/main" val="436767519"/>
       </p:ext>
     </p:extLst>
   </p:cSld>

</xml_diff>

<commit_message>
added 1 more rocket
</commit_message>
<xml_diff>
--- a/Project1.pptx
+++ b/Project1.pptx
@@ -5606,7 +5606,7 @@
           <p:cNvPr id="6" name="TextBox 5">
             <a:extLst>
               <a:ext uri="{FF2B5EF4-FFF2-40B4-BE49-F238E27FC236}">
-                <a16:creationId xmlns:a16="http://schemas.microsoft.com/office/drawing/2014/main" id="{82AFC9A5-1D8A-436E-8718-8EBCE4864537}"/>
+                <a16:creationId xmlns:a16="http://schemas.microsoft.com/office/drawing/2014/main" xmlns="" id="{82AFC9A5-1D8A-436E-8718-8EBCE4864537}"/>
               </a:ext>
             </a:extLst>
           </p:cNvPr>
@@ -5696,7 +5696,7 @@
           <p:cNvPr id="7" name="Picture 6">
             <a:extLst>
               <a:ext uri="{FF2B5EF4-FFF2-40B4-BE49-F238E27FC236}">
-                <a16:creationId xmlns:a16="http://schemas.microsoft.com/office/drawing/2014/main" id="{234576BE-CC9D-4EBD-8E3B-BFB54B1D808F}"/>
+                <a16:creationId xmlns:a16="http://schemas.microsoft.com/office/drawing/2014/main" xmlns="" id="{234576BE-CC9D-4EBD-8E3B-BFB54B1D808F}"/>
               </a:ext>
             </a:extLst>
           </p:cNvPr>
@@ -6115,7 +6115,7 @@
       </p:pic>
       <p:pic>
         <p:nvPicPr>
-          <p:cNvPr id="5" name="Picture 4"/>
+          <p:cNvPr id="7" name="Picture 6"/>
           <p:cNvPicPr>
             <a:picLocks noChangeAspect="1"/>
           </p:cNvPicPr>
@@ -6129,13 +6129,13 @@
               </a:ext>
             </a:extLst>
           </a:blip>
-          <a:srcRect l="839" t="10495"/>
+          <a:srcRect l="315" t="10849"/>
           <a:stretch/>
         </p:blipFill>
         <p:spPr>
           <a:xfrm>
-            <a:off x="0" y="3536832"/>
-            <a:ext cx="5244860" cy="3156063"/>
+            <a:off x="4537495" y="276045"/>
+            <a:ext cx="5469158" cy="3260787"/>
           </a:xfrm>
           <a:prstGeom prst="rect">
             <a:avLst/>
@@ -6144,14 +6144,14 @@
       </p:pic>
       <p:sp>
         <p:nvSpPr>
-          <p:cNvPr id="6" name="TextBox 5"/>
+          <p:cNvPr id="8" name="TextBox 7"/>
           <p:cNvSpPr txBox="1"/>
           <p:nvPr/>
         </p:nvSpPr>
         <p:spPr>
           <a:xfrm>
-            <a:off x="1078303" y="3259833"/>
-            <a:ext cx="3312543" cy="276999"/>
+            <a:off x="5883215" y="51408"/>
+            <a:ext cx="3804249" cy="276999"/>
           </a:xfrm>
           <a:prstGeom prst="rect">
             <a:avLst/>
@@ -6170,20 +6170,73 @@
                   <a:schemeClr val="bg1"/>
                 </a:solidFill>
               </a:rPr>
-              <a:t>Daily Percent Change Before May</a:t>
+              <a:t>Daily Percent Change After May</a:t>
+            </a:r>
+          </a:p>
+        </p:txBody>
+      </p:sp>
+      <p:sp>
+        <p:nvSpPr>
+          <p:cNvPr id="9" name="TextBox 8"/>
+          <p:cNvSpPr txBox="1"/>
+          <p:nvPr/>
+        </p:nvSpPr>
+        <p:spPr>
+          <a:xfrm>
+            <a:off x="5244860" y="3813831"/>
+            <a:ext cx="5417389" cy="1754326"/>
+          </a:xfrm>
+          <a:prstGeom prst="rect">
+            <a:avLst/>
+          </a:prstGeom>
+          <a:noFill/>
+        </p:spPr>
+        <p:txBody>
+          <a:bodyPr wrap="square" rtlCol="0">
+            <a:spAutoFit/>
+          </a:bodyPr>
+          <a:lstStyle/>
+          <a:p>
+            <a:pPr marL="285750" indent="-285750">
+              <a:buFont typeface="Arial" panose="020B0604020202020204" pitchFamily="34" charset="0"/>
+              <a:buChar char="•"/>
+            </a:pPr>
+            <a:r>
+              <a:rPr lang="en-US" dirty="0"/>
+              <a:t>The market has much greater volatility before May </a:t>
+            </a:r>
+          </a:p>
+          <a:p>
+            <a:pPr marL="285750" indent="-285750">
+              <a:buFont typeface="Arial" panose="020B0604020202020204" pitchFamily="34" charset="0"/>
+              <a:buChar char="•"/>
+            </a:pPr>
+            <a:r>
+              <a:rPr lang="en-US" dirty="0"/>
+              <a:t>The outlier Upper Bound is 1.70, and Lower Bound is -1.50 after May.</a:t>
+            </a:r>
+          </a:p>
+          <a:p>
+            <a:pPr marL="285750" indent="-285750">
+              <a:buFont typeface="Arial" panose="020B0604020202020204" pitchFamily="34" charset="0"/>
+              <a:buChar char="•"/>
+            </a:pPr>
+            <a:r>
+              <a:rPr lang="en-US" dirty="0"/>
+              <a:t>The outlier Upper Bound is 2.79, and Lower Bound is -3.03 before May</a:t>
             </a:r>
           </a:p>
         </p:txBody>
       </p:sp>
       <p:pic>
         <p:nvPicPr>
-          <p:cNvPr id="7" name="Picture 6"/>
+          <p:cNvPr id="2" name="Picture 1"/>
           <p:cNvPicPr>
             <a:picLocks noChangeAspect="1"/>
           </p:cNvPicPr>
           <p:nvPr/>
         </p:nvPicPr>
-        <p:blipFill rotWithShape="1">
+        <p:blipFill>
           <a:blip r:embed="rId4">
             <a:extLst>
               <a:ext uri="{28A0092B-C50C-407E-A947-70E740481C1C}">
@@ -6191,105 +6244,20 @@
               </a:ext>
             </a:extLst>
           </a:blip>
-          <a:srcRect l="315" t="10849"/>
-          <a:stretch/>
+          <a:stretch>
+            <a:fillRect/>
+          </a:stretch>
         </p:blipFill>
         <p:spPr>
           <a:xfrm>
-            <a:off x="4537495" y="276045"/>
-            <a:ext cx="5469158" cy="3260787"/>
+            <a:off x="69013" y="3192026"/>
+            <a:ext cx="4991658" cy="3327771"/>
           </a:xfrm>
           <a:prstGeom prst="rect">
             <a:avLst/>
           </a:prstGeom>
         </p:spPr>
       </p:pic>
-      <p:sp>
-        <p:nvSpPr>
-          <p:cNvPr id="8" name="TextBox 7"/>
-          <p:cNvSpPr txBox="1"/>
-          <p:nvPr/>
-        </p:nvSpPr>
-        <p:spPr>
-          <a:xfrm>
-            <a:off x="5883215" y="51408"/>
-            <a:ext cx="3804249" cy="276999"/>
-          </a:xfrm>
-          <a:prstGeom prst="rect">
-            <a:avLst/>
-          </a:prstGeom>
-          <a:noFill/>
-        </p:spPr>
-        <p:txBody>
-          <a:bodyPr wrap="square" rtlCol="0">
-            <a:spAutoFit/>
-          </a:bodyPr>
-          <a:lstStyle/>
-          <a:p>
-            <a:r>
-              <a:rPr lang="en-US" sz="1200" b="1" dirty="0">
-                <a:solidFill>
-                  <a:schemeClr val="bg1"/>
-                </a:solidFill>
-              </a:rPr>
-              <a:t>Daily Percent Change After May</a:t>
-            </a:r>
-          </a:p>
-        </p:txBody>
-      </p:sp>
-      <p:sp>
-        <p:nvSpPr>
-          <p:cNvPr id="9" name="TextBox 8"/>
-          <p:cNvSpPr txBox="1"/>
-          <p:nvPr/>
-        </p:nvSpPr>
-        <p:spPr>
-          <a:xfrm>
-            <a:off x="5244860" y="3813831"/>
-            <a:ext cx="5417389" cy="1754326"/>
-          </a:xfrm>
-          <a:prstGeom prst="rect">
-            <a:avLst/>
-          </a:prstGeom>
-          <a:noFill/>
-        </p:spPr>
-        <p:txBody>
-          <a:bodyPr wrap="square" rtlCol="0">
-            <a:spAutoFit/>
-          </a:bodyPr>
-          <a:lstStyle/>
-          <a:p>
-            <a:pPr marL="285750" indent="-285750">
-              <a:buFont typeface="Arial" panose="020B0604020202020204" pitchFamily="34" charset="0"/>
-              <a:buChar char="•"/>
-            </a:pPr>
-            <a:r>
-              <a:rPr lang="en-US" dirty="0"/>
-              <a:t>The market has much greater volatility before May </a:t>
-            </a:r>
-          </a:p>
-          <a:p>
-            <a:pPr marL="285750" indent="-285750">
-              <a:buFont typeface="Arial" panose="020B0604020202020204" pitchFamily="34" charset="0"/>
-              <a:buChar char="•"/>
-            </a:pPr>
-            <a:r>
-              <a:rPr lang="en-US" dirty="0"/>
-              <a:t>The outlier Upper Bound is 1.70, and Lower Bound is -1.50 after May.</a:t>
-            </a:r>
-          </a:p>
-          <a:p>
-            <a:pPr marL="285750" indent="-285750">
-              <a:buFont typeface="Arial" panose="020B0604020202020204" pitchFamily="34" charset="0"/>
-              <a:buChar char="•"/>
-            </a:pPr>
-            <a:r>
-              <a:rPr lang="en-US" dirty="0"/>
-              <a:t>The outlier Upper Bound is 2.79, and Lower Bound is -3.03 before May</a:t>
-            </a:r>
-          </a:p>
-        </p:txBody>
-      </p:sp>
     </p:spTree>
     <p:extLst>
       <p:ext uri="{BB962C8B-B14F-4D97-AF65-F5344CB8AC3E}">
@@ -6371,7 +6339,7 @@
         </p:blipFill>
         <p:spPr>
           <a:xfrm>
-            <a:off x="318304" y="1091466"/>
+            <a:off x="0" y="1091466"/>
             <a:ext cx="4745770" cy="5519662"/>
           </a:xfrm>
           <a:prstGeom prst="rect">
@@ -6401,8 +6369,8 @@
         </p:blipFill>
         <p:spPr>
           <a:xfrm>
-            <a:off x="6318847" y="1091466"/>
-            <a:ext cx="4685019" cy="5449003"/>
+            <a:off x="3662717" y="1091466"/>
+            <a:ext cx="4685019" cy="5519662"/>
           </a:xfrm>
           <a:prstGeom prst="rect">
             <a:avLst/>
@@ -6417,8 +6385,8 @@
         </p:nvSpPr>
         <p:spPr>
           <a:xfrm>
-            <a:off x="1837427" y="1091466"/>
-            <a:ext cx="2329132" cy="366398"/>
+            <a:off x="1259457" y="1091466"/>
+            <a:ext cx="2907102" cy="366398"/>
           </a:xfrm>
           <a:prstGeom prst="rect">
             <a:avLst/>
@@ -6432,12 +6400,20 @@
           <a:lstStyle/>
           <a:p>
             <a:r>
+              <a:rPr lang="en-US" b="1" dirty="0" smtClean="0">
+                <a:solidFill>
+                  <a:schemeClr val="bg1"/>
+                </a:solidFill>
+              </a:rPr>
+              <a:t>Drop Before </a:t>
+            </a:r>
+            <a:r>
               <a:rPr lang="en-US" b="1" dirty="0">
                 <a:solidFill>
                   <a:schemeClr val="bg1"/>
                 </a:solidFill>
               </a:rPr>
-              <a:t>Before MAY</a:t>
+              <a:t>MAY</a:t>
             </a:r>
           </a:p>
         </p:txBody>
@@ -6450,8 +6426,8 @@
         </p:nvSpPr>
         <p:spPr>
           <a:xfrm>
-            <a:off x="7898922" y="1091466"/>
-            <a:ext cx="2329132" cy="366398"/>
+            <a:off x="5201728" y="1091466"/>
+            <a:ext cx="2813086" cy="366398"/>
           </a:xfrm>
           <a:prstGeom prst="rect">
             <a:avLst/>
@@ -6465,12 +6441,83 @@
           <a:lstStyle/>
           <a:p>
             <a:r>
+              <a:rPr lang="en-US" b="1" dirty="0" smtClean="0">
+                <a:solidFill>
+                  <a:schemeClr val="bg1"/>
+                </a:solidFill>
+              </a:rPr>
+              <a:t>Drops After </a:t>
+            </a:r>
+            <a:r>
               <a:rPr lang="en-US" b="1" dirty="0">
                 <a:solidFill>
                   <a:schemeClr val="bg1"/>
                 </a:solidFill>
               </a:rPr>
-              <a:t>After MAY</a:t>
+              <a:t>MAY</a:t>
+            </a:r>
+          </a:p>
+        </p:txBody>
+      </p:sp>
+      <p:pic>
+        <p:nvPicPr>
+          <p:cNvPr id="2" name="Picture 1"/>
+          <p:cNvPicPr>
+            <a:picLocks noChangeAspect="1"/>
+          </p:cNvPicPr>
+          <p:nvPr/>
+        </p:nvPicPr>
+        <p:blipFill>
+          <a:blip r:embed="rId4">
+            <a:extLst>
+              <a:ext uri="{28A0092B-C50C-407E-A947-70E740481C1C}">
+                <a14:useLocalDpi xmlns:a14="http://schemas.microsoft.com/office/drawing/2010/main" val="0"/>
+              </a:ext>
+            </a:extLst>
+          </a:blip>
+          <a:stretch>
+            <a:fillRect/>
+          </a:stretch>
+        </p:blipFill>
+        <p:spPr>
+          <a:xfrm>
+            <a:off x="7530860" y="1091466"/>
+            <a:ext cx="4753155" cy="5519662"/>
+          </a:xfrm>
+          <a:prstGeom prst="rect">
+            <a:avLst/>
+          </a:prstGeom>
+        </p:spPr>
+      </p:pic>
+      <p:sp>
+        <p:nvSpPr>
+          <p:cNvPr id="3" name="TextBox 2"/>
+          <p:cNvSpPr txBox="1"/>
+          <p:nvPr/>
+        </p:nvSpPr>
+        <p:spPr>
+          <a:xfrm>
+            <a:off x="8928340" y="1091466"/>
+            <a:ext cx="2493034" cy="369332"/>
+          </a:xfrm>
+          <a:prstGeom prst="rect">
+            <a:avLst/>
+          </a:prstGeom>
+          <a:noFill/>
+        </p:spPr>
+        <p:txBody>
+          <a:bodyPr wrap="square" rtlCol="0">
+            <a:spAutoFit/>
+          </a:bodyPr>
+          <a:lstStyle/>
+          <a:p>
+            <a:r>
+              <a:rPr lang="en-US" b="1" dirty="0" smtClean="0">
+                <a:solidFill>
+                  <a:schemeClr val="bg1"/>
+                </a:solidFill>
+              </a:rPr>
+              <a:t>Gains (Combined)</a:t>
             </a:r>
           </a:p>
         </p:txBody>
@@ -6485,6 +6532,13 @@
   <p:clrMapOvr>
     <a:masterClrMapping/>
   </p:clrMapOvr>
+  <p:timing>
+    <p:tnLst>
+      <p:par>
+        <p:cTn id="1" dur="indefinite" restart="never" nodeType="tmRoot"/>
+      </p:par>
+    </p:tnLst>
+  </p:timing>
 </p:sld>
 </file>
 
@@ -6857,6 +6911,14 @@
               </a:rPr>
               <a:t>NinjaTrader</a:t>
             </a:r>
+            <a:r>
+              <a:rPr lang="en-US" dirty="0">
+                <a:solidFill>
+                  <a:schemeClr val="bg1"/>
+                </a:solidFill>
+              </a:rPr>
+              <a:t/>
+            </a:r>
             <a:br>
               <a:rPr lang="en-US" dirty="0">
                 <a:solidFill>
@@ -7031,7 +7093,7 @@
           <p:cNvPr id="2050" name="Picture 2">
             <a:extLst>
               <a:ext uri="{FF2B5EF4-FFF2-40B4-BE49-F238E27FC236}">
-                <a16:creationId xmlns:a16="http://schemas.microsoft.com/office/drawing/2014/main" id="{55016512-736B-4816-9682-4494EE519C90}"/>
+                <a16:creationId xmlns:a16="http://schemas.microsoft.com/office/drawing/2014/main" xmlns="" id="{55016512-736B-4816-9682-4494EE519C90}"/>
               </a:ext>
             </a:extLst>
           </p:cNvPr>
@@ -7108,7 +7170,7 @@
           <p:cNvPr id="4" name="Text Placeholder 3">
             <a:extLst>
               <a:ext uri="{FF2B5EF4-FFF2-40B4-BE49-F238E27FC236}">
-                <a16:creationId xmlns:a16="http://schemas.microsoft.com/office/drawing/2014/main" id="{0C518CE1-87B1-4415-9560-7BBD26D87F5E}"/>
+                <a16:creationId xmlns:a16="http://schemas.microsoft.com/office/drawing/2014/main" xmlns="" id="{0C518CE1-87B1-4415-9560-7BBD26D87F5E}"/>
               </a:ext>
             </a:extLst>
           </p:cNvPr>
@@ -7158,7 +7220,7 @@
           <p:cNvPr id="3076" name="Picture 4">
             <a:extLst>
               <a:ext uri="{FF2B5EF4-FFF2-40B4-BE49-F238E27FC236}">
-                <a16:creationId xmlns:a16="http://schemas.microsoft.com/office/drawing/2014/main" id="{0D0CAF4A-458E-4427-9039-AC1168DA98BA}"/>
+                <a16:creationId xmlns:a16="http://schemas.microsoft.com/office/drawing/2014/main" xmlns="" id="{0D0CAF4A-458E-4427-9039-AC1168DA98BA}"/>
               </a:ext>
             </a:extLst>
           </p:cNvPr>
@@ -7205,7 +7267,7 @@
           <p:cNvPr id="3080" name="Picture 8">
             <a:extLst>
               <a:ext uri="{FF2B5EF4-FFF2-40B4-BE49-F238E27FC236}">
-                <a16:creationId xmlns:a16="http://schemas.microsoft.com/office/drawing/2014/main" id="{608F6648-75F5-453A-8461-6A5B2E1B2165}"/>
+                <a16:creationId xmlns:a16="http://schemas.microsoft.com/office/drawing/2014/main" xmlns="" id="{608F6648-75F5-453A-8461-6A5B2E1B2165}"/>
               </a:ext>
             </a:extLst>
           </p:cNvPr>
@@ -7282,7 +7344,7 @@
           <p:cNvPr id="2" name="Title 1">
             <a:extLst>
               <a:ext uri="{FF2B5EF4-FFF2-40B4-BE49-F238E27FC236}">
-                <a16:creationId xmlns:a16="http://schemas.microsoft.com/office/drawing/2014/main" id="{816A84C7-63B0-497F-B745-10971956DDAA}"/>
+                <a16:creationId xmlns:a16="http://schemas.microsoft.com/office/drawing/2014/main" xmlns="" id="{816A84C7-63B0-497F-B745-10971956DDAA}"/>
               </a:ext>
             </a:extLst>
           </p:cNvPr>
@@ -7315,7 +7377,7 @@
           <p:cNvPr id="3" name="Text Placeholder 2">
             <a:extLst>
               <a:ext uri="{FF2B5EF4-FFF2-40B4-BE49-F238E27FC236}">
-                <a16:creationId xmlns:a16="http://schemas.microsoft.com/office/drawing/2014/main" id="{525B9D3F-FA03-4202-A142-B5AADB5A1D1F}"/>
+                <a16:creationId xmlns:a16="http://schemas.microsoft.com/office/drawing/2014/main" xmlns="" id="{525B9D3F-FA03-4202-A142-B5AADB5A1D1F}"/>
               </a:ext>
             </a:extLst>
           </p:cNvPr>
@@ -7489,7 +7551,7 @@
           <p:cNvPr id="5" name="Picture 4" descr="Chart, line chart&#10;&#10;Description automatically generated">
             <a:extLst>
               <a:ext uri="{FF2B5EF4-FFF2-40B4-BE49-F238E27FC236}">
-                <a16:creationId xmlns:a16="http://schemas.microsoft.com/office/drawing/2014/main" id="{5518163D-1008-4916-9DD4-085D43F88D3D}"/>
+                <a16:creationId xmlns:a16="http://schemas.microsoft.com/office/drawing/2014/main" xmlns="" id="{5518163D-1008-4916-9DD4-085D43F88D3D}"/>
               </a:ext>
             </a:extLst>
           </p:cNvPr>
@@ -7519,7 +7581,7 @@
           <p:cNvPr id="7" name="Picture 6">
             <a:extLst>
               <a:ext uri="{FF2B5EF4-FFF2-40B4-BE49-F238E27FC236}">
-                <a16:creationId xmlns:a16="http://schemas.microsoft.com/office/drawing/2014/main" id="{DF30E173-6C1B-41E6-B648-0CCEDFBFDB79}"/>
+                <a16:creationId xmlns:a16="http://schemas.microsoft.com/office/drawing/2014/main" xmlns="" id="{DF30E173-6C1B-41E6-B648-0CCEDFBFDB79}"/>
               </a:ext>
             </a:extLst>
           </p:cNvPr>
@@ -7579,7 +7641,7 @@
           <p:cNvPr id="2" name="Title 1">
             <a:extLst>
               <a:ext uri="{FF2B5EF4-FFF2-40B4-BE49-F238E27FC236}">
-                <a16:creationId xmlns:a16="http://schemas.microsoft.com/office/drawing/2014/main" id="{47287D70-E8D8-45FF-A602-278B17EDAA4F}"/>
+                <a16:creationId xmlns:a16="http://schemas.microsoft.com/office/drawing/2014/main" xmlns="" id="{47287D70-E8D8-45FF-A602-278B17EDAA4F}"/>
               </a:ext>
             </a:extLst>
           </p:cNvPr>
@@ -7612,7 +7674,7 @@
           <p:cNvPr id="4" name="Text Placeholder 3">
             <a:extLst>
               <a:ext uri="{FF2B5EF4-FFF2-40B4-BE49-F238E27FC236}">
-                <a16:creationId xmlns:a16="http://schemas.microsoft.com/office/drawing/2014/main" id="{508CB0EF-3688-4243-9320-D37CAB7BF1B7}"/>
+                <a16:creationId xmlns:a16="http://schemas.microsoft.com/office/drawing/2014/main" xmlns="" id="{508CB0EF-3688-4243-9320-D37CAB7BF1B7}"/>
               </a:ext>
             </a:extLst>
           </p:cNvPr>
@@ -7711,7 +7773,7 @@
           <p:cNvPr id="10" name="Picture 9" descr="Chart, histogram&#10;&#10;Description automatically generated">
             <a:extLst>
               <a:ext uri="{FF2B5EF4-FFF2-40B4-BE49-F238E27FC236}">
-                <a16:creationId xmlns:a16="http://schemas.microsoft.com/office/drawing/2014/main" id="{54F1F3DD-29E8-439D-90EA-7CA53231F0EC}"/>
+                <a16:creationId xmlns:a16="http://schemas.microsoft.com/office/drawing/2014/main" xmlns="" id="{54F1F3DD-29E8-439D-90EA-7CA53231F0EC}"/>
               </a:ext>
             </a:extLst>
           </p:cNvPr>
@@ -7741,7 +7803,7 @@
           <p:cNvPr id="12" name="Picture 11">
             <a:extLst>
               <a:ext uri="{FF2B5EF4-FFF2-40B4-BE49-F238E27FC236}">
-                <a16:creationId xmlns:a16="http://schemas.microsoft.com/office/drawing/2014/main" id="{61A22602-5AB0-44C4-B54B-898E3585569A}"/>
+                <a16:creationId xmlns:a16="http://schemas.microsoft.com/office/drawing/2014/main" xmlns="" id="{61A22602-5AB0-44C4-B54B-898E3585569A}"/>
               </a:ext>
             </a:extLst>
           </p:cNvPr>
@@ -7801,7 +7863,7 @@
           <p:cNvPr id="2" name="Title 1">
             <a:extLst>
               <a:ext uri="{FF2B5EF4-FFF2-40B4-BE49-F238E27FC236}">
-                <a16:creationId xmlns:a16="http://schemas.microsoft.com/office/drawing/2014/main" id="{9AB31560-5FA9-4C69-B818-8BEB4C8DCF2B}"/>
+                <a16:creationId xmlns:a16="http://schemas.microsoft.com/office/drawing/2014/main" xmlns="" id="{9AB31560-5FA9-4C69-B818-8BEB4C8DCF2B}"/>
               </a:ext>
             </a:extLst>
           </p:cNvPr>
@@ -8017,7 +8079,7 @@
           <p:cNvPr id="5" name="Picture 4">
             <a:extLst>
               <a:ext uri="{FF2B5EF4-FFF2-40B4-BE49-F238E27FC236}">
-                <a16:creationId xmlns:a16="http://schemas.microsoft.com/office/drawing/2014/main" id="{EA1399E7-6309-4723-86AD-38062D8F1D72}"/>
+                <a16:creationId xmlns:a16="http://schemas.microsoft.com/office/drawing/2014/main" xmlns="" id="{EA1399E7-6309-4723-86AD-38062D8F1D72}"/>
               </a:ext>
             </a:extLst>
           </p:cNvPr>
@@ -8047,7 +8109,7 @@
           <p:cNvPr id="6" name="TextBox 5">
             <a:extLst>
               <a:ext uri="{FF2B5EF4-FFF2-40B4-BE49-F238E27FC236}">
-                <a16:creationId xmlns:a16="http://schemas.microsoft.com/office/drawing/2014/main" id="{82AFC9A5-1D8A-436E-8718-8EBCE4864537}"/>
+                <a16:creationId xmlns:a16="http://schemas.microsoft.com/office/drawing/2014/main" xmlns="" id="{82AFC9A5-1D8A-436E-8718-8EBCE4864537}"/>
               </a:ext>
             </a:extLst>
           </p:cNvPr>

</xml_diff>

<commit_message>
add 1 more slide
</commit_message>
<xml_diff>
--- a/Project1.pptx
+++ b/Project1.pptx
@@ -19,7 +19,8 @@
     <p:sldId id="264" r:id="rId13"/>
     <p:sldId id="269" r:id="rId14"/>
     <p:sldId id="268" r:id="rId15"/>
-    <p:sldId id="258" r:id="rId16"/>
+    <p:sldId id="274" r:id="rId16"/>
+    <p:sldId id="258" r:id="rId17"/>
   </p:sldIdLst>
   <p:sldSz cx="12192000" cy="6858000"/>
   <p:notesSz cx="6858000" cy="9144000"/>
@@ -5605,7 +5606,7 @@
           <p:cNvPr id="6" name="TextBox 5">
             <a:extLst>
               <a:ext uri="{FF2B5EF4-FFF2-40B4-BE49-F238E27FC236}">
-                <a16:creationId xmlns:a16="http://schemas.microsoft.com/office/drawing/2014/main" id="{82AFC9A5-1D8A-436E-8718-8EBCE4864537}"/>
+                <a16:creationId xmlns:a16="http://schemas.microsoft.com/office/drawing/2014/main" xmlns="" id="{82AFC9A5-1D8A-436E-8718-8EBCE4864537}"/>
               </a:ext>
             </a:extLst>
           </p:cNvPr>
@@ -5695,7 +5696,7 @@
           <p:cNvPr id="7" name="Picture 6">
             <a:extLst>
               <a:ext uri="{FF2B5EF4-FFF2-40B4-BE49-F238E27FC236}">
-                <a16:creationId xmlns:a16="http://schemas.microsoft.com/office/drawing/2014/main" id="{234576BE-CC9D-4EBD-8E3B-BFB54B1D808F}"/>
+                <a16:creationId xmlns:a16="http://schemas.microsoft.com/office/drawing/2014/main" xmlns="" id="{234576BE-CC9D-4EBD-8E3B-BFB54B1D808F}"/>
               </a:ext>
             </a:extLst>
           </p:cNvPr>
@@ -6311,8 +6312,13 @@
           <a:p>
             <a:r>
               <a:rPr lang="en-US" sz="2000" b="1" dirty="0"/>
-              <a:t>SO WHAT WAS THE SENTIMENT DURING SIGNIFICNAT DROP BEFORE AND AFTER MAY? </a:t>
-            </a:r>
+              <a:t>SO WHAT WAS THE SENTIMENT DURING SIGNIFICNAT DROP BEFORE AND AFTER </a:t>
+            </a:r>
+            <a:r>
+              <a:rPr lang="en-US" sz="2000" b="1" dirty="0" smtClean="0"/>
+              <a:t>MAY? </a:t>
+            </a:r>
+            <a:endParaRPr lang="en-US" sz="2000" b="1" dirty="0"/>
           </a:p>
         </p:txBody>
       </p:sp>
@@ -6547,6 +6553,369 @@
         </p:nvSpPr>
         <p:spPr>
           <a:xfrm>
+            <a:off x="1408829" y="543463"/>
+            <a:ext cx="8865231" cy="613347"/>
+          </a:xfrm>
+        </p:spPr>
+        <p:txBody>
+          <a:bodyPr>
+            <a:normAutofit fontScale="90000"/>
+          </a:bodyPr>
+          <a:lstStyle/>
+          <a:p>
+            <a:r>
+              <a:rPr lang="en-US" dirty="0" smtClean="0"/>
+              <a:t>Sentiment scores from NLTK Vader</a:t>
+            </a:r>
+            <a:endParaRPr lang="en-US" dirty="0"/>
+          </a:p>
+        </p:txBody>
+      </p:sp>
+      <p:sp>
+        <p:nvSpPr>
+          <p:cNvPr id="3" name="Text Placeholder 2"/>
+          <p:cNvSpPr>
+            <a:spLocks noGrp="1"/>
+          </p:cNvSpPr>
+          <p:nvPr>
+            <p:ph type="body" idx="1"/>
+          </p:nvPr>
+        </p:nvSpPr>
+        <p:spPr>
+          <a:xfrm>
+            <a:off x="684213" y="1302589"/>
+            <a:ext cx="8534400" cy="4691811"/>
+          </a:xfrm>
+        </p:spPr>
+        <p:txBody>
+          <a:bodyPr>
+            <a:normAutofit/>
+          </a:bodyPr>
+          <a:lstStyle/>
+          <a:p>
+            <a:pPr marL="285750" indent="-285750">
+              <a:buFont typeface="Arial" panose="020B0604020202020204" pitchFamily="34" charset="0"/>
+              <a:buChar char="•"/>
+            </a:pPr>
+            <a:r>
+              <a:rPr lang="en-US" sz="2000" b="1" dirty="0"/>
+              <a:t>Combined green days sentiment </a:t>
+            </a:r>
+            <a:r>
+              <a:rPr lang="en-US" sz="2000" b="1" dirty="0" smtClean="0"/>
+              <a:t>score:</a:t>
+            </a:r>
+          </a:p>
+          <a:p>
+            <a:pPr marL="742950" lvl="1" indent="-285750">
+              <a:buFont typeface="Arial" panose="020B0604020202020204" pitchFamily="34" charset="0"/>
+              <a:buChar char="•"/>
+            </a:pPr>
+            <a:r>
+              <a:rPr lang="en-US" sz="2000" dirty="0" smtClean="0"/>
+              <a:t> </a:t>
+            </a:r>
+            <a:r>
+              <a:rPr lang="en-US" sz="2000" dirty="0"/>
+              <a:t>{'</a:t>
+            </a:r>
+            <a:r>
+              <a:rPr lang="en-US" sz="2000" dirty="0" err="1"/>
+              <a:t>neg</a:t>
+            </a:r>
+            <a:r>
+              <a:rPr lang="en-US" sz="2000" dirty="0"/>
+              <a:t>': 0.09, '</a:t>
+            </a:r>
+            <a:r>
+              <a:rPr lang="en-US" sz="2000" dirty="0" err="1"/>
+              <a:t>neu</a:t>
+            </a:r>
+            <a:r>
+              <a:rPr lang="en-US" sz="2000" dirty="0"/>
+              <a:t>': 0.812, '</a:t>
+            </a:r>
+            <a:r>
+              <a:rPr lang="en-US" sz="2000" dirty="0" err="1"/>
+              <a:t>pos</a:t>
+            </a:r>
+            <a:r>
+              <a:rPr lang="en-US" sz="2000" dirty="0"/>
+              <a:t>': 0.099, 'compound': 1.0</a:t>
+            </a:r>
+            <a:r>
+              <a:rPr lang="en-US" sz="2000" dirty="0" smtClean="0"/>
+              <a:t>}</a:t>
+            </a:r>
+          </a:p>
+          <a:p>
+            <a:pPr marL="285750" indent="-285750">
+              <a:buFont typeface="Arial" panose="020B0604020202020204" pitchFamily="34" charset="0"/>
+              <a:buChar char="•"/>
+            </a:pPr>
+            <a:r>
+              <a:rPr lang="en-US" sz="2000" b="1" dirty="0" smtClean="0"/>
+              <a:t>Red </a:t>
+            </a:r>
+            <a:r>
+              <a:rPr lang="en-US" sz="2000" b="1" dirty="0"/>
+              <a:t>days </a:t>
+            </a:r>
+            <a:r>
+              <a:rPr lang="en-US" sz="2000" b="1" dirty="0" smtClean="0"/>
+              <a:t>from </a:t>
+            </a:r>
+            <a:r>
+              <a:rPr lang="en-US" sz="2000" b="1" dirty="0" err="1" smtClean="0"/>
+              <a:t>Februrary</a:t>
+            </a:r>
+            <a:r>
+              <a:rPr lang="en-US" sz="2000" b="1" dirty="0" smtClean="0"/>
+              <a:t> to May: </a:t>
+            </a:r>
+          </a:p>
+          <a:p>
+            <a:pPr marL="742950" lvl="1" indent="-285750">
+              <a:buFont typeface="Arial" panose="020B0604020202020204" pitchFamily="34" charset="0"/>
+              <a:buChar char="•"/>
+            </a:pPr>
+            <a:r>
+              <a:rPr lang="en-US" sz="2000" dirty="0" smtClean="0"/>
+              <a:t>{'</a:t>
+            </a:r>
+            <a:r>
+              <a:rPr lang="en-US" sz="2000" dirty="0" err="1" smtClean="0"/>
+              <a:t>neg</a:t>
+            </a:r>
+            <a:r>
+              <a:rPr lang="en-US" sz="2000" dirty="0" smtClean="0"/>
+              <a:t>': 0.104, '</a:t>
+            </a:r>
+            <a:r>
+              <a:rPr lang="en-US" sz="2000" dirty="0" err="1" smtClean="0"/>
+              <a:t>neu</a:t>
+            </a:r>
+            <a:r>
+              <a:rPr lang="en-US" sz="2000" dirty="0" smtClean="0"/>
+              <a:t>': 0.799, '</a:t>
+            </a:r>
+            <a:r>
+              <a:rPr lang="en-US" sz="2000" dirty="0" err="1" smtClean="0"/>
+              <a:t>pos</a:t>
+            </a:r>
+            <a:r>
+              <a:rPr lang="en-US" sz="2000" dirty="0" smtClean="0"/>
+              <a:t>': 0.097, 'compound': -1.0}</a:t>
+            </a:r>
+          </a:p>
+          <a:p>
+            <a:pPr marL="285750" indent="-285750">
+              <a:buFont typeface="Arial" panose="020B0604020202020204" pitchFamily="34" charset="0"/>
+              <a:buChar char="•"/>
+            </a:pPr>
+            <a:r>
+              <a:rPr lang="en-US" sz="2000" b="1" dirty="0"/>
+              <a:t>R</a:t>
+            </a:r>
+            <a:r>
+              <a:rPr lang="en-US" sz="2000" b="1" dirty="0" smtClean="0"/>
+              <a:t>ed days AFTER may:</a:t>
+            </a:r>
+          </a:p>
+          <a:p>
+            <a:pPr marL="742950" lvl="1" indent="-285750">
+              <a:buFont typeface="Arial" panose="020B0604020202020204" pitchFamily="34" charset="0"/>
+              <a:buChar char="•"/>
+            </a:pPr>
+            <a:r>
+              <a:rPr lang="en-US" sz="2000" dirty="0" smtClean="0"/>
+              <a:t> {'</a:t>
+            </a:r>
+            <a:r>
+              <a:rPr lang="en-US" sz="2000" dirty="0" err="1" smtClean="0"/>
+              <a:t>neg</a:t>
+            </a:r>
+            <a:r>
+              <a:rPr lang="en-US" sz="2000" dirty="0" smtClean="0"/>
+              <a:t>': 0.079, '</a:t>
+            </a:r>
+            <a:r>
+              <a:rPr lang="en-US" sz="2000" dirty="0" err="1" smtClean="0"/>
+              <a:t>neu</a:t>
+            </a:r>
+            <a:r>
+              <a:rPr lang="en-US" sz="2000" dirty="0" smtClean="0"/>
+              <a:t>': 0.819, '</a:t>
+            </a:r>
+            <a:r>
+              <a:rPr lang="en-US" sz="2000" dirty="0" err="1" smtClean="0"/>
+              <a:t>pos</a:t>
+            </a:r>
+            <a:r>
+              <a:rPr lang="en-US" sz="2000" dirty="0" smtClean="0"/>
+              <a:t>': 0.102, 'compound': 1.0}</a:t>
+            </a:r>
+          </a:p>
+        </p:txBody>
+      </p:sp>
+      <p:sp>
+        <p:nvSpPr>
+          <p:cNvPr id="5" name="Rectangle 2"/>
+          <p:cNvSpPr>
+            <a:spLocks noChangeArrowheads="1"/>
+          </p:cNvSpPr>
+          <p:nvPr/>
+        </p:nvSpPr>
+        <p:spPr bwMode="auto">
+          <a:xfrm>
+            <a:off x="0" y="0"/>
+            <a:ext cx="12192000" cy="457200"/>
+          </a:xfrm>
+          <a:prstGeom prst="rect">
+            <a:avLst/>
+          </a:prstGeom>
+          <a:solidFill>
+            <a:srgbClr val="FFFFFF"/>
+          </a:solidFill>
+          <a:ln>
+            <a:noFill/>
+          </a:ln>
+          <a:effectLst/>
+          <a:extLst>
+            <a:ext uri="{91240B29-F687-4F45-9708-019B960494DF}">
+              <a14:hiddenLine xmlns:a14="http://schemas.microsoft.com/office/drawing/2010/main" w="9525">
+                <a:solidFill>
+                  <a:schemeClr val="tx1"/>
+                </a:solidFill>
+                <a:miter lim="800000"/>
+                <a:headEnd/>
+                <a:tailEnd/>
+              </a14:hiddenLine>
+            </a:ext>
+            <a:ext uri="{AF507438-7753-43E0-B8FC-AC1667EBCBE1}">
+              <a14:hiddenEffects xmlns:a14="http://schemas.microsoft.com/office/drawing/2010/main">
+                <a:effectLst>
+                  <a:outerShdw dist="35921" dir="2700000" algn="ctr" rotWithShape="0">
+                    <a:schemeClr val="bg2"/>
+                  </a:outerShdw>
+                </a:effectLst>
+              </a14:hiddenEffects>
+            </a:ext>
+          </a:extLst>
+        </p:spPr>
+        <p:txBody>
+          <a:bodyPr vert="horz" wrap="none" lIns="0" tIns="0" rIns="0" bIns="0" numCol="1" anchor="ctr" anchorCtr="0" compatLnSpc="1">
+            <a:prstTxWarp prst="textNoShape">
+              <a:avLst/>
+            </a:prstTxWarp>
+            <a:spAutoFit/>
+          </a:bodyPr>
+          <a:lstStyle/>
+          <a:p>
+            <a:pPr marL="0" marR="0" lvl="0" indent="0" algn="l" defTabSz="914400" rtl="0" eaLnBrk="0" fontAlgn="base" latinLnBrk="0" hangingPunct="0">
+              <a:lnSpc>
+                <a:spcPct val="100000"/>
+              </a:lnSpc>
+              <a:spcBef>
+                <a:spcPct val="0"/>
+              </a:spcBef>
+              <a:spcAft>
+                <a:spcPct val="0"/>
+              </a:spcAft>
+              <a:buClrTx/>
+              <a:buSzTx/>
+              <a:buFontTx/>
+              <a:buNone/>
+              <a:tabLst/>
+            </a:pPr>
+            <a:r>
+              <a:rPr kumimoji="0" lang="en-US" altLang="en-US" sz="1000" b="0" i="0" u="none" strike="noStrike" cap="none" normalizeH="0" baseline="0" smtClean="0">
+                <a:ln>
+                  <a:noFill/>
+                </a:ln>
+                <a:solidFill>
+                  <a:srgbClr val="000000"/>
+                </a:solidFill>
+                <a:effectLst/>
+                <a:latin typeface="Courier New" panose="02070309020205020404" pitchFamily="49" charset="0"/>
+                <a:cs typeface="Courier New" panose="02070309020205020404" pitchFamily="49" charset="0"/>
+              </a:rPr>
+              <a:t>red days after may is {'neg': 0.079, 'neu': 0.819, 'pos': 0.102, 'compound': 1.0}</a:t>
+            </a:r>
+            <a:r>
+              <a:rPr kumimoji="0" lang="en-US" altLang="en-US" sz="800" b="0" i="0" u="none" strike="noStrike" cap="none" normalizeH="0" baseline="0" smtClean="0">
+                <a:ln>
+                  <a:noFill/>
+                </a:ln>
+                <a:solidFill>
+                  <a:schemeClr val="tx1"/>
+                </a:solidFill>
+                <a:effectLst/>
+              </a:rPr>
+              <a:t> </a:t>
+            </a:r>
+            <a:endParaRPr kumimoji="0" lang="en-US" altLang="en-US" sz="1800" b="0" i="0" u="none" strike="noStrike" cap="none" normalizeH="0" baseline="0" smtClean="0">
+              <a:ln>
+                <a:noFill/>
+              </a:ln>
+              <a:solidFill>
+                <a:schemeClr val="tx1"/>
+              </a:solidFill>
+              <a:effectLst/>
+              <a:latin typeface="Arial" panose="020B0604020202020204" pitchFamily="34" charset="0"/>
+            </a:endParaRPr>
+          </a:p>
+        </p:txBody>
+      </p:sp>
+    </p:spTree>
+    <p:extLst>
+      <p:ext uri="{BB962C8B-B14F-4D97-AF65-F5344CB8AC3E}">
+        <p14:creationId xmlns:p14="http://schemas.microsoft.com/office/powerpoint/2010/main" val="3740864313"/>
+      </p:ext>
+    </p:extLst>
+  </p:cSld>
+  <p:clrMapOvr>
+    <a:masterClrMapping/>
+  </p:clrMapOvr>
+  <p:timing>
+    <p:tnLst>
+      <p:par>
+        <p:cTn id="1" dur="indefinite" restart="never" nodeType="tmRoot"/>
+      </p:par>
+    </p:tnLst>
+  </p:timing>
+</p:sld>
+</file>
+
+<file path=ppt/slides/slide16.xml><?xml version="1.0" encoding="utf-8"?>
+<p:sld xmlns:a="http://schemas.openxmlformats.org/drawingml/2006/main" xmlns:r="http://schemas.openxmlformats.org/officeDocument/2006/relationships" xmlns:p="http://schemas.openxmlformats.org/presentationml/2006/main">
+  <p:cSld>
+    <p:spTree>
+      <p:nvGrpSpPr>
+        <p:cNvPr id="1" name=""/>
+        <p:cNvGrpSpPr/>
+        <p:nvPr/>
+      </p:nvGrpSpPr>
+      <p:grpSpPr>
+        <a:xfrm>
+          <a:off x="0" y="0"/>
+          <a:ext cx="0" cy="0"/>
+          <a:chOff x="0" y="0"/>
+          <a:chExt cx="0" cy="0"/>
+        </a:xfrm>
+      </p:grpSpPr>
+      <p:sp>
+        <p:nvSpPr>
+          <p:cNvPr id="2" name="Title 1"/>
+          <p:cNvSpPr>
+            <a:spLocks noGrp="1"/>
+          </p:cNvSpPr>
+          <p:nvPr>
+            <p:ph type="title"/>
+          </p:nvPr>
+        </p:nvSpPr>
+        <p:spPr>
+          <a:xfrm>
             <a:off x="684212" y="154797"/>
             <a:ext cx="10788920" cy="3387784"/>
           </a:xfrm>
@@ -6795,6 +7164,14 @@
               </a:rPr>
               <a:t>NinjaTrader</a:t>
             </a:r>
+            <a:r>
+              <a:rPr lang="en-US" dirty="0">
+                <a:solidFill>
+                  <a:schemeClr val="bg1"/>
+                </a:solidFill>
+              </a:rPr>
+              <a:t/>
+            </a:r>
             <a:br>
               <a:rPr lang="en-US" dirty="0">
                 <a:solidFill>
@@ -6969,7 +7346,7 @@
           <p:cNvPr id="2050" name="Picture 2">
             <a:extLst>
               <a:ext uri="{FF2B5EF4-FFF2-40B4-BE49-F238E27FC236}">
-                <a16:creationId xmlns:a16="http://schemas.microsoft.com/office/drawing/2014/main" id="{55016512-736B-4816-9682-4494EE519C90}"/>
+                <a16:creationId xmlns:a16="http://schemas.microsoft.com/office/drawing/2014/main" xmlns="" id="{55016512-736B-4816-9682-4494EE519C90}"/>
               </a:ext>
             </a:extLst>
           </p:cNvPr>
@@ -7046,7 +7423,7 @@
           <p:cNvPr id="4" name="Text Placeholder 3">
             <a:extLst>
               <a:ext uri="{FF2B5EF4-FFF2-40B4-BE49-F238E27FC236}">
-                <a16:creationId xmlns:a16="http://schemas.microsoft.com/office/drawing/2014/main" id="{0C518CE1-87B1-4415-9560-7BBD26D87F5E}"/>
+                <a16:creationId xmlns:a16="http://schemas.microsoft.com/office/drawing/2014/main" xmlns="" id="{0C518CE1-87B1-4415-9560-7BBD26D87F5E}"/>
               </a:ext>
             </a:extLst>
           </p:cNvPr>
@@ -7096,7 +7473,7 @@
           <p:cNvPr id="3076" name="Picture 4">
             <a:extLst>
               <a:ext uri="{FF2B5EF4-FFF2-40B4-BE49-F238E27FC236}">
-                <a16:creationId xmlns:a16="http://schemas.microsoft.com/office/drawing/2014/main" id="{0D0CAF4A-458E-4427-9039-AC1168DA98BA}"/>
+                <a16:creationId xmlns:a16="http://schemas.microsoft.com/office/drawing/2014/main" xmlns="" id="{0D0CAF4A-458E-4427-9039-AC1168DA98BA}"/>
               </a:ext>
             </a:extLst>
           </p:cNvPr>
@@ -7143,7 +7520,7 @@
           <p:cNvPr id="3080" name="Picture 8">
             <a:extLst>
               <a:ext uri="{FF2B5EF4-FFF2-40B4-BE49-F238E27FC236}">
-                <a16:creationId xmlns:a16="http://schemas.microsoft.com/office/drawing/2014/main" id="{608F6648-75F5-453A-8461-6A5B2E1B2165}"/>
+                <a16:creationId xmlns:a16="http://schemas.microsoft.com/office/drawing/2014/main" xmlns="" id="{608F6648-75F5-453A-8461-6A5B2E1B2165}"/>
               </a:ext>
             </a:extLst>
           </p:cNvPr>
@@ -7220,7 +7597,7 @@
           <p:cNvPr id="2" name="Title 1">
             <a:extLst>
               <a:ext uri="{FF2B5EF4-FFF2-40B4-BE49-F238E27FC236}">
-                <a16:creationId xmlns:a16="http://schemas.microsoft.com/office/drawing/2014/main" id="{816A84C7-63B0-497F-B745-10971956DDAA}"/>
+                <a16:creationId xmlns:a16="http://schemas.microsoft.com/office/drawing/2014/main" xmlns="" id="{816A84C7-63B0-497F-B745-10971956DDAA}"/>
               </a:ext>
             </a:extLst>
           </p:cNvPr>
@@ -7253,7 +7630,7 @@
           <p:cNvPr id="3" name="Text Placeholder 2">
             <a:extLst>
               <a:ext uri="{FF2B5EF4-FFF2-40B4-BE49-F238E27FC236}">
-                <a16:creationId xmlns:a16="http://schemas.microsoft.com/office/drawing/2014/main" id="{525B9D3F-FA03-4202-A142-B5AADB5A1D1F}"/>
+                <a16:creationId xmlns:a16="http://schemas.microsoft.com/office/drawing/2014/main" xmlns="" id="{525B9D3F-FA03-4202-A142-B5AADB5A1D1F}"/>
               </a:ext>
             </a:extLst>
           </p:cNvPr>
@@ -7427,7 +7804,7 @@
           <p:cNvPr id="5" name="Picture 4" descr="Chart, line chart&#10;&#10;Description automatically generated">
             <a:extLst>
               <a:ext uri="{FF2B5EF4-FFF2-40B4-BE49-F238E27FC236}">
-                <a16:creationId xmlns:a16="http://schemas.microsoft.com/office/drawing/2014/main" id="{5518163D-1008-4916-9DD4-085D43F88D3D}"/>
+                <a16:creationId xmlns:a16="http://schemas.microsoft.com/office/drawing/2014/main" xmlns="" id="{5518163D-1008-4916-9DD4-085D43F88D3D}"/>
               </a:ext>
             </a:extLst>
           </p:cNvPr>
@@ -7457,7 +7834,7 @@
           <p:cNvPr id="7" name="Picture 6">
             <a:extLst>
               <a:ext uri="{FF2B5EF4-FFF2-40B4-BE49-F238E27FC236}">
-                <a16:creationId xmlns:a16="http://schemas.microsoft.com/office/drawing/2014/main" id="{DF30E173-6C1B-41E6-B648-0CCEDFBFDB79}"/>
+                <a16:creationId xmlns:a16="http://schemas.microsoft.com/office/drawing/2014/main" xmlns="" id="{DF30E173-6C1B-41E6-B648-0CCEDFBFDB79}"/>
               </a:ext>
             </a:extLst>
           </p:cNvPr>
@@ -7517,7 +7894,7 @@
           <p:cNvPr id="2" name="Title 1">
             <a:extLst>
               <a:ext uri="{FF2B5EF4-FFF2-40B4-BE49-F238E27FC236}">
-                <a16:creationId xmlns:a16="http://schemas.microsoft.com/office/drawing/2014/main" id="{47287D70-E8D8-45FF-A602-278B17EDAA4F}"/>
+                <a16:creationId xmlns:a16="http://schemas.microsoft.com/office/drawing/2014/main" xmlns="" id="{47287D70-E8D8-45FF-A602-278B17EDAA4F}"/>
               </a:ext>
             </a:extLst>
           </p:cNvPr>
@@ -7550,7 +7927,7 @@
           <p:cNvPr id="4" name="Text Placeholder 3">
             <a:extLst>
               <a:ext uri="{FF2B5EF4-FFF2-40B4-BE49-F238E27FC236}">
-                <a16:creationId xmlns:a16="http://schemas.microsoft.com/office/drawing/2014/main" id="{508CB0EF-3688-4243-9320-D37CAB7BF1B7}"/>
+                <a16:creationId xmlns:a16="http://schemas.microsoft.com/office/drawing/2014/main" xmlns="" id="{508CB0EF-3688-4243-9320-D37CAB7BF1B7}"/>
               </a:ext>
             </a:extLst>
           </p:cNvPr>
@@ -7649,7 +8026,7 @@
           <p:cNvPr id="10" name="Picture 9" descr="Chart, histogram&#10;&#10;Description automatically generated">
             <a:extLst>
               <a:ext uri="{FF2B5EF4-FFF2-40B4-BE49-F238E27FC236}">
-                <a16:creationId xmlns:a16="http://schemas.microsoft.com/office/drawing/2014/main" id="{54F1F3DD-29E8-439D-90EA-7CA53231F0EC}"/>
+                <a16:creationId xmlns:a16="http://schemas.microsoft.com/office/drawing/2014/main" xmlns="" id="{54F1F3DD-29E8-439D-90EA-7CA53231F0EC}"/>
               </a:ext>
             </a:extLst>
           </p:cNvPr>
@@ -7679,7 +8056,7 @@
           <p:cNvPr id="12" name="Picture 11">
             <a:extLst>
               <a:ext uri="{FF2B5EF4-FFF2-40B4-BE49-F238E27FC236}">
-                <a16:creationId xmlns:a16="http://schemas.microsoft.com/office/drawing/2014/main" id="{61A22602-5AB0-44C4-B54B-898E3585569A}"/>
+                <a16:creationId xmlns:a16="http://schemas.microsoft.com/office/drawing/2014/main" xmlns="" id="{61A22602-5AB0-44C4-B54B-898E3585569A}"/>
               </a:ext>
             </a:extLst>
           </p:cNvPr>
@@ -7739,7 +8116,7 @@
           <p:cNvPr id="2" name="Title 1">
             <a:extLst>
               <a:ext uri="{FF2B5EF4-FFF2-40B4-BE49-F238E27FC236}">
-                <a16:creationId xmlns:a16="http://schemas.microsoft.com/office/drawing/2014/main" id="{9AB31560-5FA9-4C69-B818-8BEB4C8DCF2B}"/>
+                <a16:creationId xmlns:a16="http://schemas.microsoft.com/office/drawing/2014/main" xmlns="" id="{9AB31560-5FA9-4C69-B818-8BEB4C8DCF2B}"/>
               </a:ext>
             </a:extLst>
           </p:cNvPr>
@@ -7955,7 +8332,7 @@
           <p:cNvPr id="5" name="Picture 4">
             <a:extLst>
               <a:ext uri="{FF2B5EF4-FFF2-40B4-BE49-F238E27FC236}">
-                <a16:creationId xmlns:a16="http://schemas.microsoft.com/office/drawing/2014/main" id="{EA1399E7-6309-4723-86AD-38062D8F1D72}"/>
+                <a16:creationId xmlns:a16="http://schemas.microsoft.com/office/drawing/2014/main" xmlns="" id="{EA1399E7-6309-4723-86AD-38062D8F1D72}"/>
               </a:ext>
             </a:extLst>
           </p:cNvPr>
@@ -7985,7 +8362,7 @@
           <p:cNvPr id="6" name="TextBox 5">
             <a:extLst>
               <a:ext uri="{FF2B5EF4-FFF2-40B4-BE49-F238E27FC236}">
-                <a16:creationId xmlns:a16="http://schemas.microsoft.com/office/drawing/2014/main" id="{82AFC9A5-1D8A-436E-8718-8EBCE4864537}"/>
+                <a16:creationId xmlns:a16="http://schemas.microsoft.com/office/drawing/2014/main" xmlns="" id="{82AFC9A5-1D8A-436E-8718-8EBCE4864537}"/>
               </a:ext>
             </a:extLst>
           </p:cNvPr>

</xml_diff>